<commit_message>
FIX:Change the data format
</commit_message>
<xml_diff>
--- a/figure/real2sim_architecture.pptx
+++ b/figure/real2sim_architecture.pptx
@@ -4,6 +4,9 @@
   <p:sldMasterIdLst>
     <p:sldMasterId id="2147483648" r:id="rId1"/>
   </p:sldMasterIdLst>
+  <p:notesMasterIdLst>
+    <p:notesMasterId r:id="rId3"/>
+  </p:notesMasterIdLst>
   <p:sldIdLst>
     <p:sldId id="256" r:id="rId2"/>
   </p:sldIdLst>
@@ -110,6 +113,439 @@
     </p:ext>
   </p:extLst>
 </p:presentation>
+</file>
+
+<file path=ppt/notesMasters/notesMaster1.xml><?xml version="1.0" encoding="utf-8"?>
+<p:notesMaster xmlns:a="http://schemas.openxmlformats.org/drawingml/2006/main" xmlns:r="http://schemas.openxmlformats.org/officeDocument/2006/relationships" xmlns:p="http://schemas.openxmlformats.org/presentationml/2006/main">
+  <p:cSld>
+    <p:bg>
+      <p:bgRef idx="1001">
+        <a:schemeClr val="bg1"/>
+      </p:bgRef>
+    </p:bg>
+    <p:spTree>
+      <p:nvGrpSpPr>
+        <p:cNvPr id="1" name=""/>
+        <p:cNvGrpSpPr/>
+        <p:nvPr/>
+      </p:nvGrpSpPr>
+      <p:grpSpPr>
+        <a:xfrm>
+          <a:off x="0" y="0"/>
+          <a:ext cx="0" cy="0"/>
+          <a:chOff x="0" y="0"/>
+          <a:chExt cx="0" cy="0"/>
+        </a:xfrm>
+      </p:grpSpPr>
+      <p:sp>
+        <p:nvSpPr>
+          <p:cNvPr id="2" name="머리글 개체 틀 1"/>
+          <p:cNvSpPr>
+            <a:spLocks noGrp="1"/>
+          </p:cNvSpPr>
+          <p:nvPr>
+            <p:ph type="hdr" sz="quarter"/>
+          </p:nvPr>
+        </p:nvSpPr>
+        <p:spPr>
+          <a:xfrm>
+            <a:off x="0" y="0"/>
+            <a:ext cx="2971800" cy="458788"/>
+          </a:xfrm>
+          <a:prstGeom prst="rect">
+            <a:avLst/>
+          </a:prstGeom>
+        </p:spPr>
+        <p:txBody>
+          <a:bodyPr vert="horz" lIns="91440" tIns="45720" rIns="91440" bIns="45720" rtlCol="0"/>
+          <a:lstStyle>
+            <a:lvl1pPr algn="l">
+              <a:defRPr sz="1200"/>
+            </a:lvl1pPr>
+          </a:lstStyle>
+          <a:p>
+            <a:endParaRPr lang="ko-KR" altLang="en-US"/>
+          </a:p>
+        </p:txBody>
+      </p:sp>
+      <p:sp>
+        <p:nvSpPr>
+          <p:cNvPr id="3" name="날짜 개체 틀 2"/>
+          <p:cNvSpPr>
+            <a:spLocks noGrp="1"/>
+          </p:cNvSpPr>
+          <p:nvPr>
+            <p:ph type="dt" idx="1"/>
+          </p:nvPr>
+        </p:nvSpPr>
+        <p:spPr>
+          <a:xfrm>
+            <a:off x="3884613" y="0"/>
+            <a:ext cx="2971800" cy="458788"/>
+          </a:xfrm>
+          <a:prstGeom prst="rect">
+            <a:avLst/>
+          </a:prstGeom>
+        </p:spPr>
+        <p:txBody>
+          <a:bodyPr vert="horz" lIns="91440" tIns="45720" rIns="91440" bIns="45720" rtlCol="0"/>
+          <a:lstStyle>
+            <a:lvl1pPr algn="r">
+              <a:defRPr sz="1200"/>
+            </a:lvl1pPr>
+          </a:lstStyle>
+          <a:p>
+            <a:fld id="{87984234-178A-4616-AC06-773C26F0E1DF}" type="datetimeFigureOut">
+              <a:rPr lang="ko-KR" altLang="en-US" smtClean="0"/>
+              <a:t>2025-04-15</a:t>
+            </a:fld>
+            <a:endParaRPr lang="ko-KR" altLang="en-US"/>
+          </a:p>
+        </p:txBody>
+      </p:sp>
+      <p:sp>
+        <p:nvSpPr>
+          <p:cNvPr id="4" name="슬라이드 이미지 개체 틀 3"/>
+          <p:cNvSpPr>
+            <a:spLocks noGrp="1" noRot="1" noChangeAspect="1"/>
+          </p:cNvSpPr>
+          <p:nvPr>
+            <p:ph type="sldImg" idx="2"/>
+          </p:nvPr>
+        </p:nvSpPr>
+        <p:spPr>
+          <a:xfrm>
+            <a:off x="685800" y="1143000"/>
+            <a:ext cx="5486400" cy="3086100"/>
+          </a:xfrm>
+          <a:prstGeom prst="rect">
+            <a:avLst/>
+          </a:prstGeom>
+          <a:noFill/>
+          <a:ln w="12700">
+            <a:solidFill>
+              <a:prstClr val="black"/>
+            </a:solidFill>
+          </a:ln>
+        </p:spPr>
+        <p:txBody>
+          <a:bodyPr vert="horz" lIns="91440" tIns="45720" rIns="91440" bIns="45720" rtlCol="0" anchor="ctr"/>
+          <a:lstStyle/>
+          <a:p>
+            <a:endParaRPr lang="ko-KR" altLang="en-US"/>
+          </a:p>
+        </p:txBody>
+      </p:sp>
+      <p:sp>
+        <p:nvSpPr>
+          <p:cNvPr id="5" name="슬라이드 노트 개체 틀 4"/>
+          <p:cNvSpPr>
+            <a:spLocks noGrp="1"/>
+          </p:cNvSpPr>
+          <p:nvPr>
+            <p:ph type="body" sz="quarter" idx="3"/>
+          </p:nvPr>
+        </p:nvSpPr>
+        <p:spPr>
+          <a:xfrm>
+            <a:off x="685800" y="4400550"/>
+            <a:ext cx="5486400" cy="3600450"/>
+          </a:xfrm>
+          <a:prstGeom prst="rect">
+            <a:avLst/>
+          </a:prstGeom>
+        </p:spPr>
+        <p:txBody>
+          <a:bodyPr vert="horz" lIns="91440" tIns="45720" rIns="91440" bIns="45720" rtlCol="0"/>
+          <a:lstStyle/>
+          <a:p>
+            <a:pPr lvl="0"/>
+            <a:r>
+              <a:rPr lang="ko-KR" altLang="en-US"/>
+              <a:t>마스터 텍스트 스타일을 편집하려면 클릭</a:t>
+            </a:r>
+          </a:p>
+          <a:p>
+            <a:pPr lvl="1"/>
+            <a:r>
+              <a:rPr lang="ko-KR" altLang="en-US"/>
+              <a:t>두 번째 수준</a:t>
+            </a:r>
+          </a:p>
+          <a:p>
+            <a:pPr lvl="2"/>
+            <a:r>
+              <a:rPr lang="ko-KR" altLang="en-US"/>
+              <a:t>세 번째 수준</a:t>
+            </a:r>
+          </a:p>
+          <a:p>
+            <a:pPr lvl="3"/>
+            <a:r>
+              <a:rPr lang="ko-KR" altLang="en-US"/>
+              <a:t>네 번째 수준</a:t>
+            </a:r>
+          </a:p>
+          <a:p>
+            <a:pPr lvl="4"/>
+            <a:r>
+              <a:rPr lang="ko-KR" altLang="en-US"/>
+              <a:t>다섯 번째 수준</a:t>
+            </a:r>
+          </a:p>
+        </p:txBody>
+      </p:sp>
+      <p:sp>
+        <p:nvSpPr>
+          <p:cNvPr id="6" name="바닥글 개체 틀 5"/>
+          <p:cNvSpPr>
+            <a:spLocks noGrp="1"/>
+          </p:cNvSpPr>
+          <p:nvPr>
+            <p:ph type="ftr" sz="quarter" idx="4"/>
+          </p:nvPr>
+        </p:nvSpPr>
+        <p:spPr>
+          <a:xfrm>
+            <a:off x="0" y="8685213"/>
+            <a:ext cx="2971800" cy="458787"/>
+          </a:xfrm>
+          <a:prstGeom prst="rect">
+            <a:avLst/>
+          </a:prstGeom>
+        </p:spPr>
+        <p:txBody>
+          <a:bodyPr vert="horz" lIns="91440" tIns="45720" rIns="91440" bIns="45720" rtlCol="0" anchor="b"/>
+          <a:lstStyle>
+            <a:lvl1pPr algn="l">
+              <a:defRPr sz="1200"/>
+            </a:lvl1pPr>
+          </a:lstStyle>
+          <a:p>
+            <a:endParaRPr lang="ko-KR" altLang="en-US"/>
+          </a:p>
+        </p:txBody>
+      </p:sp>
+      <p:sp>
+        <p:nvSpPr>
+          <p:cNvPr id="7" name="슬라이드 번호 개체 틀 6"/>
+          <p:cNvSpPr>
+            <a:spLocks noGrp="1"/>
+          </p:cNvSpPr>
+          <p:nvPr>
+            <p:ph type="sldNum" sz="quarter" idx="5"/>
+          </p:nvPr>
+        </p:nvSpPr>
+        <p:spPr>
+          <a:xfrm>
+            <a:off x="3884613" y="8685213"/>
+            <a:ext cx="2971800" cy="458787"/>
+          </a:xfrm>
+          <a:prstGeom prst="rect">
+            <a:avLst/>
+          </a:prstGeom>
+        </p:spPr>
+        <p:txBody>
+          <a:bodyPr vert="horz" lIns="91440" tIns="45720" rIns="91440" bIns="45720" rtlCol="0" anchor="b"/>
+          <a:lstStyle>
+            <a:lvl1pPr algn="r">
+              <a:defRPr sz="1200"/>
+            </a:lvl1pPr>
+          </a:lstStyle>
+          <a:p>
+            <a:fld id="{CAB7B4E2-0479-4213-945C-1710DBA7FE75}" type="slidenum">
+              <a:rPr lang="ko-KR" altLang="en-US" smtClean="0"/>
+              <a:t>‹#›</a:t>
+            </a:fld>
+            <a:endParaRPr lang="ko-KR" altLang="en-US"/>
+          </a:p>
+        </p:txBody>
+      </p:sp>
+    </p:spTree>
+    <p:extLst>
+      <p:ext uri="{BB962C8B-B14F-4D97-AF65-F5344CB8AC3E}">
+        <p14:creationId xmlns:p14="http://schemas.microsoft.com/office/powerpoint/2010/main" val="1095045156"/>
+      </p:ext>
+    </p:extLst>
+  </p:cSld>
+  <p:clrMap bg1="lt1" tx1="dk1" bg2="lt2" tx2="dk2" accent1="accent1" accent2="accent2" accent3="accent3" accent4="accent4" accent5="accent5" accent6="accent6" hlink="hlink" folHlink="folHlink"/>
+  <p:notesStyle>
+    <a:lvl1pPr marL="0" algn="l" defTabSz="914400" rtl="0" eaLnBrk="1" latinLnBrk="1" hangingPunct="1">
+      <a:defRPr sz="1200" kern="1200">
+        <a:solidFill>
+          <a:schemeClr val="tx1"/>
+        </a:solidFill>
+        <a:latin typeface="+mn-lt"/>
+        <a:ea typeface="+mn-ea"/>
+        <a:cs typeface="+mn-cs"/>
+      </a:defRPr>
+    </a:lvl1pPr>
+    <a:lvl2pPr marL="457200" algn="l" defTabSz="914400" rtl="0" eaLnBrk="1" latinLnBrk="1" hangingPunct="1">
+      <a:defRPr sz="1200" kern="1200">
+        <a:solidFill>
+          <a:schemeClr val="tx1"/>
+        </a:solidFill>
+        <a:latin typeface="+mn-lt"/>
+        <a:ea typeface="+mn-ea"/>
+        <a:cs typeface="+mn-cs"/>
+      </a:defRPr>
+    </a:lvl2pPr>
+    <a:lvl3pPr marL="914400" algn="l" defTabSz="914400" rtl="0" eaLnBrk="1" latinLnBrk="1" hangingPunct="1">
+      <a:defRPr sz="1200" kern="1200">
+        <a:solidFill>
+          <a:schemeClr val="tx1"/>
+        </a:solidFill>
+        <a:latin typeface="+mn-lt"/>
+        <a:ea typeface="+mn-ea"/>
+        <a:cs typeface="+mn-cs"/>
+      </a:defRPr>
+    </a:lvl3pPr>
+    <a:lvl4pPr marL="1371600" algn="l" defTabSz="914400" rtl="0" eaLnBrk="1" latinLnBrk="1" hangingPunct="1">
+      <a:defRPr sz="1200" kern="1200">
+        <a:solidFill>
+          <a:schemeClr val="tx1"/>
+        </a:solidFill>
+        <a:latin typeface="+mn-lt"/>
+        <a:ea typeface="+mn-ea"/>
+        <a:cs typeface="+mn-cs"/>
+      </a:defRPr>
+    </a:lvl4pPr>
+    <a:lvl5pPr marL="1828800" algn="l" defTabSz="914400" rtl="0" eaLnBrk="1" latinLnBrk="1" hangingPunct="1">
+      <a:defRPr sz="1200" kern="1200">
+        <a:solidFill>
+          <a:schemeClr val="tx1"/>
+        </a:solidFill>
+        <a:latin typeface="+mn-lt"/>
+        <a:ea typeface="+mn-ea"/>
+        <a:cs typeface="+mn-cs"/>
+      </a:defRPr>
+    </a:lvl5pPr>
+    <a:lvl6pPr marL="2286000" algn="l" defTabSz="914400" rtl="0" eaLnBrk="1" latinLnBrk="1" hangingPunct="1">
+      <a:defRPr sz="1200" kern="1200">
+        <a:solidFill>
+          <a:schemeClr val="tx1"/>
+        </a:solidFill>
+        <a:latin typeface="+mn-lt"/>
+        <a:ea typeface="+mn-ea"/>
+        <a:cs typeface="+mn-cs"/>
+      </a:defRPr>
+    </a:lvl6pPr>
+    <a:lvl7pPr marL="2743200" algn="l" defTabSz="914400" rtl="0" eaLnBrk="1" latinLnBrk="1" hangingPunct="1">
+      <a:defRPr sz="1200" kern="1200">
+        <a:solidFill>
+          <a:schemeClr val="tx1"/>
+        </a:solidFill>
+        <a:latin typeface="+mn-lt"/>
+        <a:ea typeface="+mn-ea"/>
+        <a:cs typeface="+mn-cs"/>
+      </a:defRPr>
+    </a:lvl7pPr>
+    <a:lvl8pPr marL="3200400" algn="l" defTabSz="914400" rtl="0" eaLnBrk="1" latinLnBrk="1" hangingPunct="1">
+      <a:defRPr sz="1200" kern="1200">
+        <a:solidFill>
+          <a:schemeClr val="tx1"/>
+        </a:solidFill>
+        <a:latin typeface="+mn-lt"/>
+        <a:ea typeface="+mn-ea"/>
+        <a:cs typeface="+mn-cs"/>
+      </a:defRPr>
+    </a:lvl8pPr>
+    <a:lvl9pPr marL="3657600" algn="l" defTabSz="914400" rtl="0" eaLnBrk="1" latinLnBrk="1" hangingPunct="1">
+      <a:defRPr sz="1200" kern="1200">
+        <a:solidFill>
+          <a:schemeClr val="tx1"/>
+        </a:solidFill>
+        <a:latin typeface="+mn-lt"/>
+        <a:ea typeface="+mn-ea"/>
+        <a:cs typeface="+mn-cs"/>
+      </a:defRPr>
+    </a:lvl9pPr>
+  </p:notesStyle>
+</p:notesMaster>
+</file>
+
+<file path=ppt/notesSlides/notesSlide1.xml><?xml version="1.0" encoding="utf-8"?>
+<p:notes xmlns:a="http://schemas.openxmlformats.org/drawingml/2006/main" xmlns:r="http://schemas.openxmlformats.org/officeDocument/2006/relationships" xmlns:p="http://schemas.openxmlformats.org/presentationml/2006/main">
+  <p:cSld>
+    <p:spTree>
+      <p:nvGrpSpPr>
+        <p:cNvPr id="1" name=""/>
+        <p:cNvGrpSpPr/>
+        <p:nvPr/>
+      </p:nvGrpSpPr>
+      <p:grpSpPr>
+        <a:xfrm>
+          <a:off x="0" y="0"/>
+          <a:ext cx="0" cy="0"/>
+          <a:chOff x="0" y="0"/>
+          <a:chExt cx="0" cy="0"/>
+        </a:xfrm>
+      </p:grpSpPr>
+      <p:sp>
+        <p:nvSpPr>
+          <p:cNvPr id="2" name="슬라이드 이미지 개체 틀 1"/>
+          <p:cNvSpPr>
+            <a:spLocks noGrp="1" noRot="1" noChangeAspect="1"/>
+          </p:cNvSpPr>
+          <p:nvPr>
+            <p:ph type="sldImg"/>
+          </p:nvPr>
+        </p:nvSpPr>
+        <p:spPr/>
+      </p:sp>
+      <p:sp>
+        <p:nvSpPr>
+          <p:cNvPr id="3" name="슬라이드 노트 개체 틀 2"/>
+          <p:cNvSpPr>
+            <a:spLocks noGrp="1"/>
+          </p:cNvSpPr>
+          <p:nvPr>
+            <p:ph type="body" idx="1"/>
+          </p:nvPr>
+        </p:nvSpPr>
+        <p:spPr/>
+        <p:txBody>
+          <a:bodyPr/>
+          <a:lstStyle/>
+          <a:p>
+            <a:endParaRPr lang="ko-KR" altLang="en-US" dirty="0"/>
+          </a:p>
+        </p:txBody>
+      </p:sp>
+      <p:sp>
+        <p:nvSpPr>
+          <p:cNvPr id="4" name="슬라이드 번호 개체 틀 3"/>
+          <p:cNvSpPr>
+            <a:spLocks noGrp="1"/>
+          </p:cNvSpPr>
+          <p:nvPr>
+            <p:ph type="sldNum" sz="quarter" idx="5"/>
+          </p:nvPr>
+        </p:nvSpPr>
+        <p:spPr/>
+        <p:txBody>
+          <a:bodyPr/>
+          <a:lstStyle/>
+          <a:p>
+            <a:fld id="{CAB7B4E2-0479-4213-945C-1710DBA7FE75}" type="slidenum">
+              <a:rPr lang="ko-KR" altLang="en-US" smtClean="0"/>
+              <a:t>1</a:t>
+            </a:fld>
+            <a:endParaRPr lang="ko-KR" altLang="en-US"/>
+          </a:p>
+        </p:txBody>
+      </p:sp>
+    </p:spTree>
+    <p:extLst>
+      <p:ext uri="{BB962C8B-B14F-4D97-AF65-F5344CB8AC3E}">
+        <p14:creationId xmlns:p14="http://schemas.microsoft.com/office/powerpoint/2010/main" val="1344186641"/>
+      </p:ext>
+    </p:extLst>
+  </p:cSld>
+  <p:clrMapOvr>
+    <a:masterClrMapping/>
+  </p:clrMapOvr>
+</p:notes>
 </file>
 
 <file path=ppt/slideLayouts/slideLayout1.xml><?xml version="1.0" encoding="utf-8"?>
@@ -3340,8 +3776,8 @@
         </p:nvSpPr>
         <p:spPr>
           <a:xfrm>
-            <a:off x="2049779" y="146596"/>
-            <a:ext cx="1026795" cy="1406068"/>
+            <a:off x="2049779" y="128124"/>
+            <a:ext cx="1221104" cy="1406068"/>
           </a:xfrm>
           <a:prstGeom prst="roundRect">
             <a:avLst/>
@@ -3443,8 +3879,8 @@
         </p:nvCxnSpPr>
         <p:spPr>
           <a:xfrm flipV="1">
-            <a:off x="1661160" y="413831"/>
-            <a:ext cx="388619" cy="401241"/>
+            <a:off x="1661160" y="394807"/>
+            <a:ext cx="416326" cy="420265"/>
           </a:xfrm>
           <a:prstGeom prst="straightConnector1">
             <a:avLst/>
@@ -3482,7 +3918,7 @@
         </p:nvSpPr>
         <p:spPr>
           <a:xfrm>
-            <a:off x="2049780" y="1047155"/>
+            <a:off x="2146933" y="1017173"/>
             <a:ext cx="1026795" cy="338554"/>
           </a:xfrm>
           <a:prstGeom prst="rect">
@@ -3525,8 +3961,8 @@
         </p:nvSpPr>
         <p:spPr>
           <a:xfrm>
-            <a:off x="2049779" y="244554"/>
-            <a:ext cx="1026795" cy="338554"/>
+            <a:off x="2077486" y="240918"/>
+            <a:ext cx="570547" cy="307777"/>
           </a:xfrm>
           <a:prstGeom prst="rect">
             <a:avLst/>
@@ -3541,13 +3977,13 @@
           <a:p>
             <a:pPr algn="ctr"/>
             <a:r>
-              <a:rPr lang="en-US" altLang="ko-KR" sz="1600" dirty="0">
+              <a:rPr lang="en-US" altLang="ko-KR" sz="1400" dirty="0">
                 <a:latin typeface="Times New Roman" panose="02020603050405020304" pitchFamily="18" charset="0"/>
                 <a:cs typeface="Times New Roman" panose="02020603050405020304" pitchFamily="18" charset="0"/>
               </a:rPr>
               <a:t>Style</a:t>
             </a:r>
-            <a:endParaRPr lang="ko-KR" altLang="en-US" sz="1600" dirty="0">
+            <a:endParaRPr lang="ko-KR" altLang="en-US" sz="1400" dirty="0">
               <a:latin typeface="Times New Roman" panose="02020603050405020304" pitchFamily="18" charset="0"/>
               <a:cs typeface="Times New Roman" panose="02020603050405020304" pitchFamily="18" charset="0"/>
             </a:endParaRPr>
@@ -3565,15 +4001,13 @@
           </p:cNvPr>
           <p:cNvCxnSpPr>
             <a:cxnSpLocks/>
-            <a:stCxn id="4" idx="3"/>
-            <a:endCxn id="8" idx="1"/>
           </p:cNvCxnSpPr>
           <p:nvPr/>
         </p:nvCxnSpPr>
         <p:spPr>
           <a:xfrm>
-            <a:off x="1661160" y="815072"/>
-            <a:ext cx="388620" cy="401360"/>
+            <a:off x="1690314" y="825671"/>
+            <a:ext cx="388618" cy="401241"/>
           </a:xfrm>
           <a:prstGeom prst="straightConnector1">
             <a:avLst/>
@@ -3611,7 +4045,7 @@
         </p:nvSpPr>
         <p:spPr>
           <a:xfrm>
-            <a:off x="3465193" y="613886"/>
+            <a:off x="3723808" y="613886"/>
             <a:ext cx="1026795" cy="338554"/>
           </a:xfrm>
           <a:prstGeom prst="rect">
@@ -3651,15 +4085,14 @@
           </p:cNvPr>
           <p:cNvCxnSpPr>
             <a:cxnSpLocks/>
-            <a:stCxn id="8" idx="3"/>
             <a:endCxn id="14" idx="1"/>
           </p:cNvCxnSpPr>
           <p:nvPr/>
         </p:nvCxnSpPr>
         <p:spPr>
           <a:xfrm flipV="1">
-            <a:off x="3076575" y="783163"/>
-            <a:ext cx="388618" cy="433269"/>
+            <a:off x="3270882" y="783163"/>
+            <a:ext cx="452926" cy="423938"/>
           </a:xfrm>
           <a:prstGeom prst="straightConnector1">
             <a:avLst/>
@@ -3694,15 +4127,14 @@
           </p:cNvPr>
           <p:cNvCxnSpPr>
             <a:cxnSpLocks/>
-            <a:stCxn id="9" idx="3"/>
             <a:endCxn id="14" idx="1"/>
           </p:cNvCxnSpPr>
           <p:nvPr/>
         </p:nvCxnSpPr>
         <p:spPr>
           <a:xfrm>
-            <a:off x="3076574" y="413831"/>
-            <a:ext cx="388619" cy="369332"/>
+            <a:off x="3284736" y="414934"/>
+            <a:ext cx="439072" cy="368229"/>
           </a:xfrm>
           <a:prstGeom prst="straightConnector1">
             <a:avLst/>
@@ -3738,13 +4170,14 @@
           <p:cNvCxnSpPr>
             <a:cxnSpLocks/>
             <a:stCxn id="14" idx="3"/>
+            <a:endCxn id="26" idx="1"/>
           </p:cNvCxnSpPr>
           <p:nvPr/>
         </p:nvCxnSpPr>
         <p:spPr>
-          <a:xfrm>
-            <a:off x="4491988" y="783163"/>
-            <a:ext cx="621032" cy="15389"/>
+          <a:xfrm flipV="1">
+            <a:off x="4750603" y="781981"/>
+            <a:ext cx="621032" cy="1182"/>
           </a:xfrm>
           <a:prstGeom prst="straightConnector1">
             <a:avLst/>
@@ -3782,7 +4215,7 @@
         </p:nvSpPr>
         <p:spPr>
           <a:xfrm>
-            <a:off x="5113020" y="603468"/>
+            <a:off x="5371635" y="612704"/>
             <a:ext cx="1026795" cy="338554"/>
           </a:xfrm>
           <a:prstGeom prst="rect">
@@ -3826,14 +4259,14 @@
           <p:nvPr/>
         </p:nvPicPr>
         <p:blipFill>
-          <a:blip r:embed="rId2"/>
+          <a:blip r:embed="rId3"/>
           <a:stretch>
             <a:fillRect/>
           </a:stretch>
         </p:blipFill>
         <p:spPr>
           <a:xfrm>
-            <a:off x="5315407" y="503441"/>
+            <a:off x="5574022" y="503441"/>
             <a:ext cx="622020" cy="200053"/>
           </a:xfrm>
           <a:prstGeom prst="rect">
@@ -3855,7 +4288,7 @@
         </p:nvSpPr>
         <p:spPr>
           <a:xfrm>
-            <a:off x="2939414" y="1678067"/>
+            <a:off x="3158535" y="1714977"/>
             <a:ext cx="388618" cy="433268"/>
           </a:xfrm>
           <a:prstGeom prst="downArrow">
@@ -3907,7 +4340,7 @@
         </p:nvSpPr>
         <p:spPr>
           <a:xfrm>
-            <a:off x="3270883" y="1710035"/>
+            <a:off x="3444238" y="1710035"/>
             <a:ext cx="2268855" cy="338554"/>
           </a:xfrm>
           <a:prstGeom prst="rect">
@@ -3962,8 +4395,8 @@
         </p:nvSpPr>
         <p:spPr>
           <a:xfrm>
-            <a:off x="2049779" y="2306004"/>
-            <a:ext cx="1026795" cy="1343976"/>
+            <a:off x="2049779" y="2287532"/>
+            <a:ext cx="1221104" cy="1343976"/>
           </a:xfrm>
           <a:prstGeom prst="roundRect">
             <a:avLst/>
@@ -4059,7 +4492,6 @@
           <p:cNvCxnSpPr>
             <a:cxnSpLocks/>
             <a:stCxn id="34" idx="3"/>
-            <a:endCxn id="37" idx="1"/>
           </p:cNvCxnSpPr>
           <p:nvPr/>
         </p:nvCxnSpPr>
@@ -4104,7 +4536,7 @@
         </p:nvSpPr>
         <p:spPr>
           <a:xfrm>
-            <a:off x="2049780" y="3175517"/>
+            <a:off x="2138212" y="3168154"/>
             <a:ext cx="1026795" cy="338554"/>
           </a:xfrm>
           <a:prstGeom prst="rect">
@@ -4133,49 +4565,6 @@
           </a:p>
         </p:txBody>
       </p:sp>
-      <p:sp>
-        <p:nvSpPr>
-          <p:cNvPr id="37" name="TextBox 36">
-            <a:extLst>
-              <a:ext uri="{FF2B5EF4-FFF2-40B4-BE49-F238E27FC236}">
-                <a16:creationId xmlns:a16="http://schemas.microsoft.com/office/drawing/2014/main" id="{8FAC77DB-DEA7-A17A-384F-5961B98E1943}"/>
-              </a:ext>
-            </a:extLst>
-          </p:cNvPr>
-          <p:cNvSpPr txBox="1"/>
-          <p:nvPr/>
-        </p:nvSpPr>
-        <p:spPr>
-          <a:xfrm>
-            <a:off x="2049779" y="2372916"/>
-            <a:ext cx="1026795" cy="338554"/>
-          </a:xfrm>
-          <a:prstGeom prst="rect">
-            <a:avLst/>
-          </a:prstGeom>
-          <a:noFill/>
-        </p:spPr>
-        <p:txBody>
-          <a:bodyPr wrap="square" rtlCol="0">
-            <a:spAutoFit/>
-          </a:bodyPr>
-          <a:lstStyle/>
-          <a:p>
-            <a:pPr algn="ctr"/>
-            <a:r>
-              <a:rPr lang="en-US" altLang="ko-KR" sz="1600" dirty="0">
-                <a:latin typeface="Times New Roman" panose="02020603050405020304" pitchFamily="18" charset="0"/>
-                <a:cs typeface="Times New Roman" panose="02020603050405020304" pitchFamily="18" charset="0"/>
-              </a:rPr>
-              <a:t>Style</a:t>
-            </a:r>
-            <a:endParaRPr lang="ko-KR" altLang="en-US" sz="1600" dirty="0">
-              <a:latin typeface="Times New Roman" panose="02020603050405020304" pitchFamily="18" charset="0"/>
-              <a:cs typeface="Times New Roman" panose="02020603050405020304" pitchFamily="18" charset="0"/>
-            </a:endParaRPr>
-          </a:p>
-        </p:txBody>
-      </p:sp>
       <p:cxnSp>
         <p:nvCxnSpPr>
           <p:cNvPr id="38" name="직선 화살표 연결선 37">
@@ -4188,14 +4577,13 @@
           <p:cNvCxnSpPr>
             <a:cxnSpLocks/>
             <a:stCxn id="34" idx="3"/>
-            <a:endCxn id="36" idx="1"/>
           </p:cNvCxnSpPr>
           <p:nvPr/>
         </p:nvCxnSpPr>
         <p:spPr>
           <a:xfrm>
             <a:off x="1661161" y="2943434"/>
-            <a:ext cx="388619" cy="401360"/>
+            <a:ext cx="416325" cy="423938"/>
           </a:xfrm>
           <a:prstGeom prst="straightConnector1">
             <a:avLst/>
@@ -4233,7 +4621,7 @@
         </p:nvSpPr>
         <p:spPr>
           <a:xfrm>
-            <a:off x="3465193" y="2742248"/>
+            <a:off x="3723808" y="2742248"/>
             <a:ext cx="1026795" cy="338554"/>
           </a:xfrm>
           <a:prstGeom prst="rect">
@@ -4273,15 +4661,14 @@
           </p:cNvPr>
           <p:cNvCxnSpPr>
             <a:cxnSpLocks/>
-            <a:stCxn id="36" idx="3"/>
             <a:endCxn id="39" idx="1"/>
           </p:cNvCxnSpPr>
           <p:nvPr/>
         </p:nvCxnSpPr>
         <p:spPr>
           <a:xfrm flipV="1">
-            <a:off x="3076575" y="2911525"/>
-            <a:ext cx="388618" cy="433269"/>
+            <a:off x="3305172" y="2911525"/>
+            <a:ext cx="418636" cy="470550"/>
           </a:xfrm>
           <a:prstGeom prst="straightConnector1">
             <a:avLst/>
@@ -4316,15 +4703,14 @@
           </p:cNvPr>
           <p:cNvCxnSpPr>
             <a:cxnSpLocks/>
-            <a:stCxn id="37" idx="3"/>
             <a:endCxn id="39" idx="1"/>
           </p:cNvCxnSpPr>
           <p:nvPr/>
         </p:nvCxnSpPr>
         <p:spPr>
           <a:xfrm>
-            <a:off x="3076574" y="2542193"/>
-            <a:ext cx="388619" cy="369332"/>
+            <a:off x="3287080" y="2603748"/>
+            <a:ext cx="436728" cy="307777"/>
           </a:xfrm>
           <a:prstGeom prst="straightConnector1">
             <a:avLst/>
@@ -4360,13 +4746,14 @@
           <p:cNvCxnSpPr>
             <a:cxnSpLocks/>
             <a:stCxn id="39" idx="3"/>
+            <a:endCxn id="43" idx="1"/>
           </p:cNvCxnSpPr>
           <p:nvPr/>
         </p:nvCxnSpPr>
         <p:spPr>
-          <a:xfrm>
-            <a:off x="4491988" y="2911525"/>
-            <a:ext cx="621032" cy="15389"/>
+          <a:xfrm flipV="1">
+            <a:off x="4750603" y="2910343"/>
+            <a:ext cx="621032" cy="1182"/>
           </a:xfrm>
           <a:prstGeom prst="straightConnector1">
             <a:avLst/>
@@ -4404,7 +4791,7 @@
         </p:nvSpPr>
         <p:spPr>
           <a:xfrm>
-            <a:off x="5113020" y="2731830"/>
+            <a:off x="5371635" y="2741066"/>
             <a:ext cx="1026795" cy="338554"/>
           </a:xfrm>
           <a:prstGeom prst="rect">
@@ -4448,14 +4835,14 @@
           <p:nvPr/>
         </p:nvPicPr>
         <p:blipFill>
-          <a:blip r:embed="rId2"/>
+          <a:blip r:embed="rId3"/>
           <a:stretch>
             <a:fillRect/>
           </a:stretch>
         </p:blipFill>
         <p:spPr>
           <a:xfrm>
-            <a:off x="5315407" y="2631803"/>
+            <a:off x="5574022" y="2631803"/>
             <a:ext cx="622020" cy="200053"/>
           </a:xfrm>
           <a:prstGeom prst="rect">
@@ -4477,8 +4864,8 @@
         </p:nvSpPr>
         <p:spPr>
           <a:xfrm>
-            <a:off x="2260285" y="2371429"/>
-            <a:ext cx="581021" cy="369332"/>
+            <a:off x="2079309" y="2399909"/>
+            <a:ext cx="1205427" cy="369332"/>
           </a:xfrm>
           <a:prstGeom prst="ellipse">
             <a:avLst/>
@@ -4531,7 +4918,7 @@
         </p:nvSpPr>
         <p:spPr>
           <a:xfrm>
-            <a:off x="2620325" y="2282309"/>
+            <a:off x="3054341" y="2248310"/>
             <a:ext cx="1026795" cy="307777"/>
           </a:xfrm>
           <a:prstGeom prst="rect">
@@ -4580,7 +4967,7 @@
         </p:nvSpPr>
         <p:spPr>
           <a:xfrm>
-            <a:off x="3579495" y="2740761"/>
+            <a:off x="3838110" y="2740761"/>
             <a:ext cx="765803" cy="369332"/>
           </a:xfrm>
           <a:prstGeom prst="ellipse">
@@ -4634,7 +5021,7 @@
         </p:nvSpPr>
         <p:spPr>
           <a:xfrm>
-            <a:off x="4051936" y="2593330"/>
+            <a:off x="4310551" y="2593330"/>
             <a:ext cx="1026795" cy="307777"/>
           </a:xfrm>
           <a:prstGeom prst="rect">
@@ -4683,8 +5070,8 @@
         </p:nvSpPr>
         <p:spPr>
           <a:xfrm>
-            <a:off x="2049779" y="4127719"/>
-            <a:ext cx="1026795" cy="1343976"/>
+            <a:off x="2049779" y="4109247"/>
+            <a:ext cx="1221104" cy="1343976"/>
           </a:xfrm>
           <a:prstGeom prst="roundRect">
             <a:avLst/>
@@ -4782,7 +5169,7 @@
         </p:nvSpPr>
         <p:spPr>
           <a:xfrm>
-            <a:off x="2049780" y="4997232"/>
+            <a:off x="2134635" y="4992184"/>
             <a:ext cx="1026795" cy="338554"/>
           </a:xfrm>
           <a:prstGeom prst="rect">
@@ -4811,49 +5198,6 @@
           </a:p>
         </p:txBody>
       </p:sp>
-      <p:sp>
-        <p:nvSpPr>
-          <p:cNvPr id="56" name="TextBox 55">
-            <a:extLst>
-              <a:ext uri="{FF2B5EF4-FFF2-40B4-BE49-F238E27FC236}">
-                <a16:creationId xmlns:a16="http://schemas.microsoft.com/office/drawing/2014/main" id="{CF6535CF-D993-4FC9-EF3E-9905BDEB309A}"/>
-              </a:ext>
-            </a:extLst>
-          </p:cNvPr>
-          <p:cNvSpPr txBox="1"/>
-          <p:nvPr/>
-        </p:nvSpPr>
-        <p:spPr>
-          <a:xfrm>
-            <a:off x="2049779" y="4194631"/>
-            <a:ext cx="1026795" cy="338554"/>
-          </a:xfrm>
-          <a:prstGeom prst="rect">
-            <a:avLst/>
-          </a:prstGeom>
-          <a:noFill/>
-        </p:spPr>
-        <p:txBody>
-          <a:bodyPr wrap="square" rtlCol="0">
-            <a:spAutoFit/>
-          </a:bodyPr>
-          <a:lstStyle/>
-          <a:p>
-            <a:pPr algn="ctr"/>
-            <a:r>
-              <a:rPr lang="en-US" altLang="ko-KR" sz="1600" dirty="0">
-                <a:latin typeface="Times New Roman" panose="02020603050405020304" pitchFamily="18" charset="0"/>
-                <a:cs typeface="Times New Roman" panose="02020603050405020304" pitchFamily="18" charset="0"/>
-              </a:rPr>
-              <a:t>Style</a:t>
-            </a:r>
-            <a:endParaRPr lang="ko-KR" altLang="en-US" sz="1600" dirty="0">
-              <a:latin typeface="Times New Roman" panose="02020603050405020304" pitchFamily="18" charset="0"/>
-              <a:cs typeface="Times New Roman" panose="02020603050405020304" pitchFamily="18" charset="0"/>
-            </a:endParaRPr>
-          </a:p>
-        </p:txBody>
-      </p:sp>
       <p:cxnSp>
         <p:nvCxnSpPr>
           <p:cNvPr id="57" name="직선 화살표 연결선 56">
@@ -4866,14 +5210,13 @@
           <p:cNvCxnSpPr>
             <a:cxnSpLocks/>
             <a:stCxn id="53" idx="3"/>
-            <a:endCxn id="55" idx="1"/>
           </p:cNvCxnSpPr>
           <p:nvPr/>
         </p:nvCxnSpPr>
         <p:spPr>
           <a:xfrm>
             <a:off x="1661161" y="4765149"/>
-            <a:ext cx="388619" cy="401360"/>
+            <a:ext cx="387257" cy="414784"/>
           </a:xfrm>
           <a:prstGeom prst="straightConnector1">
             <a:avLst/>
@@ -4911,7 +5254,7 @@
         </p:nvSpPr>
         <p:spPr>
           <a:xfrm>
-            <a:off x="3465193" y="4563963"/>
+            <a:off x="3723808" y="4563963"/>
             <a:ext cx="1026795" cy="338554"/>
           </a:xfrm>
           <a:prstGeom prst="rect">
@@ -4951,15 +5294,14 @@
           </p:cNvPr>
           <p:cNvCxnSpPr>
             <a:cxnSpLocks/>
-            <a:stCxn id="55" idx="3"/>
             <a:endCxn id="58" idx="1"/>
           </p:cNvCxnSpPr>
           <p:nvPr/>
         </p:nvCxnSpPr>
         <p:spPr>
           <a:xfrm flipV="1">
-            <a:off x="3076575" y="4733240"/>
-            <a:ext cx="388618" cy="433269"/>
+            <a:off x="3305172" y="4733240"/>
+            <a:ext cx="418636" cy="414725"/>
           </a:xfrm>
           <a:prstGeom prst="straightConnector1">
             <a:avLst/>
@@ -4994,15 +5336,14 @@
           </p:cNvPr>
           <p:cNvCxnSpPr>
             <a:cxnSpLocks/>
-            <a:stCxn id="56" idx="3"/>
             <a:endCxn id="58" idx="1"/>
           </p:cNvCxnSpPr>
           <p:nvPr/>
         </p:nvCxnSpPr>
         <p:spPr>
           <a:xfrm>
-            <a:off x="3076574" y="4363908"/>
-            <a:ext cx="388619" cy="369332"/>
+            <a:off x="3284736" y="4384848"/>
+            <a:ext cx="439072" cy="348392"/>
           </a:xfrm>
           <a:prstGeom prst="straightConnector1">
             <a:avLst/>
@@ -5038,13 +5379,14 @@
           <p:cNvCxnSpPr>
             <a:cxnSpLocks/>
             <a:stCxn id="58" idx="3"/>
+            <a:endCxn id="62" idx="1"/>
           </p:cNvCxnSpPr>
           <p:nvPr/>
         </p:nvCxnSpPr>
         <p:spPr>
-          <a:xfrm>
-            <a:off x="4491988" y="4733240"/>
-            <a:ext cx="621032" cy="15389"/>
+          <a:xfrm flipV="1">
+            <a:off x="4750603" y="4732058"/>
+            <a:ext cx="621032" cy="1182"/>
           </a:xfrm>
           <a:prstGeom prst="straightConnector1">
             <a:avLst/>
@@ -5082,7 +5424,7 @@
         </p:nvSpPr>
         <p:spPr>
           <a:xfrm>
-            <a:off x="5113020" y="4553545"/>
+            <a:off x="5371635" y="4562781"/>
             <a:ext cx="1026795" cy="338554"/>
           </a:xfrm>
           <a:prstGeom prst="rect">
@@ -5123,14 +5465,13 @@
           <p:cNvCxnSpPr>
             <a:cxnSpLocks/>
             <a:stCxn id="53" idx="3"/>
-            <a:endCxn id="56" idx="1"/>
           </p:cNvCxnSpPr>
           <p:nvPr/>
         </p:nvCxnSpPr>
         <p:spPr>
           <a:xfrm flipV="1">
             <a:off x="1661161" y="4363908"/>
-            <a:ext cx="388618" cy="401241"/>
+            <a:ext cx="388619" cy="401241"/>
           </a:xfrm>
           <a:prstGeom prst="straightConnector1">
             <a:avLst/>
@@ -5329,6 +5670,332 @@
               <a:latin typeface="Times New Roman" panose="02020603050405020304" pitchFamily="18" charset="0"/>
               <a:cs typeface="Times New Roman" panose="02020603050405020304" pitchFamily="18" charset="0"/>
             </a:endParaRPr>
+          </a:p>
+        </p:txBody>
+      </p:sp>
+      <p:sp>
+        <p:nvSpPr>
+          <p:cNvPr id="7" name="TextBox 6">
+            <a:extLst>
+              <a:ext uri="{FF2B5EF4-FFF2-40B4-BE49-F238E27FC236}">
+                <a16:creationId xmlns:a16="http://schemas.microsoft.com/office/drawing/2014/main" id="{8CDA5DBE-FF60-1801-BCCB-DDFEE931FAEF}"/>
+              </a:ext>
+            </a:extLst>
+          </p:cNvPr>
+          <p:cNvSpPr txBox="1"/>
+          <p:nvPr/>
+        </p:nvSpPr>
+        <p:spPr>
+          <a:xfrm>
+            <a:off x="2417443" y="250655"/>
+            <a:ext cx="1026795" cy="307777"/>
+          </a:xfrm>
+          <a:prstGeom prst="rect">
+            <a:avLst/>
+          </a:prstGeom>
+          <a:noFill/>
+        </p:spPr>
+        <p:txBody>
+          <a:bodyPr wrap="square" rtlCol="0">
+            <a:spAutoFit/>
+          </a:bodyPr>
+          <a:lstStyle/>
+          <a:p>
+            <a:pPr algn="ctr"/>
+            <a:r>
+              <a:rPr lang="en-US" altLang="ko-KR" sz="1400" dirty="0">
+                <a:latin typeface="Times New Roman" panose="02020603050405020304" pitchFamily="18" charset="0"/>
+                <a:cs typeface="Times New Roman" panose="02020603050405020304" pitchFamily="18" charset="0"/>
+              </a:rPr>
+              <a:t>Content</a:t>
+            </a:r>
+            <a:endParaRPr lang="ko-KR" altLang="en-US" sz="1400" dirty="0">
+              <a:latin typeface="Times New Roman" panose="02020603050405020304" pitchFamily="18" charset="0"/>
+              <a:cs typeface="Times New Roman" panose="02020603050405020304" pitchFamily="18" charset="0"/>
+            </a:endParaRPr>
+          </a:p>
+        </p:txBody>
+      </p:sp>
+      <p:sp>
+        <p:nvSpPr>
+          <p:cNvPr id="45" name="TextBox 44">
+            <a:extLst>
+              <a:ext uri="{FF2B5EF4-FFF2-40B4-BE49-F238E27FC236}">
+                <a16:creationId xmlns:a16="http://schemas.microsoft.com/office/drawing/2014/main" id="{379443EE-A9CD-B705-4A34-B0EC28B9337F}"/>
+              </a:ext>
+            </a:extLst>
+          </p:cNvPr>
+          <p:cNvSpPr txBox="1"/>
+          <p:nvPr/>
+        </p:nvSpPr>
+        <p:spPr>
+          <a:xfrm>
+            <a:off x="2736531" y="99201"/>
+            <a:ext cx="388618" cy="369332"/>
+          </a:xfrm>
+          <a:prstGeom prst="rect">
+            <a:avLst/>
+          </a:prstGeom>
+          <a:noFill/>
+        </p:spPr>
+        <p:txBody>
+          <a:bodyPr wrap="square" rtlCol="0">
+            <a:spAutoFit/>
+          </a:bodyPr>
+          <a:lstStyle/>
+          <a:p>
+            <a:pPr algn="ctr"/>
+            <a:r>
+              <a:rPr lang="en-US" altLang="ko-KR" dirty="0"/>
+              <a:t>~</a:t>
+            </a:r>
+            <a:endParaRPr lang="ko-KR" altLang="en-US" dirty="0"/>
+          </a:p>
+        </p:txBody>
+      </p:sp>
+      <p:sp>
+        <p:nvSpPr>
+          <p:cNvPr id="80" name="TextBox 79">
+            <a:extLst>
+              <a:ext uri="{FF2B5EF4-FFF2-40B4-BE49-F238E27FC236}">
+                <a16:creationId xmlns:a16="http://schemas.microsoft.com/office/drawing/2014/main" id="{59A6268D-ECAE-B3F0-7BA2-FB38127ECD46}"/>
+              </a:ext>
+            </a:extLst>
+          </p:cNvPr>
+          <p:cNvSpPr txBox="1"/>
+          <p:nvPr/>
+        </p:nvSpPr>
+        <p:spPr>
+          <a:xfrm>
+            <a:off x="2067324" y="2434874"/>
+            <a:ext cx="570547" cy="307777"/>
+          </a:xfrm>
+          <a:prstGeom prst="rect">
+            <a:avLst/>
+          </a:prstGeom>
+          <a:noFill/>
+        </p:spPr>
+        <p:txBody>
+          <a:bodyPr wrap="square" rtlCol="0">
+            <a:spAutoFit/>
+          </a:bodyPr>
+          <a:lstStyle/>
+          <a:p>
+            <a:pPr algn="ctr"/>
+            <a:r>
+              <a:rPr lang="en-US" altLang="ko-KR" sz="1400" dirty="0">
+                <a:latin typeface="Times New Roman" panose="02020603050405020304" pitchFamily="18" charset="0"/>
+                <a:cs typeface="Times New Roman" panose="02020603050405020304" pitchFamily="18" charset="0"/>
+              </a:rPr>
+              <a:t>Style</a:t>
+            </a:r>
+            <a:endParaRPr lang="ko-KR" altLang="en-US" sz="1400" dirty="0">
+              <a:latin typeface="Times New Roman" panose="02020603050405020304" pitchFamily="18" charset="0"/>
+              <a:cs typeface="Times New Roman" panose="02020603050405020304" pitchFamily="18" charset="0"/>
+            </a:endParaRPr>
+          </a:p>
+        </p:txBody>
+      </p:sp>
+      <p:sp>
+        <p:nvSpPr>
+          <p:cNvPr id="81" name="TextBox 80">
+            <a:extLst>
+              <a:ext uri="{FF2B5EF4-FFF2-40B4-BE49-F238E27FC236}">
+                <a16:creationId xmlns:a16="http://schemas.microsoft.com/office/drawing/2014/main" id="{DB29BC6F-68BB-82D1-D763-1CAE6463175D}"/>
+              </a:ext>
+            </a:extLst>
+          </p:cNvPr>
+          <p:cNvSpPr txBox="1"/>
+          <p:nvPr/>
+        </p:nvSpPr>
+        <p:spPr>
+          <a:xfrm>
+            <a:off x="2407281" y="2426139"/>
+            <a:ext cx="1026795" cy="307777"/>
+          </a:xfrm>
+          <a:prstGeom prst="rect">
+            <a:avLst/>
+          </a:prstGeom>
+          <a:noFill/>
+        </p:spPr>
+        <p:txBody>
+          <a:bodyPr wrap="square" rtlCol="0">
+            <a:spAutoFit/>
+          </a:bodyPr>
+          <a:lstStyle/>
+          <a:p>
+            <a:pPr algn="ctr"/>
+            <a:r>
+              <a:rPr lang="en-US" altLang="ko-KR" sz="1400" dirty="0">
+                <a:latin typeface="Times New Roman" panose="02020603050405020304" pitchFamily="18" charset="0"/>
+                <a:cs typeface="Times New Roman" panose="02020603050405020304" pitchFamily="18" charset="0"/>
+              </a:rPr>
+              <a:t>Content</a:t>
+            </a:r>
+            <a:endParaRPr lang="ko-KR" altLang="en-US" sz="1400" dirty="0">
+              <a:latin typeface="Times New Roman" panose="02020603050405020304" pitchFamily="18" charset="0"/>
+              <a:cs typeface="Times New Roman" panose="02020603050405020304" pitchFamily="18" charset="0"/>
+            </a:endParaRPr>
+          </a:p>
+        </p:txBody>
+      </p:sp>
+      <p:sp>
+        <p:nvSpPr>
+          <p:cNvPr id="82" name="TextBox 81">
+            <a:extLst>
+              <a:ext uri="{FF2B5EF4-FFF2-40B4-BE49-F238E27FC236}">
+                <a16:creationId xmlns:a16="http://schemas.microsoft.com/office/drawing/2014/main" id="{44F66200-7485-F3DF-B80F-7EF09795E046}"/>
+              </a:ext>
+            </a:extLst>
+          </p:cNvPr>
+          <p:cNvSpPr txBox="1"/>
+          <p:nvPr/>
+        </p:nvSpPr>
+        <p:spPr>
+          <a:xfrm>
+            <a:off x="2726369" y="2293157"/>
+            <a:ext cx="388618" cy="369332"/>
+          </a:xfrm>
+          <a:prstGeom prst="rect">
+            <a:avLst/>
+          </a:prstGeom>
+          <a:noFill/>
+        </p:spPr>
+        <p:txBody>
+          <a:bodyPr wrap="square" rtlCol="0">
+            <a:spAutoFit/>
+          </a:bodyPr>
+          <a:lstStyle/>
+          <a:p>
+            <a:pPr algn="ctr"/>
+            <a:r>
+              <a:rPr lang="en-US" altLang="ko-KR" dirty="0"/>
+              <a:t>~</a:t>
+            </a:r>
+            <a:endParaRPr lang="ko-KR" altLang="en-US" dirty="0"/>
+          </a:p>
+        </p:txBody>
+      </p:sp>
+      <p:sp>
+        <p:nvSpPr>
+          <p:cNvPr id="83" name="TextBox 82">
+            <a:extLst>
+              <a:ext uri="{FF2B5EF4-FFF2-40B4-BE49-F238E27FC236}">
+                <a16:creationId xmlns:a16="http://schemas.microsoft.com/office/drawing/2014/main" id="{74C9F1C4-BB1A-9E65-BFD0-E0F446AFB8AC}"/>
+              </a:ext>
+            </a:extLst>
+          </p:cNvPr>
+          <p:cNvSpPr txBox="1"/>
+          <p:nvPr/>
+        </p:nvSpPr>
+        <p:spPr>
+          <a:xfrm>
+            <a:off x="2048418" y="4226179"/>
+            <a:ext cx="570547" cy="307777"/>
+          </a:xfrm>
+          <a:prstGeom prst="rect">
+            <a:avLst/>
+          </a:prstGeom>
+          <a:noFill/>
+        </p:spPr>
+        <p:txBody>
+          <a:bodyPr wrap="square" rtlCol="0">
+            <a:spAutoFit/>
+          </a:bodyPr>
+          <a:lstStyle/>
+          <a:p>
+            <a:pPr algn="ctr"/>
+            <a:r>
+              <a:rPr lang="en-US" altLang="ko-KR" sz="1400" dirty="0">
+                <a:latin typeface="Times New Roman" panose="02020603050405020304" pitchFamily="18" charset="0"/>
+                <a:cs typeface="Times New Roman" panose="02020603050405020304" pitchFamily="18" charset="0"/>
+              </a:rPr>
+              <a:t>Style</a:t>
+            </a:r>
+            <a:endParaRPr lang="ko-KR" altLang="en-US" sz="1400" dirty="0">
+              <a:latin typeface="Times New Roman" panose="02020603050405020304" pitchFamily="18" charset="0"/>
+              <a:cs typeface="Times New Roman" panose="02020603050405020304" pitchFamily="18" charset="0"/>
+            </a:endParaRPr>
+          </a:p>
+        </p:txBody>
+      </p:sp>
+      <p:sp>
+        <p:nvSpPr>
+          <p:cNvPr id="84" name="TextBox 83">
+            <a:extLst>
+              <a:ext uri="{FF2B5EF4-FFF2-40B4-BE49-F238E27FC236}">
+                <a16:creationId xmlns:a16="http://schemas.microsoft.com/office/drawing/2014/main" id="{DEF93DEE-A810-60BA-691A-48CB9B7F24AA}"/>
+              </a:ext>
+            </a:extLst>
+          </p:cNvPr>
+          <p:cNvSpPr txBox="1"/>
+          <p:nvPr/>
+        </p:nvSpPr>
+        <p:spPr>
+          <a:xfrm>
+            <a:off x="2388375" y="4235916"/>
+            <a:ext cx="1026795" cy="307777"/>
+          </a:xfrm>
+          <a:prstGeom prst="rect">
+            <a:avLst/>
+          </a:prstGeom>
+          <a:noFill/>
+        </p:spPr>
+        <p:txBody>
+          <a:bodyPr wrap="square" rtlCol="0">
+            <a:spAutoFit/>
+          </a:bodyPr>
+          <a:lstStyle/>
+          <a:p>
+            <a:pPr algn="ctr"/>
+            <a:r>
+              <a:rPr lang="en-US" altLang="ko-KR" sz="1400" dirty="0">
+                <a:latin typeface="Times New Roman" panose="02020603050405020304" pitchFamily="18" charset="0"/>
+                <a:cs typeface="Times New Roman" panose="02020603050405020304" pitchFamily="18" charset="0"/>
+              </a:rPr>
+              <a:t>Content</a:t>
+            </a:r>
+            <a:endParaRPr lang="ko-KR" altLang="en-US" sz="1400" dirty="0">
+              <a:latin typeface="Times New Roman" panose="02020603050405020304" pitchFamily="18" charset="0"/>
+              <a:cs typeface="Times New Roman" panose="02020603050405020304" pitchFamily="18" charset="0"/>
+            </a:endParaRPr>
+          </a:p>
+        </p:txBody>
+      </p:sp>
+      <p:sp>
+        <p:nvSpPr>
+          <p:cNvPr id="85" name="TextBox 84">
+            <a:extLst>
+              <a:ext uri="{FF2B5EF4-FFF2-40B4-BE49-F238E27FC236}">
+                <a16:creationId xmlns:a16="http://schemas.microsoft.com/office/drawing/2014/main" id="{7A3AA810-3FFF-216D-6285-CF16FA59F626}"/>
+              </a:ext>
+            </a:extLst>
+          </p:cNvPr>
+          <p:cNvSpPr txBox="1"/>
+          <p:nvPr/>
+        </p:nvSpPr>
+        <p:spPr>
+          <a:xfrm>
+            <a:off x="2707463" y="4084462"/>
+            <a:ext cx="388618" cy="369332"/>
+          </a:xfrm>
+          <a:prstGeom prst="rect">
+            <a:avLst/>
+          </a:prstGeom>
+          <a:noFill/>
+        </p:spPr>
+        <p:txBody>
+          <a:bodyPr wrap="square" rtlCol="0">
+            <a:spAutoFit/>
+          </a:bodyPr>
+          <a:lstStyle/>
+          <a:p>
+            <a:pPr algn="ctr"/>
+            <a:r>
+              <a:rPr lang="en-US" altLang="ko-KR" dirty="0"/>
+              <a:t>~</a:t>
+            </a:r>
+            <a:endParaRPr lang="ko-KR" altLang="en-US" dirty="0"/>
           </a:p>
         </p:txBody>
       </p:sp>
@@ -5658,4 +6325,319 @@
     </a:ext>
   </a:extLst>
 </a:theme>
+</file>
+
+<file path=ppt/theme/theme2.xml><?xml version="1.0" encoding="utf-8"?>
+<a:theme xmlns:a="http://schemas.openxmlformats.org/drawingml/2006/main" name="Office 테마">
+  <a:themeElements>
+    <a:clrScheme name="Office">
+      <a:dk1>
+        <a:sysClr val="windowText" lastClr="000000"/>
+      </a:dk1>
+      <a:lt1>
+        <a:sysClr val="window" lastClr="FFFFFF"/>
+      </a:lt1>
+      <a:dk2>
+        <a:srgbClr val="0E2841"/>
+      </a:dk2>
+      <a:lt2>
+        <a:srgbClr val="E8E8E8"/>
+      </a:lt2>
+      <a:accent1>
+        <a:srgbClr val="156082"/>
+      </a:accent1>
+      <a:accent2>
+        <a:srgbClr val="E97132"/>
+      </a:accent2>
+      <a:accent3>
+        <a:srgbClr val="196B24"/>
+      </a:accent3>
+      <a:accent4>
+        <a:srgbClr val="0F9ED5"/>
+      </a:accent4>
+      <a:accent5>
+        <a:srgbClr val="A02B93"/>
+      </a:accent5>
+      <a:accent6>
+        <a:srgbClr val="4EA72E"/>
+      </a:accent6>
+      <a:hlink>
+        <a:srgbClr val="467886"/>
+      </a:hlink>
+      <a:folHlink>
+        <a:srgbClr val="96607D"/>
+      </a:folHlink>
+    </a:clrScheme>
+    <a:fontScheme name="Office">
+      <a:majorFont>
+        <a:latin typeface="맑은 고딕" panose="02110004020202020204"/>
+        <a:ea typeface=""/>
+        <a:cs typeface=""/>
+        <a:font script="Jpan" typeface="游ゴシック Light"/>
+        <a:font script="Hang" typeface="맑은 고딕"/>
+        <a:font script="Hans" typeface="等线 Light"/>
+        <a:font script="Hant" typeface="新細明體"/>
+        <a:font script="Arab" typeface="Times New Roman"/>
+        <a:font script="Hebr" typeface="Times New Roman"/>
+        <a:font script="Thai" typeface="Angsana New"/>
+        <a:font script="Ethi" typeface="Nyala"/>
+        <a:font script="Beng" typeface="Vrinda"/>
+        <a:font script="Gujr" typeface="Shruti"/>
+        <a:font script="Khmr" typeface="MoolBoran"/>
+        <a:font script="Knda" typeface="Tunga"/>
+        <a:font script="Guru" typeface="Raavi"/>
+        <a:font script="Cans" typeface="Euphemia"/>
+        <a:font script="Cher" typeface="Plantagenet Cherokee"/>
+        <a:font script="Yiii" typeface="Microsoft Yi Baiti"/>
+        <a:font script="Tibt" typeface="Microsoft Himalaya"/>
+        <a:font script="Thaa" typeface="MV Boli"/>
+        <a:font script="Deva" typeface="Mangal"/>
+        <a:font script="Telu" typeface="Gautami"/>
+        <a:font script="Taml" typeface="Latha"/>
+        <a:font script="Syrc" typeface="Estrangelo Edessa"/>
+        <a:font script="Orya" typeface="Kalinga"/>
+        <a:font script="Mlym" typeface="Kartika"/>
+        <a:font script="Laoo" typeface="DokChampa"/>
+        <a:font script="Sinh" typeface="Iskoola Pota"/>
+        <a:font script="Mong" typeface="Mongolian Baiti"/>
+        <a:font script="Viet" typeface="Times New Roman"/>
+        <a:font script="Uigh" typeface="Microsoft Uighur"/>
+        <a:font script="Geor" typeface="Sylfaen"/>
+        <a:font script="Armn" typeface="Arial"/>
+        <a:font script="Bugi" typeface="Leelawadee UI"/>
+        <a:font script="Bopo" typeface="Microsoft JhengHei"/>
+        <a:font script="Java" typeface="Javanese Text"/>
+        <a:font script="Lisu" typeface="Segoe UI"/>
+        <a:font script="Mymr" typeface="Myanmar Text"/>
+        <a:font script="Nkoo" typeface="Ebrima"/>
+        <a:font script="Olck" typeface="Nirmala UI"/>
+        <a:font script="Osma" typeface="Ebrima"/>
+        <a:font script="Phag" typeface="Phagspa"/>
+        <a:font script="Syrn" typeface="Estrangelo Edessa"/>
+        <a:font script="Syrj" typeface="Estrangelo Edessa"/>
+        <a:font script="Syre" typeface="Estrangelo Edessa"/>
+        <a:font script="Sora" typeface="Nirmala UI"/>
+        <a:font script="Tale" typeface="Microsoft Tai Le"/>
+        <a:font script="Talu" typeface="Microsoft New Tai Lue"/>
+        <a:font script="Tfng" typeface="Ebrima"/>
+      </a:majorFont>
+      <a:minorFont>
+        <a:latin typeface="맑은 고딕" panose="02110004020202020204"/>
+        <a:ea typeface=""/>
+        <a:cs typeface=""/>
+        <a:font script="Jpan" typeface="游ゴシック"/>
+        <a:font script="Hang" typeface="맑은 고딕"/>
+        <a:font script="Hans" typeface="等线"/>
+        <a:font script="Hant" typeface="新細明體"/>
+        <a:font script="Arab" typeface="Arial"/>
+        <a:font script="Hebr" typeface="Arial"/>
+        <a:font script="Thai" typeface="Cordia New"/>
+        <a:font script="Ethi" typeface="Nyala"/>
+        <a:font script="Beng" typeface="Vrinda"/>
+        <a:font script="Gujr" typeface="Shruti"/>
+        <a:font script="Khmr" typeface="DaunPenh"/>
+        <a:font script="Knda" typeface="Tunga"/>
+        <a:font script="Guru" typeface="Raavi"/>
+        <a:font script="Cans" typeface="Euphemia"/>
+        <a:font script="Cher" typeface="Plantagenet Cherokee"/>
+        <a:font script="Yiii" typeface="Microsoft Yi Baiti"/>
+        <a:font script="Tibt" typeface="Microsoft Himalaya"/>
+        <a:font script="Thaa" typeface="MV Boli"/>
+        <a:font script="Deva" typeface="Mangal"/>
+        <a:font script="Telu" typeface="Gautami"/>
+        <a:font script="Taml" typeface="Latha"/>
+        <a:font script="Syrc" typeface="Estrangelo Edessa"/>
+        <a:font script="Orya" typeface="Kalinga"/>
+        <a:font script="Mlym" typeface="Kartika"/>
+        <a:font script="Laoo" typeface="DokChampa"/>
+        <a:font script="Sinh" typeface="Iskoola Pota"/>
+        <a:font script="Mong" typeface="Mongolian Baiti"/>
+        <a:font script="Viet" typeface="Arial"/>
+        <a:font script="Uigh" typeface="Microsoft Uighur"/>
+        <a:font script="Geor" typeface="Sylfaen"/>
+        <a:font script="Armn" typeface="Arial"/>
+        <a:font script="Bugi" typeface="Leelawadee UI"/>
+        <a:font script="Bopo" typeface="Microsoft JhengHei"/>
+        <a:font script="Java" typeface="Javanese Text"/>
+        <a:font script="Lisu" typeface="Segoe UI"/>
+        <a:font script="Mymr" typeface="Myanmar Text"/>
+        <a:font script="Nkoo" typeface="Ebrima"/>
+        <a:font script="Olck" typeface="Nirmala UI"/>
+        <a:font script="Osma" typeface="Ebrima"/>
+        <a:font script="Phag" typeface="Phagspa"/>
+        <a:font script="Syrn" typeface="Estrangelo Edessa"/>
+        <a:font script="Syrj" typeface="Estrangelo Edessa"/>
+        <a:font script="Syre" typeface="Estrangelo Edessa"/>
+        <a:font script="Sora" typeface="Nirmala UI"/>
+        <a:font script="Tale" typeface="Microsoft Tai Le"/>
+        <a:font script="Talu" typeface="Microsoft New Tai Lue"/>
+        <a:font script="Tfng" typeface="Ebrima"/>
+      </a:minorFont>
+    </a:fontScheme>
+    <a:fmtScheme name="Office">
+      <a:fillStyleLst>
+        <a:solidFill>
+          <a:schemeClr val="phClr"/>
+        </a:solidFill>
+        <a:gradFill rotWithShape="1">
+          <a:gsLst>
+            <a:gs pos="0">
+              <a:schemeClr val="phClr">
+                <a:lumMod val="110000"/>
+                <a:satMod val="105000"/>
+                <a:tint val="67000"/>
+              </a:schemeClr>
+            </a:gs>
+            <a:gs pos="50000">
+              <a:schemeClr val="phClr">
+                <a:lumMod val="105000"/>
+                <a:satMod val="103000"/>
+                <a:tint val="73000"/>
+              </a:schemeClr>
+            </a:gs>
+            <a:gs pos="100000">
+              <a:schemeClr val="phClr">
+                <a:lumMod val="105000"/>
+                <a:satMod val="109000"/>
+                <a:tint val="81000"/>
+              </a:schemeClr>
+            </a:gs>
+          </a:gsLst>
+          <a:lin ang="5400000" scaled="0"/>
+        </a:gradFill>
+        <a:gradFill rotWithShape="1">
+          <a:gsLst>
+            <a:gs pos="0">
+              <a:schemeClr val="phClr">
+                <a:satMod val="103000"/>
+                <a:lumMod val="102000"/>
+                <a:tint val="94000"/>
+              </a:schemeClr>
+            </a:gs>
+            <a:gs pos="50000">
+              <a:schemeClr val="phClr">
+                <a:satMod val="110000"/>
+                <a:lumMod val="100000"/>
+                <a:shade val="100000"/>
+              </a:schemeClr>
+            </a:gs>
+            <a:gs pos="100000">
+              <a:schemeClr val="phClr">
+                <a:lumMod val="99000"/>
+                <a:satMod val="120000"/>
+                <a:shade val="78000"/>
+              </a:schemeClr>
+            </a:gs>
+          </a:gsLst>
+          <a:lin ang="5400000" scaled="0"/>
+        </a:gradFill>
+      </a:fillStyleLst>
+      <a:lnStyleLst>
+        <a:ln w="12700" cap="flat" cmpd="sng" algn="ctr">
+          <a:solidFill>
+            <a:schemeClr val="phClr"/>
+          </a:solidFill>
+          <a:prstDash val="solid"/>
+          <a:miter lim="800000"/>
+        </a:ln>
+        <a:ln w="19050" cap="flat" cmpd="sng" algn="ctr">
+          <a:solidFill>
+            <a:schemeClr val="phClr"/>
+          </a:solidFill>
+          <a:prstDash val="solid"/>
+          <a:miter lim="800000"/>
+        </a:ln>
+        <a:ln w="25400" cap="flat" cmpd="sng" algn="ctr">
+          <a:solidFill>
+            <a:schemeClr val="phClr"/>
+          </a:solidFill>
+          <a:prstDash val="solid"/>
+          <a:miter lim="800000"/>
+        </a:ln>
+      </a:lnStyleLst>
+      <a:effectStyleLst>
+        <a:effectStyle>
+          <a:effectLst/>
+        </a:effectStyle>
+        <a:effectStyle>
+          <a:effectLst/>
+        </a:effectStyle>
+        <a:effectStyle>
+          <a:effectLst>
+            <a:outerShdw blurRad="57150" dist="19050" dir="5400000" algn="ctr" rotWithShape="0">
+              <a:srgbClr val="000000">
+                <a:alpha val="63000"/>
+              </a:srgbClr>
+            </a:outerShdw>
+          </a:effectLst>
+        </a:effectStyle>
+      </a:effectStyleLst>
+      <a:bgFillStyleLst>
+        <a:solidFill>
+          <a:schemeClr val="phClr"/>
+        </a:solidFill>
+        <a:solidFill>
+          <a:schemeClr val="phClr">
+            <a:tint val="95000"/>
+            <a:satMod val="170000"/>
+          </a:schemeClr>
+        </a:solidFill>
+        <a:gradFill rotWithShape="1">
+          <a:gsLst>
+            <a:gs pos="0">
+              <a:schemeClr val="phClr">
+                <a:tint val="93000"/>
+                <a:satMod val="150000"/>
+                <a:shade val="98000"/>
+                <a:lumMod val="102000"/>
+              </a:schemeClr>
+            </a:gs>
+            <a:gs pos="50000">
+              <a:schemeClr val="phClr">
+                <a:tint val="98000"/>
+                <a:satMod val="130000"/>
+                <a:shade val="90000"/>
+                <a:lumMod val="103000"/>
+              </a:schemeClr>
+            </a:gs>
+            <a:gs pos="100000">
+              <a:schemeClr val="phClr">
+                <a:shade val="63000"/>
+                <a:satMod val="120000"/>
+              </a:schemeClr>
+            </a:gs>
+          </a:gsLst>
+          <a:lin ang="5400000" scaled="0"/>
+        </a:gradFill>
+      </a:bgFillStyleLst>
+    </a:fmtScheme>
+  </a:themeElements>
+  <a:objectDefaults>
+    <a:lnDef>
+      <a:spPr/>
+      <a:bodyPr/>
+      <a:lstStyle/>
+      <a:style>
+        <a:lnRef idx="2">
+          <a:schemeClr val="accent1"/>
+        </a:lnRef>
+        <a:fillRef idx="0">
+          <a:schemeClr val="accent1"/>
+        </a:fillRef>
+        <a:effectRef idx="1">
+          <a:schemeClr val="accent1"/>
+        </a:effectRef>
+        <a:fontRef idx="minor">
+          <a:schemeClr val="tx1"/>
+        </a:fontRef>
+      </a:style>
+    </a:lnDef>
+  </a:objectDefaults>
+  <a:extraClrSchemeLst/>
+  <a:extLst>
+    <a:ext uri="{05A4C25C-085E-4340-85A3-A5531E510DB2}">
+      <thm15:themeFamily xmlns:thm15="http://schemas.microsoft.com/office/thememl/2012/main" name="Office Theme" id="{2E142A2C-CD16-42D6-873A-C26D2A0506FA}" vid="{1BDDFF52-6CD6-40A5-AB3C-68EB2F1E4D0A}"/>
+    </a:ext>
+  </a:extLst>
+</a:theme>
 </file>
</xml_diff>

<commit_message>
FIX:Change the architecture of model
</commit_message>
<xml_diff>
--- a/figure/real2sim_architecture.pptx
+++ b/figure/real2sim_architecture.pptx
@@ -197,7 +197,7 @@
           <a:p>
             <a:fld id="{87984234-178A-4616-AC06-773C26F0E1DF}" type="datetimeFigureOut">
               <a:rPr lang="ko-KR" altLang="en-US" smtClean="0"/>
-              <a:t>2025-04-15</a:t>
+              <a:t>2025-04-21</a:t>
             </a:fld>
             <a:endParaRPr lang="ko-KR" altLang="en-US"/>
           </a:p>
@@ -695,7 +695,7 @@
           <a:p>
             <a:fld id="{46BC883B-AFC6-4F1C-88E4-545B165E671D}" type="datetimeFigureOut">
               <a:rPr lang="ko-KR" altLang="en-US" smtClean="0"/>
-              <a:t>2025-04-15</a:t>
+              <a:t>2025-04-21</a:t>
             </a:fld>
             <a:endParaRPr lang="ko-KR" altLang="en-US"/>
           </a:p>
@@ -893,7 +893,7 @@
           <a:p>
             <a:fld id="{46BC883B-AFC6-4F1C-88E4-545B165E671D}" type="datetimeFigureOut">
               <a:rPr lang="ko-KR" altLang="en-US" smtClean="0"/>
-              <a:t>2025-04-15</a:t>
+              <a:t>2025-04-21</a:t>
             </a:fld>
             <a:endParaRPr lang="ko-KR" altLang="en-US"/>
           </a:p>
@@ -1101,7 +1101,7 @@
           <a:p>
             <a:fld id="{46BC883B-AFC6-4F1C-88E4-545B165E671D}" type="datetimeFigureOut">
               <a:rPr lang="ko-KR" altLang="en-US" smtClean="0"/>
-              <a:t>2025-04-15</a:t>
+              <a:t>2025-04-21</a:t>
             </a:fld>
             <a:endParaRPr lang="ko-KR" altLang="en-US"/>
           </a:p>
@@ -1299,7 +1299,7 @@
           <a:p>
             <a:fld id="{46BC883B-AFC6-4F1C-88E4-545B165E671D}" type="datetimeFigureOut">
               <a:rPr lang="ko-KR" altLang="en-US" smtClean="0"/>
-              <a:t>2025-04-15</a:t>
+              <a:t>2025-04-21</a:t>
             </a:fld>
             <a:endParaRPr lang="ko-KR" altLang="en-US"/>
           </a:p>
@@ -1574,7 +1574,7 @@
           <a:p>
             <a:fld id="{46BC883B-AFC6-4F1C-88E4-545B165E671D}" type="datetimeFigureOut">
               <a:rPr lang="ko-KR" altLang="en-US" smtClean="0"/>
-              <a:t>2025-04-15</a:t>
+              <a:t>2025-04-21</a:t>
             </a:fld>
             <a:endParaRPr lang="ko-KR" altLang="en-US"/>
           </a:p>
@@ -1839,7 +1839,7 @@
           <a:p>
             <a:fld id="{46BC883B-AFC6-4F1C-88E4-545B165E671D}" type="datetimeFigureOut">
               <a:rPr lang="ko-KR" altLang="en-US" smtClean="0"/>
-              <a:t>2025-04-15</a:t>
+              <a:t>2025-04-21</a:t>
             </a:fld>
             <a:endParaRPr lang="ko-KR" altLang="en-US"/>
           </a:p>
@@ -2251,7 +2251,7 @@
           <a:p>
             <a:fld id="{46BC883B-AFC6-4F1C-88E4-545B165E671D}" type="datetimeFigureOut">
               <a:rPr lang="ko-KR" altLang="en-US" smtClean="0"/>
-              <a:t>2025-04-15</a:t>
+              <a:t>2025-04-21</a:t>
             </a:fld>
             <a:endParaRPr lang="ko-KR" altLang="en-US"/>
           </a:p>
@@ -2392,7 +2392,7 @@
           <a:p>
             <a:fld id="{46BC883B-AFC6-4F1C-88E4-545B165E671D}" type="datetimeFigureOut">
               <a:rPr lang="ko-KR" altLang="en-US" smtClean="0"/>
-              <a:t>2025-04-15</a:t>
+              <a:t>2025-04-21</a:t>
             </a:fld>
             <a:endParaRPr lang="ko-KR" altLang="en-US"/>
           </a:p>
@@ -2505,7 +2505,7 @@
           <a:p>
             <a:fld id="{46BC883B-AFC6-4F1C-88E4-545B165E671D}" type="datetimeFigureOut">
               <a:rPr lang="ko-KR" altLang="en-US" smtClean="0"/>
-              <a:t>2025-04-15</a:t>
+              <a:t>2025-04-21</a:t>
             </a:fld>
             <a:endParaRPr lang="ko-KR" altLang="en-US"/>
           </a:p>
@@ -2816,7 +2816,7 @@
           <a:p>
             <a:fld id="{46BC883B-AFC6-4F1C-88E4-545B165E671D}" type="datetimeFigureOut">
               <a:rPr lang="ko-KR" altLang="en-US" smtClean="0"/>
-              <a:t>2025-04-15</a:t>
+              <a:t>2025-04-21</a:t>
             </a:fld>
             <a:endParaRPr lang="ko-KR" altLang="en-US"/>
           </a:p>
@@ -3104,7 +3104,7 @@
           <a:p>
             <a:fld id="{46BC883B-AFC6-4F1C-88E4-545B165E671D}" type="datetimeFigureOut">
               <a:rPr lang="ko-KR" altLang="en-US" smtClean="0"/>
-              <a:t>2025-04-15</a:t>
+              <a:t>2025-04-21</a:t>
             </a:fld>
             <a:endParaRPr lang="ko-KR" altLang="en-US"/>
           </a:p>
@@ -3345,7 +3345,7 @@
           <a:p>
             <a:fld id="{46BC883B-AFC6-4F1C-88E4-545B165E671D}" type="datetimeFigureOut">
               <a:rPr lang="ko-KR" altLang="en-US" smtClean="0"/>
-              <a:t>2025-04-15</a:t>
+              <a:t>2025-04-21</a:t>
             </a:fld>
             <a:endParaRPr lang="ko-KR" altLang="en-US"/>
           </a:p>
@@ -3764,10 +3764,217 @@
       </p:grpSpPr>
       <p:sp>
         <p:nvSpPr>
-          <p:cNvPr id="15" name="사각형: 둥근 모서리 14">
-            <a:extLst>
-              <a:ext uri="{FF2B5EF4-FFF2-40B4-BE49-F238E27FC236}">
-                <a16:creationId xmlns:a16="http://schemas.microsoft.com/office/drawing/2014/main" id="{E7D02F6B-6C2F-CCE0-4D0A-1C4F6D8169DF}"/>
+          <p:cNvPr id="4" name="TextBox 3">
+            <a:extLst>
+              <a:ext uri="{FF2B5EF4-FFF2-40B4-BE49-F238E27FC236}">
+                <a16:creationId xmlns:a16="http://schemas.microsoft.com/office/drawing/2014/main" id="{FE86DF2E-C556-B05F-CB7C-303EF0AC27CB}"/>
+              </a:ext>
+            </a:extLst>
+          </p:cNvPr>
+          <p:cNvSpPr txBox="1"/>
+          <p:nvPr/>
+        </p:nvSpPr>
+        <p:spPr>
+          <a:xfrm>
+            <a:off x="643602" y="1892701"/>
+            <a:ext cx="1026795" cy="338554"/>
+          </a:xfrm>
+          <a:prstGeom prst="rect">
+            <a:avLst/>
+          </a:prstGeom>
+          <a:noFill/>
+        </p:spPr>
+        <p:txBody>
+          <a:bodyPr wrap="square" rtlCol="0">
+            <a:spAutoFit/>
+          </a:bodyPr>
+          <a:lstStyle/>
+          <a:p>
+            <a:pPr algn="ctr"/>
+            <a:r>
+              <a:rPr lang="en-US" altLang="ko-KR" sz="1600" dirty="0">
+                <a:latin typeface="Times New Roman" panose="02020603050405020304" pitchFamily="18" charset="0"/>
+                <a:cs typeface="Times New Roman" panose="02020603050405020304" pitchFamily="18" charset="0"/>
+              </a:rPr>
+              <a:t>Sim data</a:t>
+            </a:r>
+            <a:endParaRPr lang="ko-KR" altLang="en-US" sz="1600" dirty="0">
+              <a:latin typeface="Times New Roman" panose="02020603050405020304" pitchFamily="18" charset="0"/>
+              <a:cs typeface="Times New Roman" panose="02020603050405020304" pitchFamily="18" charset="0"/>
+            </a:endParaRPr>
+          </a:p>
+        </p:txBody>
+      </p:sp>
+      <p:cxnSp>
+        <p:nvCxnSpPr>
+          <p:cNvPr id="6" name="직선 화살표 연결선 5">
+            <a:extLst>
+              <a:ext uri="{FF2B5EF4-FFF2-40B4-BE49-F238E27FC236}">
+                <a16:creationId xmlns:a16="http://schemas.microsoft.com/office/drawing/2014/main" id="{45F79815-B6C9-3C89-F74A-839BE159800E}"/>
+              </a:ext>
+            </a:extLst>
+          </p:cNvPr>
+          <p:cNvCxnSpPr>
+            <a:cxnSpLocks/>
+            <a:stCxn id="4" idx="3"/>
+            <a:endCxn id="10" idx="1"/>
+          </p:cNvCxnSpPr>
+          <p:nvPr/>
+        </p:nvCxnSpPr>
+        <p:spPr>
+          <a:xfrm flipV="1">
+            <a:off x="1670397" y="2057524"/>
+            <a:ext cx="534668" cy="4454"/>
+          </a:xfrm>
+          <a:prstGeom prst="straightConnector1">
+            <a:avLst/>
+          </a:prstGeom>
+          <a:ln>
+            <a:tailEnd type="triangle"/>
+          </a:ln>
+        </p:spPr>
+        <p:style>
+          <a:lnRef idx="2">
+            <a:schemeClr val="accent1"/>
+          </a:lnRef>
+          <a:fillRef idx="0">
+            <a:schemeClr val="accent1"/>
+          </a:fillRef>
+          <a:effectRef idx="1">
+            <a:schemeClr val="accent1"/>
+          </a:effectRef>
+          <a:fontRef idx="minor">
+            <a:schemeClr val="tx1"/>
+          </a:fontRef>
+        </p:style>
+      </p:cxnSp>
+      <p:sp>
+        <p:nvSpPr>
+          <p:cNvPr id="14" name="TextBox 13">
+            <a:extLst>
+              <a:ext uri="{FF2B5EF4-FFF2-40B4-BE49-F238E27FC236}">
+                <a16:creationId xmlns:a16="http://schemas.microsoft.com/office/drawing/2014/main" id="{771DD834-BD48-281C-2963-99E286EA1660}"/>
+              </a:ext>
+            </a:extLst>
+          </p:cNvPr>
+          <p:cNvSpPr txBox="1"/>
+          <p:nvPr/>
+        </p:nvSpPr>
+        <p:spPr>
+          <a:xfrm>
+            <a:off x="4531704" y="1765136"/>
+            <a:ext cx="1026795" cy="584775"/>
+          </a:xfrm>
+          <a:prstGeom prst="rect">
+            <a:avLst/>
+          </a:prstGeom>
+          <a:noFill/>
+          <a:ln>
+            <a:solidFill>
+              <a:schemeClr val="tx1"/>
+            </a:solidFill>
+          </a:ln>
+        </p:spPr>
+        <p:txBody>
+          <a:bodyPr wrap="square" rtlCol="0">
+            <a:spAutoFit/>
+          </a:bodyPr>
+          <a:lstStyle/>
+          <a:p>
+            <a:pPr algn="ctr"/>
+            <a:r>
+              <a:rPr lang="en-US" altLang="ko-KR" sz="1600" dirty="0">
+                <a:latin typeface="Times New Roman" panose="02020603050405020304" pitchFamily="18" charset="0"/>
+                <a:cs typeface="Times New Roman" panose="02020603050405020304" pitchFamily="18" charset="0"/>
+              </a:rPr>
+              <a:t>Latent vector</a:t>
+            </a:r>
+            <a:endParaRPr lang="ko-KR" altLang="en-US" sz="1600" dirty="0">
+              <a:latin typeface="Times New Roman" panose="02020603050405020304" pitchFamily="18" charset="0"/>
+              <a:cs typeface="Times New Roman" panose="02020603050405020304" pitchFamily="18" charset="0"/>
+            </a:endParaRPr>
+          </a:p>
+        </p:txBody>
+      </p:sp>
+      <p:sp>
+        <p:nvSpPr>
+          <p:cNvPr id="26" name="TextBox 25">
+            <a:extLst>
+              <a:ext uri="{FF2B5EF4-FFF2-40B4-BE49-F238E27FC236}">
+                <a16:creationId xmlns:a16="http://schemas.microsoft.com/office/drawing/2014/main" id="{09AB6E70-F803-A7A6-E4E0-8A93881A86D5}"/>
+              </a:ext>
+            </a:extLst>
+          </p:cNvPr>
+          <p:cNvSpPr txBox="1"/>
+          <p:nvPr/>
+        </p:nvSpPr>
+        <p:spPr>
+          <a:xfrm>
+            <a:off x="8088404" y="3213768"/>
+            <a:ext cx="1026795" cy="338554"/>
+          </a:xfrm>
+          <a:prstGeom prst="rect">
+            <a:avLst/>
+          </a:prstGeom>
+          <a:noFill/>
+        </p:spPr>
+        <p:txBody>
+          <a:bodyPr wrap="square" rtlCol="0">
+            <a:spAutoFit/>
+          </a:bodyPr>
+          <a:lstStyle/>
+          <a:p>
+            <a:pPr algn="ctr"/>
+            <a:r>
+              <a:rPr lang="en-US" altLang="ko-KR" sz="1600" dirty="0">
+                <a:latin typeface="Times New Roman" panose="02020603050405020304" pitchFamily="18" charset="0"/>
+                <a:cs typeface="Times New Roman" panose="02020603050405020304" pitchFamily="18" charset="0"/>
+              </a:rPr>
+              <a:t>Sim data</a:t>
+            </a:r>
+            <a:endParaRPr lang="ko-KR" altLang="en-US" sz="1600" dirty="0">
+              <a:latin typeface="Times New Roman" panose="02020603050405020304" pitchFamily="18" charset="0"/>
+              <a:cs typeface="Times New Roman" panose="02020603050405020304" pitchFamily="18" charset="0"/>
+            </a:endParaRPr>
+          </a:p>
+        </p:txBody>
+      </p:sp>
+      <p:pic>
+        <p:nvPicPr>
+          <p:cNvPr id="28" name="그림 27">
+            <a:extLst>
+              <a:ext uri="{FF2B5EF4-FFF2-40B4-BE49-F238E27FC236}">
+                <a16:creationId xmlns:a16="http://schemas.microsoft.com/office/drawing/2014/main" id="{4C990121-C729-F44A-BD61-4694EF87925E}"/>
+              </a:ext>
+            </a:extLst>
+          </p:cNvPr>
+          <p:cNvPicPr>
+            <a:picLocks noChangeAspect="1"/>
+          </p:cNvPicPr>
+          <p:nvPr/>
+        </p:nvPicPr>
+        <p:blipFill>
+          <a:blip r:embed="rId3"/>
+          <a:stretch>
+            <a:fillRect/>
+          </a:stretch>
+        </p:blipFill>
+        <p:spPr>
+          <a:xfrm>
+            <a:off x="8290791" y="3104505"/>
+            <a:ext cx="622020" cy="200053"/>
+          </a:xfrm>
+          <a:prstGeom prst="rect">
+            <a:avLst/>
+          </a:prstGeom>
+        </p:spPr>
+      </p:pic>
+      <p:sp>
+        <p:nvSpPr>
+          <p:cNvPr id="10" name="사각형: 둥근 모서리 9">
+            <a:extLst>
+              <a:ext uri="{FF2B5EF4-FFF2-40B4-BE49-F238E27FC236}">
+                <a16:creationId xmlns:a16="http://schemas.microsoft.com/office/drawing/2014/main" id="{2574B34C-4077-805C-974E-300B36C0B856}"/>
               </a:ext>
             </a:extLst>
           </p:cNvPr>
@@ -3776,8 +3983,8 @@
         </p:nvSpPr>
         <p:spPr>
           <a:xfrm>
-            <a:off x="2049779" y="128124"/>
-            <a:ext cx="1221104" cy="1406068"/>
+            <a:off x="2205065" y="1841576"/>
+            <a:ext cx="1791971" cy="431896"/>
           </a:xfrm>
           <a:prstGeom prst="roundRect">
             <a:avLst/>
@@ -3820,10 +4027,10 @@
       </p:sp>
       <p:sp>
         <p:nvSpPr>
-          <p:cNvPr id="4" name="TextBox 3">
-            <a:extLst>
-              <a:ext uri="{FF2B5EF4-FFF2-40B4-BE49-F238E27FC236}">
-                <a16:creationId xmlns:a16="http://schemas.microsoft.com/office/drawing/2014/main" id="{FE86DF2E-C556-B05F-CB7C-303EF0AC27CB}"/>
+          <p:cNvPr id="12" name="TextBox 11">
+            <a:extLst>
+              <a:ext uri="{FF2B5EF4-FFF2-40B4-BE49-F238E27FC236}">
+                <a16:creationId xmlns:a16="http://schemas.microsoft.com/office/drawing/2014/main" id="{682EFDDC-FD5F-66A6-D03C-86C630C93006}"/>
               </a:ext>
             </a:extLst>
           </p:cNvPr>
@@ -3832,8 +4039,8 @@
         </p:nvSpPr>
         <p:spPr>
           <a:xfrm>
-            <a:off x="634365" y="645795"/>
-            <a:ext cx="1026795" cy="338554"/>
+            <a:off x="2302220" y="1890977"/>
+            <a:ext cx="1612267" cy="338554"/>
           </a:xfrm>
           <a:prstGeom prst="rect">
             <a:avLst/>
@@ -3852,7 +4059,7 @@
                 <a:latin typeface="Times New Roman" panose="02020603050405020304" pitchFamily="18" charset="0"/>
                 <a:cs typeface="Times New Roman" panose="02020603050405020304" pitchFamily="18" charset="0"/>
               </a:rPr>
-              <a:t>Sim data</a:t>
+              <a:t>Content encoder</a:t>
             </a:r>
             <a:endParaRPr lang="ko-KR" altLang="en-US" sz="1600" dirty="0">
               <a:latin typeface="Times New Roman" panose="02020603050405020304" pitchFamily="18" charset="0"/>
@@ -3863,24 +4070,23 @@
       </p:sp>
       <p:cxnSp>
         <p:nvCxnSpPr>
-          <p:cNvPr id="6" name="직선 화살표 연결선 5">
-            <a:extLst>
-              <a:ext uri="{FF2B5EF4-FFF2-40B4-BE49-F238E27FC236}">
-                <a16:creationId xmlns:a16="http://schemas.microsoft.com/office/drawing/2014/main" id="{45F79815-B6C9-3C89-F74A-839BE159800E}"/>
+          <p:cNvPr id="19" name="직선 화살표 연결선 18">
+            <a:extLst>
+              <a:ext uri="{FF2B5EF4-FFF2-40B4-BE49-F238E27FC236}">
+                <a16:creationId xmlns:a16="http://schemas.microsoft.com/office/drawing/2014/main" id="{3007E9FA-C742-4FF8-A42F-BB517D9908E0}"/>
               </a:ext>
             </a:extLst>
           </p:cNvPr>
           <p:cNvCxnSpPr>
             <a:cxnSpLocks/>
-            <a:stCxn id="4" idx="3"/>
-            <a:endCxn id="9" idx="1"/>
+            <a:stCxn id="10" idx="3"/>
           </p:cNvCxnSpPr>
           <p:nvPr/>
         </p:nvCxnSpPr>
         <p:spPr>
-          <a:xfrm flipV="1">
-            <a:off x="1661160" y="394807"/>
-            <a:ext cx="416326" cy="420265"/>
+          <a:xfrm>
+            <a:off x="3997036" y="2057524"/>
+            <a:ext cx="534668" cy="0"/>
           </a:xfrm>
           <a:prstGeom prst="straightConnector1">
             <a:avLst/>
@@ -3906,10 +4112,10 @@
       </p:cxnSp>
       <p:sp>
         <p:nvSpPr>
-          <p:cNvPr id="8" name="TextBox 7">
-            <a:extLst>
-              <a:ext uri="{FF2B5EF4-FFF2-40B4-BE49-F238E27FC236}">
-                <a16:creationId xmlns:a16="http://schemas.microsoft.com/office/drawing/2014/main" id="{12EFFFAA-43A1-BEA9-DA11-EBB493BCE537}"/>
+          <p:cNvPr id="66" name="TextBox 65">
+            <a:extLst>
+              <a:ext uri="{FF2B5EF4-FFF2-40B4-BE49-F238E27FC236}">
+                <a16:creationId xmlns:a16="http://schemas.microsoft.com/office/drawing/2014/main" id="{4E9DB798-F983-D9A2-FAA6-82D26A6ED9B9}"/>
               </a:ext>
             </a:extLst>
           </p:cNvPr>
@@ -3918,7 +4124,7 @@
         </p:nvSpPr>
         <p:spPr>
           <a:xfrm>
-            <a:off x="2146933" y="1017173"/>
+            <a:off x="643602" y="3185890"/>
             <a:ext cx="1026795" cy="338554"/>
           </a:xfrm>
           <a:prstGeom prst="rect">
@@ -3938,7 +4144,7 @@
                 <a:latin typeface="Times New Roman" panose="02020603050405020304" pitchFamily="18" charset="0"/>
                 <a:cs typeface="Times New Roman" panose="02020603050405020304" pitchFamily="18" charset="0"/>
               </a:rPr>
-              <a:t>Content</a:t>
+              <a:t>Sim data</a:t>
             </a:r>
             <a:endParaRPr lang="ko-KR" altLang="en-US" sz="1600" dirty="0">
               <a:latin typeface="Times New Roman" panose="02020603050405020304" pitchFamily="18" charset="0"/>
@@ -3947,67 +4153,26 @@
           </a:p>
         </p:txBody>
       </p:sp>
-      <p:sp>
-        <p:nvSpPr>
-          <p:cNvPr id="9" name="TextBox 8">
-            <a:extLst>
-              <a:ext uri="{FF2B5EF4-FFF2-40B4-BE49-F238E27FC236}">
-                <a16:creationId xmlns:a16="http://schemas.microsoft.com/office/drawing/2014/main" id="{70600A26-D8EE-62EA-F0B9-E7925EADBEB0}"/>
-              </a:ext>
-            </a:extLst>
-          </p:cNvPr>
-          <p:cNvSpPr txBox="1"/>
-          <p:nvPr/>
-        </p:nvSpPr>
-        <p:spPr>
-          <a:xfrm>
-            <a:off x="2077486" y="240918"/>
-            <a:ext cx="570547" cy="307777"/>
-          </a:xfrm>
-          <a:prstGeom prst="rect">
-            <a:avLst/>
-          </a:prstGeom>
-          <a:noFill/>
-        </p:spPr>
-        <p:txBody>
-          <a:bodyPr wrap="square" rtlCol="0">
-            <a:spAutoFit/>
-          </a:bodyPr>
-          <a:lstStyle/>
-          <a:p>
-            <a:pPr algn="ctr"/>
-            <a:r>
-              <a:rPr lang="en-US" altLang="ko-KR" sz="1400" dirty="0">
-                <a:latin typeface="Times New Roman" panose="02020603050405020304" pitchFamily="18" charset="0"/>
-                <a:cs typeface="Times New Roman" panose="02020603050405020304" pitchFamily="18" charset="0"/>
-              </a:rPr>
-              <a:t>Style</a:t>
-            </a:r>
-            <a:endParaRPr lang="ko-KR" altLang="en-US" sz="1400" dirty="0">
-              <a:latin typeface="Times New Roman" panose="02020603050405020304" pitchFamily="18" charset="0"/>
-              <a:cs typeface="Times New Roman" panose="02020603050405020304" pitchFamily="18" charset="0"/>
-            </a:endParaRPr>
-          </a:p>
-        </p:txBody>
-      </p:sp>
       <p:cxnSp>
         <p:nvCxnSpPr>
-          <p:cNvPr id="11" name="직선 화살표 연결선 10">
-            <a:extLst>
-              <a:ext uri="{FF2B5EF4-FFF2-40B4-BE49-F238E27FC236}">
-                <a16:creationId xmlns:a16="http://schemas.microsoft.com/office/drawing/2014/main" id="{A81FDF87-6D06-2DBC-EBB2-E873EDBAB354}"/>
+          <p:cNvPr id="67" name="직선 화살표 연결선 66">
+            <a:extLst>
+              <a:ext uri="{FF2B5EF4-FFF2-40B4-BE49-F238E27FC236}">
+                <a16:creationId xmlns:a16="http://schemas.microsoft.com/office/drawing/2014/main" id="{A820B103-925B-6EE2-5EEE-E1D64DE71E66}"/>
               </a:ext>
             </a:extLst>
           </p:cNvPr>
           <p:cNvCxnSpPr>
             <a:cxnSpLocks/>
+            <a:stCxn id="66" idx="3"/>
+            <a:endCxn id="72" idx="1"/>
           </p:cNvCxnSpPr>
           <p:nvPr/>
         </p:nvCxnSpPr>
         <p:spPr>
-          <a:xfrm>
-            <a:off x="1690314" y="825671"/>
-            <a:ext cx="388618" cy="401241"/>
+          <a:xfrm flipV="1">
+            <a:off x="1670397" y="3350713"/>
+            <a:ext cx="534668" cy="4454"/>
           </a:xfrm>
           <a:prstGeom prst="straightConnector1">
             <a:avLst/>
@@ -4033,10 +4198,10 @@
       </p:cxnSp>
       <p:sp>
         <p:nvSpPr>
-          <p:cNvPr id="14" name="TextBox 13">
-            <a:extLst>
-              <a:ext uri="{FF2B5EF4-FFF2-40B4-BE49-F238E27FC236}">
-                <a16:creationId xmlns:a16="http://schemas.microsoft.com/office/drawing/2014/main" id="{771DD834-BD48-281C-2963-99E286EA1660}"/>
+          <p:cNvPr id="69" name="TextBox 68">
+            <a:extLst>
+              <a:ext uri="{FF2B5EF4-FFF2-40B4-BE49-F238E27FC236}">
+                <a16:creationId xmlns:a16="http://schemas.microsoft.com/office/drawing/2014/main" id="{E09138D2-DF54-7F46-C2BA-A2C420C79CE4}"/>
               </a:ext>
             </a:extLst>
           </p:cNvPr>
@@ -4045,8 +4210,293 @@
         </p:nvSpPr>
         <p:spPr>
           <a:xfrm>
-            <a:off x="3723808" y="613886"/>
-            <a:ext cx="1026795" cy="338554"/>
+            <a:off x="4531704" y="3058325"/>
+            <a:ext cx="1026795" cy="584775"/>
+          </a:xfrm>
+          <a:prstGeom prst="rect">
+            <a:avLst/>
+          </a:prstGeom>
+          <a:noFill/>
+          <a:ln>
+            <a:solidFill>
+              <a:schemeClr val="tx1"/>
+            </a:solidFill>
+          </a:ln>
+        </p:spPr>
+        <p:txBody>
+          <a:bodyPr wrap="square" rtlCol="0">
+            <a:spAutoFit/>
+          </a:bodyPr>
+          <a:lstStyle/>
+          <a:p>
+            <a:pPr algn="ctr"/>
+            <a:r>
+              <a:rPr lang="en-US" altLang="ko-KR" sz="1600" dirty="0">
+                <a:latin typeface="Times New Roman" panose="02020603050405020304" pitchFamily="18" charset="0"/>
+                <a:cs typeface="Times New Roman" panose="02020603050405020304" pitchFamily="18" charset="0"/>
+              </a:rPr>
+              <a:t>Latent vector</a:t>
+            </a:r>
+            <a:endParaRPr lang="ko-KR" altLang="en-US" sz="1600" dirty="0">
+              <a:latin typeface="Times New Roman" panose="02020603050405020304" pitchFamily="18" charset="0"/>
+              <a:cs typeface="Times New Roman" panose="02020603050405020304" pitchFamily="18" charset="0"/>
+            </a:endParaRPr>
+          </a:p>
+        </p:txBody>
+      </p:sp>
+      <p:cxnSp>
+        <p:nvCxnSpPr>
+          <p:cNvPr id="70" name="직선 화살표 연결선 69">
+            <a:extLst>
+              <a:ext uri="{FF2B5EF4-FFF2-40B4-BE49-F238E27FC236}">
+                <a16:creationId xmlns:a16="http://schemas.microsoft.com/office/drawing/2014/main" id="{BBF1CD9B-71CE-FE0C-B888-1A4FFEA43889}"/>
+              </a:ext>
+            </a:extLst>
+          </p:cNvPr>
+          <p:cNvCxnSpPr>
+            <a:cxnSpLocks/>
+            <a:stCxn id="69" idx="3"/>
+          </p:cNvCxnSpPr>
+          <p:nvPr/>
+        </p:nvCxnSpPr>
+        <p:spPr>
+          <a:xfrm flipV="1">
+            <a:off x="5558499" y="3349328"/>
+            <a:ext cx="495940" cy="1385"/>
+          </a:xfrm>
+          <a:prstGeom prst="straightConnector1">
+            <a:avLst/>
+          </a:prstGeom>
+          <a:ln>
+            <a:tailEnd type="triangle"/>
+          </a:ln>
+        </p:spPr>
+        <p:style>
+          <a:lnRef idx="2">
+            <a:schemeClr val="accent1"/>
+          </a:lnRef>
+          <a:fillRef idx="0">
+            <a:schemeClr val="accent1"/>
+          </a:fillRef>
+          <a:effectRef idx="1">
+            <a:schemeClr val="accent1"/>
+          </a:effectRef>
+          <a:fontRef idx="minor">
+            <a:schemeClr val="tx1"/>
+          </a:fontRef>
+        </p:style>
+      </p:cxnSp>
+      <p:sp>
+        <p:nvSpPr>
+          <p:cNvPr id="72" name="사각형: 둥근 모서리 71">
+            <a:extLst>
+              <a:ext uri="{FF2B5EF4-FFF2-40B4-BE49-F238E27FC236}">
+                <a16:creationId xmlns:a16="http://schemas.microsoft.com/office/drawing/2014/main" id="{38ABA5D4-9D00-2E6F-156E-7AB8320CB5D1}"/>
+              </a:ext>
+            </a:extLst>
+          </p:cNvPr>
+          <p:cNvSpPr/>
+          <p:nvPr/>
+        </p:nvSpPr>
+        <p:spPr>
+          <a:xfrm>
+            <a:off x="2205065" y="3134765"/>
+            <a:ext cx="1791971" cy="431896"/>
+          </a:xfrm>
+          <a:prstGeom prst="roundRect">
+            <a:avLst/>
+          </a:prstGeom>
+          <a:solidFill>
+            <a:schemeClr val="accent6">
+              <a:lumMod val="40000"/>
+              <a:lumOff val="60000"/>
+              <a:alpha val="29000"/>
+            </a:schemeClr>
+          </a:solidFill>
+          <a:ln>
+            <a:prstDash val="dash"/>
+          </a:ln>
+        </p:spPr>
+        <p:style>
+          <a:lnRef idx="2">
+            <a:schemeClr val="accent1">
+              <a:shade val="15000"/>
+            </a:schemeClr>
+          </a:lnRef>
+          <a:fillRef idx="1">
+            <a:schemeClr val="accent1"/>
+          </a:fillRef>
+          <a:effectRef idx="0">
+            <a:schemeClr val="accent1"/>
+          </a:effectRef>
+          <a:fontRef idx="minor">
+            <a:schemeClr val="lt1"/>
+          </a:fontRef>
+        </p:style>
+        <p:txBody>
+          <a:bodyPr rtlCol="0" anchor="ctr"/>
+          <a:lstStyle/>
+          <a:p>
+            <a:pPr algn="ctr"/>
+            <a:endParaRPr lang="ko-KR" altLang="en-US" sz="1600"/>
+          </a:p>
+        </p:txBody>
+      </p:sp>
+      <p:sp>
+        <p:nvSpPr>
+          <p:cNvPr id="73" name="TextBox 72">
+            <a:extLst>
+              <a:ext uri="{FF2B5EF4-FFF2-40B4-BE49-F238E27FC236}">
+                <a16:creationId xmlns:a16="http://schemas.microsoft.com/office/drawing/2014/main" id="{58BA9130-F9C8-9E3B-A03F-7A8FBDA92358}"/>
+              </a:ext>
+            </a:extLst>
+          </p:cNvPr>
+          <p:cNvSpPr txBox="1"/>
+          <p:nvPr/>
+        </p:nvSpPr>
+        <p:spPr>
+          <a:xfrm>
+            <a:off x="2302220" y="3184166"/>
+            <a:ext cx="1612267" cy="338554"/>
+          </a:xfrm>
+          <a:prstGeom prst="rect">
+            <a:avLst/>
+          </a:prstGeom>
+          <a:noFill/>
+        </p:spPr>
+        <p:txBody>
+          <a:bodyPr wrap="square" rtlCol="0">
+            <a:spAutoFit/>
+          </a:bodyPr>
+          <a:lstStyle/>
+          <a:p>
+            <a:pPr algn="ctr"/>
+            <a:r>
+              <a:rPr lang="en-US" altLang="ko-KR" sz="1600" dirty="0">
+                <a:latin typeface="Times New Roman" panose="02020603050405020304" pitchFamily="18" charset="0"/>
+                <a:cs typeface="Times New Roman" panose="02020603050405020304" pitchFamily="18" charset="0"/>
+              </a:rPr>
+              <a:t>Style encoder</a:t>
+            </a:r>
+            <a:endParaRPr lang="ko-KR" altLang="en-US" sz="1600" dirty="0">
+              <a:latin typeface="Times New Roman" panose="02020603050405020304" pitchFamily="18" charset="0"/>
+              <a:cs typeface="Times New Roman" panose="02020603050405020304" pitchFamily="18" charset="0"/>
+            </a:endParaRPr>
+          </a:p>
+        </p:txBody>
+      </p:sp>
+      <p:cxnSp>
+        <p:nvCxnSpPr>
+          <p:cNvPr id="74" name="직선 화살표 연결선 73">
+            <a:extLst>
+              <a:ext uri="{FF2B5EF4-FFF2-40B4-BE49-F238E27FC236}">
+                <a16:creationId xmlns:a16="http://schemas.microsoft.com/office/drawing/2014/main" id="{A11446F3-18C7-C757-67E2-6E5399A9DA4C}"/>
+              </a:ext>
+            </a:extLst>
+          </p:cNvPr>
+          <p:cNvCxnSpPr>
+            <a:cxnSpLocks/>
+            <a:stCxn id="72" idx="3"/>
+          </p:cNvCxnSpPr>
+          <p:nvPr/>
+        </p:nvCxnSpPr>
+        <p:spPr>
+          <a:xfrm>
+            <a:off x="3997036" y="3350713"/>
+            <a:ext cx="534668" cy="0"/>
+          </a:xfrm>
+          <a:prstGeom prst="straightConnector1">
+            <a:avLst/>
+          </a:prstGeom>
+          <a:ln>
+            <a:tailEnd type="triangle"/>
+          </a:ln>
+        </p:spPr>
+        <p:style>
+          <a:lnRef idx="2">
+            <a:schemeClr val="accent1"/>
+          </a:lnRef>
+          <a:fillRef idx="0">
+            <a:schemeClr val="accent1"/>
+          </a:fillRef>
+          <a:effectRef idx="1">
+            <a:schemeClr val="accent1"/>
+          </a:effectRef>
+          <a:fontRef idx="minor">
+            <a:schemeClr val="tx1"/>
+          </a:fontRef>
+        </p:style>
+      </p:cxnSp>
+      <p:sp>
+        <p:nvSpPr>
+          <p:cNvPr id="76" name="사각형: 둥근 모서리 75">
+            <a:extLst>
+              <a:ext uri="{FF2B5EF4-FFF2-40B4-BE49-F238E27FC236}">
+                <a16:creationId xmlns:a16="http://schemas.microsoft.com/office/drawing/2014/main" id="{7440DE5E-F10A-52C7-3FFD-ACD96BB67F22}"/>
+              </a:ext>
+            </a:extLst>
+          </p:cNvPr>
+          <p:cNvSpPr/>
+          <p:nvPr/>
+        </p:nvSpPr>
+        <p:spPr>
+          <a:xfrm>
+            <a:off x="6058883" y="3130650"/>
+            <a:ext cx="1505700" cy="431896"/>
+          </a:xfrm>
+          <a:prstGeom prst="roundRect">
+            <a:avLst/>
+          </a:prstGeom>
+          <a:solidFill>
+            <a:srgbClr val="0070C0">
+              <a:alpha val="29000"/>
+            </a:srgbClr>
+          </a:solidFill>
+          <a:ln>
+            <a:prstDash val="dash"/>
+          </a:ln>
+        </p:spPr>
+        <p:style>
+          <a:lnRef idx="2">
+            <a:schemeClr val="accent1">
+              <a:shade val="15000"/>
+            </a:schemeClr>
+          </a:lnRef>
+          <a:fillRef idx="1">
+            <a:schemeClr val="accent1"/>
+          </a:fillRef>
+          <a:effectRef idx="0">
+            <a:schemeClr val="accent1"/>
+          </a:effectRef>
+          <a:fontRef idx="minor">
+            <a:schemeClr val="lt1"/>
+          </a:fontRef>
+        </p:style>
+        <p:txBody>
+          <a:bodyPr rtlCol="0" anchor="ctr"/>
+          <a:lstStyle/>
+          <a:p>
+            <a:pPr algn="ctr"/>
+            <a:endParaRPr lang="ko-KR" altLang="en-US" sz="1600"/>
+          </a:p>
+        </p:txBody>
+      </p:sp>
+      <p:sp>
+        <p:nvSpPr>
+          <p:cNvPr id="77" name="TextBox 76">
+            <a:extLst>
+              <a:ext uri="{FF2B5EF4-FFF2-40B4-BE49-F238E27FC236}">
+                <a16:creationId xmlns:a16="http://schemas.microsoft.com/office/drawing/2014/main" id="{1097AD96-3EB4-5750-9891-AD11EF14C861}"/>
+              </a:ext>
+            </a:extLst>
+          </p:cNvPr>
+          <p:cNvSpPr txBox="1"/>
+          <p:nvPr/>
+        </p:nvSpPr>
+        <p:spPr>
+          <a:xfrm>
+            <a:off x="6156037" y="3180051"/>
+            <a:ext cx="1306945" cy="338554"/>
           </a:xfrm>
           <a:prstGeom prst="rect">
             <a:avLst/>
@@ -4076,25 +4526,26 @@
       </p:sp>
       <p:cxnSp>
         <p:nvCxnSpPr>
-          <p:cNvPr id="16" name="직선 화살표 연결선 15">
-            <a:extLst>
-              <a:ext uri="{FF2B5EF4-FFF2-40B4-BE49-F238E27FC236}">
-                <a16:creationId xmlns:a16="http://schemas.microsoft.com/office/drawing/2014/main" id="{81B80190-FC88-CCBF-5462-B787F359AEC2}"/>
+          <p:cNvPr id="86" name="연결선: 꺾임 85">
+            <a:extLst>
+              <a:ext uri="{FF2B5EF4-FFF2-40B4-BE49-F238E27FC236}">
+                <a16:creationId xmlns:a16="http://schemas.microsoft.com/office/drawing/2014/main" id="{4DF097EC-8E4F-630F-C39A-7BBCF421017E}"/>
               </a:ext>
             </a:extLst>
           </p:cNvPr>
           <p:cNvCxnSpPr>
             <a:cxnSpLocks/>
-            <a:endCxn id="14" idx="1"/>
+            <a:stCxn id="14" idx="3"/>
+            <a:endCxn id="77" idx="0"/>
           </p:cNvCxnSpPr>
           <p:nvPr/>
         </p:nvCxnSpPr>
         <p:spPr>
-          <a:xfrm flipV="1">
-            <a:off x="3270882" y="783163"/>
-            <a:ext cx="452926" cy="423938"/>
-          </a:xfrm>
-          <a:prstGeom prst="straightConnector1">
+          <a:xfrm>
+            <a:off x="5558499" y="2057524"/>
+            <a:ext cx="1251011" cy="1122527"/>
+          </a:xfrm>
+          <a:prstGeom prst="bentConnector2">
             <a:avLst/>
           </a:prstGeom>
           <a:ln>
@@ -4118,25 +4569,713 @@
       </p:cxnSp>
       <p:cxnSp>
         <p:nvCxnSpPr>
-          <p:cNvPr id="20" name="직선 화살표 연결선 19">
-            <a:extLst>
-              <a:ext uri="{FF2B5EF4-FFF2-40B4-BE49-F238E27FC236}">
-                <a16:creationId xmlns:a16="http://schemas.microsoft.com/office/drawing/2014/main" id="{51077DAB-3370-C7EC-FA67-055CA478E4B3}"/>
+          <p:cNvPr id="89" name="직선 화살표 연결선 88">
+            <a:extLst>
+              <a:ext uri="{FF2B5EF4-FFF2-40B4-BE49-F238E27FC236}">
+                <a16:creationId xmlns:a16="http://schemas.microsoft.com/office/drawing/2014/main" id="{9920A8B9-992C-BF79-FD16-8A77CAEE59BB}"/>
               </a:ext>
             </a:extLst>
           </p:cNvPr>
           <p:cNvCxnSpPr>
             <a:cxnSpLocks/>
-            <a:endCxn id="14" idx="1"/>
           </p:cNvCxnSpPr>
           <p:nvPr/>
         </p:nvCxnSpPr>
         <p:spPr>
-          <a:xfrm>
-            <a:off x="3284736" y="414934"/>
-            <a:ext cx="439072" cy="368229"/>
+          <a:xfrm flipV="1">
+            <a:off x="7569027" y="3345213"/>
+            <a:ext cx="495940" cy="1385"/>
           </a:xfrm>
           <a:prstGeom prst="straightConnector1">
+            <a:avLst/>
+          </a:prstGeom>
+          <a:ln>
+            <a:tailEnd type="triangle"/>
+          </a:ln>
+        </p:spPr>
+        <p:style>
+          <a:lnRef idx="2">
+            <a:schemeClr val="accent1"/>
+          </a:lnRef>
+          <a:fillRef idx="0">
+            <a:schemeClr val="accent1"/>
+          </a:fillRef>
+          <a:effectRef idx="1">
+            <a:schemeClr val="accent1"/>
+          </a:effectRef>
+          <a:fontRef idx="minor">
+            <a:schemeClr val="tx1"/>
+          </a:fontRef>
+        </p:style>
+      </p:cxnSp>
+      <p:sp>
+        <p:nvSpPr>
+          <p:cNvPr id="90" name="TextBox 89">
+            <a:extLst>
+              <a:ext uri="{FF2B5EF4-FFF2-40B4-BE49-F238E27FC236}">
+                <a16:creationId xmlns:a16="http://schemas.microsoft.com/office/drawing/2014/main" id="{00908C14-B32A-D170-1E9F-32CF5264E858}"/>
+              </a:ext>
+            </a:extLst>
+          </p:cNvPr>
+          <p:cNvSpPr txBox="1"/>
+          <p:nvPr/>
+        </p:nvSpPr>
+        <p:spPr>
+          <a:xfrm>
+            <a:off x="643602" y="4720858"/>
+            <a:ext cx="1026795" cy="338554"/>
+          </a:xfrm>
+          <a:prstGeom prst="rect">
+            <a:avLst/>
+          </a:prstGeom>
+          <a:noFill/>
+        </p:spPr>
+        <p:txBody>
+          <a:bodyPr wrap="square" rtlCol="0">
+            <a:spAutoFit/>
+          </a:bodyPr>
+          <a:lstStyle/>
+          <a:p>
+            <a:pPr algn="ctr"/>
+            <a:r>
+              <a:rPr lang="en-US" altLang="ko-KR" sz="1600" dirty="0">
+                <a:latin typeface="Times New Roman" panose="02020603050405020304" pitchFamily="18" charset="0"/>
+                <a:cs typeface="Times New Roman" panose="02020603050405020304" pitchFamily="18" charset="0"/>
+              </a:rPr>
+              <a:t>Real data</a:t>
+            </a:r>
+            <a:endParaRPr lang="ko-KR" altLang="en-US" sz="1600" dirty="0">
+              <a:latin typeface="Times New Roman" panose="02020603050405020304" pitchFamily="18" charset="0"/>
+              <a:cs typeface="Times New Roman" panose="02020603050405020304" pitchFamily="18" charset="0"/>
+            </a:endParaRPr>
+          </a:p>
+        </p:txBody>
+      </p:sp>
+      <p:cxnSp>
+        <p:nvCxnSpPr>
+          <p:cNvPr id="91" name="직선 화살표 연결선 90">
+            <a:extLst>
+              <a:ext uri="{FF2B5EF4-FFF2-40B4-BE49-F238E27FC236}">
+                <a16:creationId xmlns:a16="http://schemas.microsoft.com/office/drawing/2014/main" id="{3A7C08AB-C842-87FA-2DB5-8A52D33D1AC7}"/>
+              </a:ext>
+            </a:extLst>
+          </p:cNvPr>
+          <p:cNvCxnSpPr>
+            <a:cxnSpLocks/>
+            <a:stCxn id="90" idx="3"/>
+            <a:endCxn id="95" idx="1"/>
+          </p:cNvCxnSpPr>
+          <p:nvPr/>
+        </p:nvCxnSpPr>
+        <p:spPr>
+          <a:xfrm flipV="1">
+            <a:off x="1670397" y="4885681"/>
+            <a:ext cx="534668" cy="4454"/>
+          </a:xfrm>
+          <a:prstGeom prst="straightConnector1">
+            <a:avLst/>
+          </a:prstGeom>
+          <a:ln>
+            <a:tailEnd type="triangle"/>
+          </a:ln>
+        </p:spPr>
+        <p:style>
+          <a:lnRef idx="2">
+            <a:schemeClr val="accent1"/>
+          </a:lnRef>
+          <a:fillRef idx="0">
+            <a:schemeClr val="accent1"/>
+          </a:fillRef>
+          <a:effectRef idx="1">
+            <a:schemeClr val="accent1"/>
+          </a:effectRef>
+          <a:fontRef idx="minor">
+            <a:schemeClr val="tx1"/>
+          </a:fontRef>
+        </p:style>
+      </p:cxnSp>
+      <p:sp>
+        <p:nvSpPr>
+          <p:cNvPr id="92" name="TextBox 91">
+            <a:extLst>
+              <a:ext uri="{FF2B5EF4-FFF2-40B4-BE49-F238E27FC236}">
+                <a16:creationId xmlns:a16="http://schemas.microsoft.com/office/drawing/2014/main" id="{4A26E43F-1D47-8393-0E0A-3AB962C5BE31}"/>
+              </a:ext>
+            </a:extLst>
+          </p:cNvPr>
+          <p:cNvSpPr txBox="1"/>
+          <p:nvPr/>
+        </p:nvSpPr>
+        <p:spPr>
+          <a:xfrm>
+            <a:off x="4531704" y="4593293"/>
+            <a:ext cx="1026795" cy="584775"/>
+          </a:xfrm>
+          <a:prstGeom prst="rect">
+            <a:avLst/>
+          </a:prstGeom>
+          <a:noFill/>
+          <a:ln>
+            <a:solidFill>
+              <a:schemeClr val="tx1"/>
+            </a:solidFill>
+          </a:ln>
+        </p:spPr>
+        <p:txBody>
+          <a:bodyPr wrap="square" rtlCol="0">
+            <a:spAutoFit/>
+          </a:bodyPr>
+          <a:lstStyle/>
+          <a:p>
+            <a:pPr algn="ctr"/>
+            <a:r>
+              <a:rPr lang="en-US" altLang="ko-KR" sz="1600" dirty="0">
+                <a:latin typeface="Times New Roman" panose="02020603050405020304" pitchFamily="18" charset="0"/>
+                <a:cs typeface="Times New Roman" panose="02020603050405020304" pitchFamily="18" charset="0"/>
+              </a:rPr>
+              <a:t>Latent vector</a:t>
+            </a:r>
+            <a:endParaRPr lang="ko-KR" altLang="en-US" sz="1600" dirty="0">
+              <a:latin typeface="Times New Roman" panose="02020603050405020304" pitchFamily="18" charset="0"/>
+              <a:cs typeface="Times New Roman" panose="02020603050405020304" pitchFamily="18" charset="0"/>
+            </a:endParaRPr>
+          </a:p>
+        </p:txBody>
+      </p:sp>
+      <p:sp>
+        <p:nvSpPr>
+          <p:cNvPr id="93" name="TextBox 92">
+            <a:extLst>
+              <a:ext uri="{FF2B5EF4-FFF2-40B4-BE49-F238E27FC236}">
+                <a16:creationId xmlns:a16="http://schemas.microsoft.com/office/drawing/2014/main" id="{71E0E98D-07BD-3FA3-D4B0-6A7C16CFBE21}"/>
+              </a:ext>
+            </a:extLst>
+          </p:cNvPr>
+          <p:cNvSpPr txBox="1"/>
+          <p:nvPr/>
+        </p:nvSpPr>
+        <p:spPr>
+          <a:xfrm>
+            <a:off x="8088404" y="5993797"/>
+            <a:ext cx="1026795" cy="338554"/>
+          </a:xfrm>
+          <a:prstGeom prst="rect">
+            <a:avLst/>
+          </a:prstGeom>
+          <a:noFill/>
+        </p:spPr>
+        <p:txBody>
+          <a:bodyPr wrap="square" rtlCol="0">
+            <a:spAutoFit/>
+          </a:bodyPr>
+          <a:lstStyle/>
+          <a:p>
+            <a:pPr algn="ctr"/>
+            <a:r>
+              <a:rPr lang="en-US" altLang="ko-KR" sz="1600" dirty="0">
+                <a:latin typeface="Times New Roman" panose="02020603050405020304" pitchFamily="18" charset="0"/>
+                <a:cs typeface="Times New Roman" panose="02020603050405020304" pitchFamily="18" charset="0"/>
+              </a:rPr>
+              <a:t>Real2Sim</a:t>
+            </a:r>
+            <a:endParaRPr lang="ko-KR" altLang="en-US" sz="1600" dirty="0">
+              <a:latin typeface="Times New Roman" panose="02020603050405020304" pitchFamily="18" charset="0"/>
+              <a:cs typeface="Times New Roman" panose="02020603050405020304" pitchFamily="18" charset="0"/>
+            </a:endParaRPr>
+          </a:p>
+        </p:txBody>
+      </p:sp>
+      <p:sp>
+        <p:nvSpPr>
+          <p:cNvPr id="95" name="사각형: 둥근 모서리 94">
+            <a:extLst>
+              <a:ext uri="{FF2B5EF4-FFF2-40B4-BE49-F238E27FC236}">
+                <a16:creationId xmlns:a16="http://schemas.microsoft.com/office/drawing/2014/main" id="{36086D95-502A-1739-D723-303F39E22D72}"/>
+              </a:ext>
+            </a:extLst>
+          </p:cNvPr>
+          <p:cNvSpPr/>
+          <p:nvPr/>
+        </p:nvSpPr>
+        <p:spPr>
+          <a:xfrm>
+            <a:off x="2205065" y="4669733"/>
+            <a:ext cx="1791971" cy="431896"/>
+          </a:xfrm>
+          <a:prstGeom prst="roundRect">
+            <a:avLst/>
+          </a:prstGeom>
+          <a:solidFill>
+            <a:schemeClr val="accent6">
+              <a:lumMod val="40000"/>
+              <a:lumOff val="60000"/>
+              <a:alpha val="29000"/>
+            </a:schemeClr>
+          </a:solidFill>
+          <a:ln>
+            <a:prstDash val="dash"/>
+          </a:ln>
+        </p:spPr>
+        <p:style>
+          <a:lnRef idx="2">
+            <a:schemeClr val="accent1">
+              <a:shade val="15000"/>
+            </a:schemeClr>
+          </a:lnRef>
+          <a:fillRef idx="1">
+            <a:schemeClr val="accent1"/>
+          </a:fillRef>
+          <a:effectRef idx="0">
+            <a:schemeClr val="accent1"/>
+          </a:effectRef>
+          <a:fontRef idx="minor">
+            <a:schemeClr val="lt1"/>
+          </a:fontRef>
+        </p:style>
+        <p:txBody>
+          <a:bodyPr rtlCol="0" anchor="ctr"/>
+          <a:lstStyle/>
+          <a:p>
+            <a:pPr algn="ctr"/>
+            <a:endParaRPr lang="ko-KR" altLang="en-US" sz="1600"/>
+          </a:p>
+        </p:txBody>
+      </p:sp>
+      <p:sp>
+        <p:nvSpPr>
+          <p:cNvPr id="96" name="TextBox 95">
+            <a:extLst>
+              <a:ext uri="{FF2B5EF4-FFF2-40B4-BE49-F238E27FC236}">
+                <a16:creationId xmlns:a16="http://schemas.microsoft.com/office/drawing/2014/main" id="{D1472504-832C-5C61-D3FD-E61DF78B7CAF}"/>
+              </a:ext>
+            </a:extLst>
+          </p:cNvPr>
+          <p:cNvSpPr txBox="1"/>
+          <p:nvPr/>
+        </p:nvSpPr>
+        <p:spPr>
+          <a:xfrm>
+            <a:off x="2302220" y="4719134"/>
+            <a:ext cx="1612267" cy="338554"/>
+          </a:xfrm>
+          <a:prstGeom prst="rect">
+            <a:avLst/>
+          </a:prstGeom>
+          <a:noFill/>
+        </p:spPr>
+        <p:txBody>
+          <a:bodyPr wrap="square" rtlCol="0">
+            <a:spAutoFit/>
+          </a:bodyPr>
+          <a:lstStyle/>
+          <a:p>
+            <a:pPr algn="ctr"/>
+            <a:r>
+              <a:rPr lang="en-US" altLang="ko-KR" sz="1600" dirty="0">
+                <a:latin typeface="Times New Roman" panose="02020603050405020304" pitchFamily="18" charset="0"/>
+                <a:cs typeface="Times New Roman" panose="02020603050405020304" pitchFamily="18" charset="0"/>
+              </a:rPr>
+              <a:t>Content encoder</a:t>
+            </a:r>
+            <a:endParaRPr lang="ko-KR" altLang="en-US" sz="1600" dirty="0">
+              <a:latin typeface="Times New Roman" panose="02020603050405020304" pitchFamily="18" charset="0"/>
+              <a:cs typeface="Times New Roman" panose="02020603050405020304" pitchFamily="18" charset="0"/>
+            </a:endParaRPr>
+          </a:p>
+        </p:txBody>
+      </p:sp>
+      <p:cxnSp>
+        <p:nvCxnSpPr>
+          <p:cNvPr id="97" name="직선 화살표 연결선 96">
+            <a:extLst>
+              <a:ext uri="{FF2B5EF4-FFF2-40B4-BE49-F238E27FC236}">
+                <a16:creationId xmlns:a16="http://schemas.microsoft.com/office/drawing/2014/main" id="{40EBF041-4022-B3B4-6F45-D371488A031A}"/>
+              </a:ext>
+            </a:extLst>
+          </p:cNvPr>
+          <p:cNvCxnSpPr>
+            <a:cxnSpLocks/>
+            <a:stCxn id="95" idx="3"/>
+          </p:cNvCxnSpPr>
+          <p:nvPr/>
+        </p:nvCxnSpPr>
+        <p:spPr>
+          <a:xfrm>
+            <a:off x="3997036" y="4885681"/>
+            <a:ext cx="534668" cy="0"/>
+          </a:xfrm>
+          <a:prstGeom prst="straightConnector1">
+            <a:avLst/>
+          </a:prstGeom>
+          <a:ln>
+            <a:tailEnd type="triangle"/>
+          </a:ln>
+        </p:spPr>
+        <p:style>
+          <a:lnRef idx="2">
+            <a:schemeClr val="accent1"/>
+          </a:lnRef>
+          <a:fillRef idx="0">
+            <a:schemeClr val="accent1"/>
+          </a:fillRef>
+          <a:effectRef idx="1">
+            <a:schemeClr val="accent1"/>
+          </a:effectRef>
+          <a:fontRef idx="minor">
+            <a:schemeClr val="tx1"/>
+          </a:fontRef>
+        </p:style>
+      </p:cxnSp>
+      <p:sp>
+        <p:nvSpPr>
+          <p:cNvPr id="100" name="TextBox 99">
+            <a:extLst>
+              <a:ext uri="{FF2B5EF4-FFF2-40B4-BE49-F238E27FC236}">
+                <a16:creationId xmlns:a16="http://schemas.microsoft.com/office/drawing/2014/main" id="{6133F961-3B8A-D4D5-6EC5-3D22B78F5E1B}"/>
+              </a:ext>
+            </a:extLst>
+          </p:cNvPr>
+          <p:cNvSpPr txBox="1"/>
+          <p:nvPr/>
+        </p:nvSpPr>
+        <p:spPr>
+          <a:xfrm>
+            <a:off x="4531704" y="5886482"/>
+            <a:ext cx="1026795" cy="584775"/>
+          </a:xfrm>
+          <a:prstGeom prst="rect">
+            <a:avLst/>
+          </a:prstGeom>
+          <a:noFill/>
+          <a:ln>
+            <a:solidFill>
+              <a:schemeClr val="tx1"/>
+            </a:solidFill>
+          </a:ln>
+        </p:spPr>
+        <p:txBody>
+          <a:bodyPr wrap="square" rtlCol="0">
+            <a:spAutoFit/>
+          </a:bodyPr>
+          <a:lstStyle/>
+          <a:p>
+            <a:pPr algn="ctr"/>
+            <a:r>
+              <a:rPr lang="en-US" altLang="ko-KR" sz="1600" dirty="0">
+                <a:latin typeface="Times New Roman" panose="02020603050405020304" pitchFamily="18" charset="0"/>
+                <a:cs typeface="Times New Roman" panose="02020603050405020304" pitchFamily="18" charset="0"/>
+              </a:rPr>
+              <a:t>Latent vector</a:t>
+            </a:r>
+            <a:endParaRPr lang="ko-KR" altLang="en-US" sz="1600" dirty="0">
+              <a:latin typeface="Times New Roman" panose="02020603050405020304" pitchFamily="18" charset="0"/>
+              <a:cs typeface="Times New Roman" panose="02020603050405020304" pitchFamily="18" charset="0"/>
+            </a:endParaRPr>
+          </a:p>
+        </p:txBody>
+      </p:sp>
+      <p:cxnSp>
+        <p:nvCxnSpPr>
+          <p:cNvPr id="101" name="직선 화살표 연결선 100">
+            <a:extLst>
+              <a:ext uri="{FF2B5EF4-FFF2-40B4-BE49-F238E27FC236}">
+                <a16:creationId xmlns:a16="http://schemas.microsoft.com/office/drawing/2014/main" id="{0FEF5CCA-160A-5F2E-594F-9A8F71C9FFF0}"/>
+              </a:ext>
+            </a:extLst>
+          </p:cNvPr>
+          <p:cNvCxnSpPr>
+            <a:cxnSpLocks/>
+            <a:stCxn id="100" idx="3"/>
+          </p:cNvCxnSpPr>
+          <p:nvPr/>
+        </p:nvCxnSpPr>
+        <p:spPr>
+          <a:xfrm flipV="1">
+            <a:off x="5558499" y="6177485"/>
+            <a:ext cx="495940" cy="1385"/>
+          </a:xfrm>
+          <a:prstGeom prst="straightConnector1">
+            <a:avLst/>
+          </a:prstGeom>
+          <a:ln>
+            <a:tailEnd type="triangle"/>
+          </a:ln>
+        </p:spPr>
+        <p:style>
+          <a:lnRef idx="2">
+            <a:schemeClr val="accent1"/>
+          </a:lnRef>
+          <a:fillRef idx="0">
+            <a:schemeClr val="accent1"/>
+          </a:fillRef>
+          <a:effectRef idx="1">
+            <a:schemeClr val="accent1"/>
+          </a:effectRef>
+          <a:fontRef idx="minor">
+            <a:schemeClr val="tx1"/>
+          </a:fontRef>
+        </p:style>
+      </p:cxnSp>
+      <p:sp>
+        <p:nvSpPr>
+          <p:cNvPr id="102" name="사각형: 둥근 모서리 101">
+            <a:extLst>
+              <a:ext uri="{FF2B5EF4-FFF2-40B4-BE49-F238E27FC236}">
+                <a16:creationId xmlns:a16="http://schemas.microsoft.com/office/drawing/2014/main" id="{0DACA8EC-8366-386E-0FBA-32D1582C2258}"/>
+              </a:ext>
+            </a:extLst>
+          </p:cNvPr>
+          <p:cNvSpPr/>
+          <p:nvPr/>
+        </p:nvSpPr>
+        <p:spPr>
+          <a:xfrm>
+            <a:off x="2205065" y="5962922"/>
+            <a:ext cx="1791971" cy="431896"/>
+          </a:xfrm>
+          <a:prstGeom prst="roundRect">
+            <a:avLst/>
+          </a:prstGeom>
+          <a:solidFill>
+            <a:schemeClr val="accent6">
+              <a:lumMod val="40000"/>
+              <a:lumOff val="60000"/>
+              <a:alpha val="29000"/>
+            </a:schemeClr>
+          </a:solidFill>
+          <a:ln>
+            <a:prstDash val="dash"/>
+          </a:ln>
+        </p:spPr>
+        <p:style>
+          <a:lnRef idx="2">
+            <a:schemeClr val="accent1">
+              <a:shade val="15000"/>
+            </a:schemeClr>
+          </a:lnRef>
+          <a:fillRef idx="1">
+            <a:schemeClr val="accent1"/>
+          </a:fillRef>
+          <a:effectRef idx="0">
+            <a:schemeClr val="accent1"/>
+          </a:effectRef>
+          <a:fontRef idx="minor">
+            <a:schemeClr val="lt1"/>
+          </a:fontRef>
+        </p:style>
+        <p:txBody>
+          <a:bodyPr rtlCol="0" anchor="ctr"/>
+          <a:lstStyle/>
+          <a:p>
+            <a:pPr algn="ctr"/>
+            <a:endParaRPr lang="ko-KR" altLang="en-US" sz="1600"/>
+          </a:p>
+        </p:txBody>
+      </p:sp>
+      <p:sp>
+        <p:nvSpPr>
+          <p:cNvPr id="103" name="TextBox 102">
+            <a:extLst>
+              <a:ext uri="{FF2B5EF4-FFF2-40B4-BE49-F238E27FC236}">
+                <a16:creationId xmlns:a16="http://schemas.microsoft.com/office/drawing/2014/main" id="{5F0C14CF-A19F-0BD5-813E-4641AF03C084}"/>
+              </a:ext>
+            </a:extLst>
+          </p:cNvPr>
+          <p:cNvSpPr txBox="1"/>
+          <p:nvPr/>
+        </p:nvSpPr>
+        <p:spPr>
+          <a:xfrm>
+            <a:off x="2302220" y="6012323"/>
+            <a:ext cx="1612267" cy="338554"/>
+          </a:xfrm>
+          <a:prstGeom prst="rect">
+            <a:avLst/>
+          </a:prstGeom>
+          <a:noFill/>
+        </p:spPr>
+        <p:txBody>
+          <a:bodyPr wrap="square" rtlCol="0">
+            <a:spAutoFit/>
+          </a:bodyPr>
+          <a:lstStyle/>
+          <a:p>
+            <a:pPr algn="ctr"/>
+            <a:r>
+              <a:rPr lang="en-US" altLang="ko-KR" sz="1600" dirty="0">
+                <a:latin typeface="Times New Roman" panose="02020603050405020304" pitchFamily="18" charset="0"/>
+                <a:cs typeface="Times New Roman" panose="02020603050405020304" pitchFamily="18" charset="0"/>
+              </a:rPr>
+              <a:t>Style encoder</a:t>
+            </a:r>
+            <a:endParaRPr lang="ko-KR" altLang="en-US" sz="1600" dirty="0">
+              <a:latin typeface="Times New Roman" panose="02020603050405020304" pitchFamily="18" charset="0"/>
+              <a:cs typeface="Times New Roman" panose="02020603050405020304" pitchFamily="18" charset="0"/>
+            </a:endParaRPr>
+          </a:p>
+        </p:txBody>
+      </p:sp>
+      <p:cxnSp>
+        <p:nvCxnSpPr>
+          <p:cNvPr id="104" name="직선 화살표 연결선 103">
+            <a:extLst>
+              <a:ext uri="{FF2B5EF4-FFF2-40B4-BE49-F238E27FC236}">
+                <a16:creationId xmlns:a16="http://schemas.microsoft.com/office/drawing/2014/main" id="{9BD52D57-AA07-8CC0-606F-F02DD0940CB5}"/>
+              </a:ext>
+            </a:extLst>
+          </p:cNvPr>
+          <p:cNvCxnSpPr>
+            <a:cxnSpLocks/>
+            <a:stCxn id="102" idx="3"/>
+          </p:cNvCxnSpPr>
+          <p:nvPr/>
+        </p:nvCxnSpPr>
+        <p:spPr>
+          <a:xfrm>
+            <a:off x="3997036" y="6178870"/>
+            <a:ext cx="534668" cy="0"/>
+          </a:xfrm>
+          <a:prstGeom prst="straightConnector1">
+            <a:avLst/>
+          </a:prstGeom>
+          <a:ln>
+            <a:tailEnd type="triangle"/>
+          </a:ln>
+        </p:spPr>
+        <p:style>
+          <a:lnRef idx="2">
+            <a:schemeClr val="accent1"/>
+          </a:lnRef>
+          <a:fillRef idx="0">
+            <a:schemeClr val="accent1"/>
+          </a:fillRef>
+          <a:effectRef idx="1">
+            <a:schemeClr val="accent1"/>
+          </a:effectRef>
+          <a:fontRef idx="minor">
+            <a:schemeClr val="tx1"/>
+          </a:fontRef>
+        </p:style>
+      </p:cxnSp>
+      <p:sp>
+        <p:nvSpPr>
+          <p:cNvPr id="105" name="사각형: 둥근 모서리 104">
+            <a:extLst>
+              <a:ext uri="{FF2B5EF4-FFF2-40B4-BE49-F238E27FC236}">
+                <a16:creationId xmlns:a16="http://schemas.microsoft.com/office/drawing/2014/main" id="{6D9764DB-DCE2-A44D-AA93-D8405E1F4402}"/>
+              </a:ext>
+            </a:extLst>
+          </p:cNvPr>
+          <p:cNvSpPr/>
+          <p:nvPr/>
+        </p:nvSpPr>
+        <p:spPr>
+          <a:xfrm>
+            <a:off x="6058883" y="5958807"/>
+            <a:ext cx="1505700" cy="431896"/>
+          </a:xfrm>
+          <a:prstGeom prst="roundRect">
+            <a:avLst/>
+          </a:prstGeom>
+          <a:solidFill>
+            <a:srgbClr val="0070C0">
+              <a:alpha val="29000"/>
+            </a:srgbClr>
+          </a:solidFill>
+          <a:ln>
+            <a:prstDash val="dash"/>
+          </a:ln>
+        </p:spPr>
+        <p:style>
+          <a:lnRef idx="2">
+            <a:schemeClr val="accent1">
+              <a:shade val="15000"/>
+            </a:schemeClr>
+          </a:lnRef>
+          <a:fillRef idx="1">
+            <a:schemeClr val="accent1"/>
+          </a:fillRef>
+          <a:effectRef idx="0">
+            <a:schemeClr val="accent1"/>
+          </a:effectRef>
+          <a:fontRef idx="minor">
+            <a:schemeClr val="lt1"/>
+          </a:fontRef>
+        </p:style>
+        <p:txBody>
+          <a:bodyPr rtlCol="0" anchor="ctr"/>
+          <a:lstStyle/>
+          <a:p>
+            <a:pPr algn="ctr"/>
+            <a:endParaRPr lang="ko-KR" altLang="en-US" sz="1600"/>
+          </a:p>
+        </p:txBody>
+      </p:sp>
+      <p:sp>
+        <p:nvSpPr>
+          <p:cNvPr id="106" name="TextBox 105">
+            <a:extLst>
+              <a:ext uri="{FF2B5EF4-FFF2-40B4-BE49-F238E27FC236}">
+                <a16:creationId xmlns:a16="http://schemas.microsoft.com/office/drawing/2014/main" id="{BFD6FCF8-398B-EE83-0EEC-1832891E3294}"/>
+              </a:ext>
+            </a:extLst>
+          </p:cNvPr>
+          <p:cNvSpPr txBox="1"/>
+          <p:nvPr/>
+        </p:nvSpPr>
+        <p:spPr>
+          <a:xfrm>
+            <a:off x="6156037" y="6008208"/>
+            <a:ext cx="1306945" cy="338554"/>
+          </a:xfrm>
+          <a:prstGeom prst="rect">
+            <a:avLst/>
+          </a:prstGeom>
+          <a:noFill/>
+        </p:spPr>
+        <p:txBody>
+          <a:bodyPr wrap="square" rtlCol="0">
+            <a:spAutoFit/>
+          </a:bodyPr>
+          <a:lstStyle/>
+          <a:p>
+            <a:pPr algn="ctr"/>
+            <a:r>
+              <a:rPr lang="en-US" altLang="ko-KR" sz="1600" dirty="0">
+                <a:latin typeface="Times New Roman" panose="02020603050405020304" pitchFamily="18" charset="0"/>
+                <a:cs typeface="Times New Roman" panose="02020603050405020304" pitchFamily="18" charset="0"/>
+              </a:rPr>
+              <a:t>Decoder</a:t>
+            </a:r>
+            <a:endParaRPr lang="ko-KR" altLang="en-US" sz="1600" dirty="0">
+              <a:latin typeface="Times New Roman" panose="02020603050405020304" pitchFamily="18" charset="0"/>
+              <a:cs typeface="Times New Roman" panose="02020603050405020304" pitchFamily="18" charset="0"/>
+            </a:endParaRPr>
+          </a:p>
+        </p:txBody>
+      </p:sp>
+      <p:cxnSp>
+        <p:nvCxnSpPr>
+          <p:cNvPr id="107" name="연결선: 꺾임 106">
+            <a:extLst>
+              <a:ext uri="{FF2B5EF4-FFF2-40B4-BE49-F238E27FC236}">
+                <a16:creationId xmlns:a16="http://schemas.microsoft.com/office/drawing/2014/main" id="{A1D5D1DE-C77E-6C9A-69D4-906A88A544DE}"/>
+              </a:ext>
+            </a:extLst>
+          </p:cNvPr>
+          <p:cNvCxnSpPr>
+            <a:cxnSpLocks/>
+            <a:stCxn id="92" idx="3"/>
+            <a:endCxn id="106" idx="0"/>
+          </p:cNvCxnSpPr>
+          <p:nvPr/>
+        </p:nvCxnSpPr>
+        <p:spPr>
+          <a:xfrm>
+            <a:off x="5558499" y="4885681"/>
+            <a:ext cx="1251011" cy="1122527"/>
+          </a:xfrm>
+          <a:prstGeom prst="bentConnector2">
             <a:avLst/>
           </a:prstGeom>
           <a:ln>
@@ -4160,24 +5299,22 @@
       </p:cxnSp>
       <p:cxnSp>
         <p:nvCxnSpPr>
-          <p:cNvPr id="23" name="직선 화살표 연결선 22">
-            <a:extLst>
-              <a:ext uri="{FF2B5EF4-FFF2-40B4-BE49-F238E27FC236}">
-                <a16:creationId xmlns:a16="http://schemas.microsoft.com/office/drawing/2014/main" id="{87825E10-4957-CABD-07EE-6B0823E6F67D}"/>
+          <p:cNvPr id="108" name="직선 화살표 연결선 107">
+            <a:extLst>
+              <a:ext uri="{FF2B5EF4-FFF2-40B4-BE49-F238E27FC236}">
+                <a16:creationId xmlns:a16="http://schemas.microsoft.com/office/drawing/2014/main" id="{E6C832E9-E9F7-95C8-4A55-F555C0400177}"/>
               </a:ext>
             </a:extLst>
           </p:cNvPr>
           <p:cNvCxnSpPr>
             <a:cxnSpLocks/>
-            <a:stCxn id="14" idx="3"/>
-            <a:endCxn id="26" idx="1"/>
           </p:cNvCxnSpPr>
           <p:nvPr/>
         </p:nvCxnSpPr>
         <p:spPr>
           <a:xfrm flipV="1">
-            <a:off x="4750603" y="781981"/>
-            <a:ext cx="621032" cy="1182"/>
+            <a:off x="7569027" y="6173370"/>
+            <a:ext cx="495940" cy="1385"/>
           </a:xfrm>
           <a:prstGeom prst="straightConnector1">
             <a:avLst/>
@@ -4203,10 +5340,10 @@
       </p:cxnSp>
       <p:sp>
         <p:nvSpPr>
-          <p:cNvPr id="26" name="TextBox 25">
-            <a:extLst>
-              <a:ext uri="{FF2B5EF4-FFF2-40B4-BE49-F238E27FC236}">
-                <a16:creationId xmlns:a16="http://schemas.microsoft.com/office/drawing/2014/main" id="{09AB6E70-F803-A7A6-E4E0-8A93881A86D5}"/>
+          <p:cNvPr id="110" name="TextBox 109">
+            <a:extLst>
+              <a:ext uri="{FF2B5EF4-FFF2-40B4-BE49-F238E27FC236}">
+                <a16:creationId xmlns:a16="http://schemas.microsoft.com/office/drawing/2014/main" id="{73357863-6815-BA8B-9D4A-1794B9EBA740}"/>
               </a:ext>
             </a:extLst>
           </p:cNvPr>
@@ -4215,8 +5352,8 @@
         </p:nvSpPr>
         <p:spPr>
           <a:xfrm>
-            <a:off x="5371635" y="612704"/>
-            <a:ext cx="1026795" cy="338554"/>
+            <a:off x="3366131" y="1524993"/>
+            <a:ext cx="898239" cy="338554"/>
           </a:xfrm>
           <a:prstGeom prst="rect">
             <a:avLst/>
@@ -4231,11 +5368,60 @@
           <a:p>
             <a:pPr algn="ctr"/>
             <a:r>
+              <a:rPr lang="en-US" altLang="ko-KR" sz="1600" b="1" dirty="0">
+                <a:solidFill>
+                  <a:srgbClr val="FF0000"/>
+                </a:solidFill>
+                <a:latin typeface="Times New Roman" panose="02020603050405020304" pitchFamily="18" charset="0"/>
+                <a:cs typeface="Times New Roman" panose="02020603050405020304" pitchFamily="18" charset="0"/>
+              </a:rPr>
+              <a:t>Freeze</a:t>
+            </a:r>
+            <a:endParaRPr lang="ko-KR" altLang="en-US" sz="1600" b="1" dirty="0">
+              <a:solidFill>
+                <a:srgbClr val="FF0000"/>
+              </a:solidFill>
+              <a:latin typeface="Times New Roman" panose="02020603050405020304" pitchFamily="18" charset="0"/>
+              <a:cs typeface="Times New Roman" panose="02020603050405020304" pitchFamily="18" charset="0"/>
+            </a:endParaRPr>
+          </a:p>
+        </p:txBody>
+      </p:sp>
+      <p:sp>
+        <p:nvSpPr>
+          <p:cNvPr id="111" name="TextBox 110">
+            <a:extLst>
+              <a:ext uri="{FF2B5EF4-FFF2-40B4-BE49-F238E27FC236}">
+                <a16:creationId xmlns:a16="http://schemas.microsoft.com/office/drawing/2014/main" id="{5A309A45-56A3-0767-A084-4D1D64A40C43}"/>
+              </a:ext>
+            </a:extLst>
+          </p:cNvPr>
+          <p:cNvSpPr txBox="1"/>
+          <p:nvPr/>
+        </p:nvSpPr>
+        <p:spPr>
+          <a:xfrm>
+            <a:off x="712875" y="620868"/>
+            <a:ext cx="1026795" cy="338554"/>
+          </a:xfrm>
+          <a:prstGeom prst="rect">
+            <a:avLst/>
+          </a:prstGeom>
+          <a:noFill/>
+        </p:spPr>
+        <p:txBody>
+          <a:bodyPr wrap="square" rtlCol="0">
+            <a:spAutoFit/>
+          </a:bodyPr>
+          <a:lstStyle/>
+          <a:p>
+            <a:pPr algn="ctr"/>
+            <a:r>
               <a:rPr lang="en-US" altLang="ko-KR" sz="1600" dirty="0">
                 <a:latin typeface="Times New Roman" panose="02020603050405020304" pitchFamily="18" charset="0"/>
                 <a:cs typeface="Times New Roman" panose="02020603050405020304" pitchFamily="18" charset="0"/>
               </a:rPr>
-              <a:t>Sim data</a:t>
+              <a:t>Real data</a:t>
             </a:r>
             <a:endParaRPr lang="ko-KR" altLang="en-US" sz="1600" dirty="0">
               <a:latin typeface="Times New Roman" panose="02020603050405020304" pitchFamily="18" charset="0"/>
@@ -4244,42 +5430,103 @@
           </a:p>
         </p:txBody>
       </p:sp>
-      <p:pic>
-        <p:nvPicPr>
-          <p:cNvPr id="28" name="그림 27">
-            <a:extLst>
-              <a:ext uri="{FF2B5EF4-FFF2-40B4-BE49-F238E27FC236}">
-                <a16:creationId xmlns:a16="http://schemas.microsoft.com/office/drawing/2014/main" id="{4C990121-C729-F44A-BD61-4694EF87925E}"/>
-              </a:ext>
-            </a:extLst>
-          </p:cNvPr>
-          <p:cNvPicPr>
-            <a:picLocks noChangeAspect="1"/>
-          </p:cNvPicPr>
+      <p:cxnSp>
+        <p:nvCxnSpPr>
+          <p:cNvPr id="112" name="직선 화살표 연결선 111">
+            <a:extLst>
+              <a:ext uri="{FF2B5EF4-FFF2-40B4-BE49-F238E27FC236}">
+                <a16:creationId xmlns:a16="http://schemas.microsoft.com/office/drawing/2014/main" id="{75F911B7-5B0F-348B-75DF-9C41A828446F}"/>
+              </a:ext>
+            </a:extLst>
+          </p:cNvPr>
+          <p:cNvCxnSpPr>
+            <a:cxnSpLocks/>
+            <a:stCxn id="111" idx="3"/>
+            <a:endCxn id="114" idx="1"/>
+          </p:cNvCxnSpPr>
           <p:nvPr/>
-        </p:nvPicPr>
-        <p:blipFill>
-          <a:blip r:embed="rId3"/>
-          <a:stretch>
-            <a:fillRect/>
-          </a:stretch>
-        </p:blipFill>
-        <p:spPr>
-          <a:xfrm>
-            <a:off x="5574022" y="503441"/>
-            <a:ext cx="622020" cy="200053"/>
+        </p:nvCxnSpPr>
+        <p:spPr>
+          <a:xfrm flipV="1">
+            <a:off x="1739670" y="785691"/>
+            <a:ext cx="534668" cy="4454"/>
+          </a:xfrm>
+          <a:prstGeom prst="straightConnector1">
+            <a:avLst/>
+          </a:prstGeom>
+          <a:ln>
+            <a:tailEnd type="triangle"/>
+          </a:ln>
+        </p:spPr>
+        <p:style>
+          <a:lnRef idx="2">
+            <a:schemeClr val="accent1"/>
+          </a:lnRef>
+          <a:fillRef idx="0">
+            <a:schemeClr val="accent1"/>
+          </a:fillRef>
+          <a:effectRef idx="1">
+            <a:schemeClr val="accent1"/>
+          </a:effectRef>
+          <a:fontRef idx="minor">
+            <a:schemeClr val="tx1"/>
+          </a:fontRef>
+        </p:style>
+      </p:cxnSp>
+      <p:sp>
+        <p:nvSpPr>
+          <p:cNvPr id="113" name="TextBox 112">
+            <a:extLst>
+              <a:ext uri="{FF2B5EF4-FFF2-40B4-BE49-F238E27FC236}">
+                <a16:creationId xmlns:a16="http://schemas.microsoft.com/office/drawing/2014/main" id="{CD4FF0F1-C914-A7C0-4402-9620E9F7C0FD}"/>
+              </a:ext>
+            </a:extLst>
+          </p:cNvPr>
+          <p:cNvSpPr txBox="1"/>
+          <p:nvPr/>
+        </p:nvSpPr>
+        <p:spPr>
+          <a:xfrm>
+            <a:off x="4600977" y="493303"/>
+            <a:ext cx="1026795" cy="584775"/>
           </a:xfrm>
           <a:prstGeom prst="rect">
             <a:avLst/>
           </a:prstGeom>
-        </p:spPr>
-      </p:pic>
-      <p:sp>
-        <p:nvSpPr>
-          <p:cNvPr id="31" name="화살표: 아래쪽 30">
-            <a:extLst>
-              <a:ext uri="{FF2B5EF4-FFF2-40B4-BE49-F238E27FC236}">
-                <a16:creationId xmlns:a16="http://schemas.microsoft.com/office/drawing/2014/main" id="{4434DF64-01E5-54A8-76F1-B18673000424}"/>
+          <a:noFill/>
+          <a:ln>
+            <a:solidFill>
+              <a:schemeClr val="tx1"/>
+            </a:solidFill>
+          </a:ln>
+        </p:spPr>
+        <p:txBody>
+          <a:bodyPr wrap="square" rtlCol="0">
+            <a:spAutoFit/>
+          </a:bodyPr>
+          <a:lstStyle/>
+          <a:p>
+            <a:pPr algn="ctr"/>
+            <a:r>
+              <a:rPr lang="en-US" altLang="ko-KR" sz="1600" dirty="0">
+                <a:latin typeface="Times New Roman" panose="02020603050405020304" pitchFamily="18" charset="0"/>
+                <a:cs typeface="Times New Roman" panose="02020603050405020304" pitchFamily="18" charset="0"/>
+              </a:rPr>
+              <a:t>Latent vector</a:t>
+            </a:r>
+            <a:endParaRPr lang="ko-KR" altLang="en-US" sz="1600" dirty="0">
+              <a:latin typeface="Times New Roman" panose="02020603050405020304" pitchFamily="18" charset="0"/>
+              <a:cs typeface="Times New Roman" panose="02020603050405020304" pitchFamily="18" charset="0"/>
+            </a:endParaRPr>
+          </a:p>
+        </p:txBody>
+      </p:sp>
+      <p:sp>
+        <p:nvSpPr>
+          <p:cNvPr id="114" name="사각형: 둥근 모서리 113">
+            <a:extLst>
+              <a:ext uri="{FF2B5EF4-FFF2-40B4-BE49-F238E27FC236}">
+                <a16:creationId xmlns:a16="http://schemas.microsoft.com/office/drawing/2014/main" id="{AC1F7C4D-1ED3-B18C-8036-998270830ECD}"/>
               </a:ext>
             </a:extLst>
           </p:cNvPr>
@@ -4288,18 +5535,22 @@
         </p:nvSpPr>
         <p:spPr>
           <a:xfrm>
-            <a:off x="3158535" y="1714977"/>
-            <a:ext cx="388618" cy="433268"/>
-          </a:xfrm>
-          <a:prstGeom prst="downArrow">
+            <a:off x="2274338" y="569743"/>
+            <a:ext cx="1791971" cy="431896"/>
+          </a:xfrm>
+          <a:prstGeom prst="roundRect">
             <a:avLst/>
           </a:prstGeom>
           <a:solidFill>
-            <a:schemeClr val="accent5">
+            <a:schemeClr val="accent6">
               <a:lumMod val="40000"/>
               <a:lumOff val="60000"/>
+              <a:alpha val="29000"/>
             </a:schemeClr>
           </a:solidFill>
+          <a:ln>
+            <a:prstDash val="dash"/>
+          </a:ln>
         </p:spPr>
         <p:style>
           <a:lnRef idx="2">
@@ -4328,10 +5579,10 @@
       </p:sp>
       <p:sp>
         <p:nvSpPr>
-          <p:cNvPr id="32" name="TextBox 31">
-            <a:extLst>
-              <a:ext uri="{FF2B5EF4-FFF2-40B4-BE49-F238E27FC236}">
-                <a16:creationId xmlns:a16="http://schemas.microsoft.com/office/drawing/2014/main" id="{417A8D4C-6B09-7D8D-C7DC-2BA2B0312A64}"/>
+          <p:cNvPr id="115" name="TextBox 114">
+            <a:extLst>
+              <a:ext uri="{FF2B5EF4-FFF2-40B4-BE49-F238E27FC236}">
+                <a16:creationId xmlns:a16="http://schemas.microsoft.com/office/drawing/2014/main" id="{CE9D21AC-32CF-1865-5580-01014CC87A4D}"/>
               </a:ext>
             </a:extLst>
           </p:cNvPr>
@@ -4340,8 +5591,8 @@
         </p:nvSpPr>
         <p:spPr>
           <a:xfrm>
-            <a:off x="3444238" y="1710035"/>
-            <a:ext cx="2268855" cy="338554"/>
+            <a:off x="2371493" y="619144"/>
+            <a:ext cx="1612267" cy="338554"/>
           </a:xfrm>
           <a:prstGeom prst="rect">
             <a:avLst/>
@@ -4356,122 +5607,11 @@
           <a:p>
             <a:pPr algn="ctr"/>
             <a:r>
-              <a:rPr lang="en-US" altLang="ko-KR" sz="1600" b="1" dirty="0">
-                <a:solidFill>
-                  <a:schemeClr val="accent5">
-                    <a:lumMod val="60000"/>
-                    <a:lumOff val="40000"/>
-                  </a:schemeClr>
-                </a:solidFill>
-                <a:latin typeface="Times New Roman" panose="02020603050405020304" pitchFamily="18" charset="0"/>
-                <a:cs typeface="Times New Roman" panose="02020603050405020304" pitchFamily="18" charset="0"/>
-              </a:rPr>
-              <a:t>Real data fine tuning</a:t>
-            </a:r>
-            <a:endParaRPr lang="ko-KR" altLang="en-US" sz="1600" b="1" dirty="0">
-              <a:solidFill>
-                <a:schemeClr val="accent5">
-                  <a:lumMod val="60000"/>
-                  <a:lumOff val="40000"/>
-                </a:schemeClr>
-              </a:solidFill>
-              <a:latin typeface="Times New Roman" panose="02020603050405020304" pitchFamily="18" charset="0"/>
-              <a:cs typeface="Times New Roman" panose="02020603050405020304" pitchFamily="18" charset="0"/>
-            </a:endParaRPr>
-          </a:p>
-        </p:txBody>
-      </p:sp>
-      <p:sp>
-        <p:nvSpPr>
-          <p:cNvPr id="33" name="사각형: 둥근 모서리 32">
-            <a:extLst>
-              <a:ext uri="{FF2B5EF4-FFF2-40B4-BE49-F238E27FC236}">
-                <a16:creationId xmlns:a16="http://schemas.microsoft.com/office/drawing/2014/main" id="{C304A508-DCDC-B63F-8E07-9818A358CA75}"/>
-              </a:ext>
-            </a:extLst>
-          </p:cNvPr>
-          <p:cNvSpPr/>
-          <p:nvPr/>
-        </p:nvSpPr>
-        <p:spPr>
-          <a:xfrm>
-            <a:off x="2049779" y="2287532"/>
-            <a:ext cx="1221104" cy="1343976"/>
-          </a:xfrm>
-          <a:prstGeom prst="roundRect">
-            <a:avLst/>
-          </a:prstGeom>
-          <a:solidFill>
-            <a:schemeClr val="accent6">
-              <a:lumMod val="40000"/>
-              <a:lumOff val="60000"/>
-              <a:alpha val="29000"/>
-            </a:schemeClr>
-          </a:solidFill>
-          <a:ln>
-            <a:prstDash val="dash"/>
-          </a:ln>
-        </p:spPr>
-        <p:style>
-          <a:lnRef idx="2">
-            <a:schemeClr val="accent1">
-              <a:shade val="15000"/>
-            </a:schemeClr>
-          </a:lnRef>
-          <a:fillRef idx="1">
-            <a:schemeClr val="accent1"/>
-          </a:fillRef>
-          <a:effectRef idx="0">
-            <a:schemeClr val="accent1"/>
-          </a:effectRef>
-          <a:fontRef idx="minor">
-            <a:schemeClr val="lt1"/>
-          </a:fontRef>
-        </p:style>
-        <p:txBody>
-          <a:bodyPr rtlCol="0" anchor="ctr"/>
-          <a:lstStyle/>
-          <a:p>
-            <a:pPr algn="ctr"/>
-            <a:endParaRPr lang="ko-KR" altLang="en-US" sz="1600"/>
-          </a:p>
-        </p:txBody>
-      </p:sp>
-      <p:sp>
-        <p:nvSpPr>
-          <p:cNvPr id="34" name="TextBox 33">
-            <a:extLst>
-              <a:ext uri="{FF2B5EF4-FFF2-40B4-BE49-F238E27FC236}">
-                <a16:creationId xmlns:a16="http://schemas.microsoft.com/office/drawing/2014/main" id="{46F3DE15-9CBF-0301-0587-A21B8DBA10BC}"/>
-              </a:ext>
-            </a:extLst>
-          </p:cNvPr>
-          <p:cNvSpPr txBox="1"/>
-          <p:nvPr/>
-        </p:nvSpPr>
-        <p:spPr>
-          <a:xfrm>
-            <a:off x="502921" y="2774157"/>
-            <a:ext cx="1158240" cy="338554"/>
-          </a:xfrm>
-          <a:prstGeom prst="rect">
-            <a:avLst/>
-          </a:prstGeom>
-          <a:noFill/>
-        </p:spPr>
-        <p:txBody>
-          <a:bodyPr wrap="square" rtlCol="0">
-            <a:spAutoFit/>
-          </a:bodyPr>
-          <a:lstStyle/>
-          <a:p>
-            <a:pPr algn="ctr"/>
-            <a:r>
               <a:rPr lang="en-US" altLang="ko-KR" sz="1600" dirty="0">
                 <a:latin typeface="Times New Roman" panose="02020603050405020304" pitchFamily="18" charset="0"/>
                 <a:cs typeface="Times New Roman" panose="02020603050405020304" pitchFamily="18" charset="0"/>
               </a:rPr>
-              <a:t>Real data</a:t>
+              <a:t>Content encoder</a:t>
             </a:r>
             <a:endParaRPr lang="ko-KR" altLang="en-US" sz="1600" dirty="0">
               <a:latin typeface="Times New Roman" panose="02020603050405020304" pitchFamily="18" charset="0"/>
@@ -4482,193 +5622,23 @@
       </p:sp>
       <p:cxnSp>
         <p:nvCxnSpPr>
-          <p:cNvPr id="35" name="직선 화살표 연결선 34">
-            <a:extLst>
-              <a:ext uri="{FF2B5EF4-FFF2-40B4-BE49-F238E27FC236}">
-                <a16:creationId xmlns:a16="http://schemas.microsoft.com/office/drawing/2014/main" id="{7C45DF2B-A9A7-8E09-A478-DBF6D7521243}"/>
+          <p:cNvPr id="116" name="직선 화살표 연결선 115">
+            <a:extLst>
+              <a:ext uri="{FF2B5EF4-FFF2-40B4-BE49-F238E27FC236}">
+                <a16:creationId xmlns:a16="http://schemas.microsoft.com/office/drawing/2014/main" id="{BD3B3F03-9750-8190-C8EE-6DC0BD63F8C6}"/>
               </a:ext>
             </a:extLst>
           </p:cNvPr>
           <p:cNvCxnSpPr>
             <a:cxnSpLocks/>
-            <a:stCxn id="34" idx="3"/>
+            <a:stCxn id="114" idx="3"/>
           </p:cNvCxnSpPr>
           <p:nvPr/>
         </p:nvCxnSpPr>
         <p:spPr>
-          <a:xfrm flipV="1">
-            <a:off x="1661161" y="2542193"/>
-            <a:ext cx="388618" cy="401241"/>
-          </a:xfrm>
-          <a:prstGeom prst="straightConnector1">
-            <a:avLst/>
-          </a:prstGeom>
-          <a:ln>
-            <a:tailEnd type="triangle"/>
-          </a:ln>
-        </p:spPr>
-        <p:style>
-          <a:lnRef idx="2">
-            <a:schemeClr val="accent1"/>
-          </a:lnRef>
-          <a:fillRef idx="0">
-            <a:schemeClr val="accent1"/>
-          </a:fillRef>
-          <a:effectRef idx="1">
-            <a:schemeClr val="accent1"/>
-          </a:effectRef>
-          <a:fontRef idx="minor">
-            <a:schemeClr val="tx1"/>
-          </a:fontRef>
-        </p:style>
-      </p:cxnSp>
-      <p:sp>
-        <p:nvSpPr>
-          <p:cNvPr id="36" name="TextBox 35">
-            <a:extLst>
-              <a:ext uri="{FF2B5EF4-FFF2-40B4-BE49-F238E27FC236}">
-                <a16:creationId xmlns:a16="http://schemas.microsoft.com/office/drawing/2014/main" id="{46E352A8-F818-7FA5-F086-17E091701D90}"/>
-              </a:ext>
-            </a:extLst>
-          </p:cNvPr>
-          <p:cNvSpPr txBox="1"/>
-          <p:nvPr/>
-        </p:nvSpPr>
-        <p:spPr>
-          <a:xfrm>
-            <a:off x="2138212" y="3168154"/>
-            <a:ext cx="1026795" cy="338554"/>
-          </a:xfrm>
-          <a:prstGeom prst="rect">
-            <a:avLst/>
-          </a:prstGeom>
-          <a:noFill/>
-        </p:spPr>
-        <p:txBody>
-          <a:bodyPr wrap="square" rtlCol="0">
-            <a:spAutoFit/>
-          </a:bodyPr>
-          <a:lstStyle/>
-          <a:p>
-            <a:pPr algn="ctr"/>
-            <a:r>
-              <a:rPr lang="en-US" altLang="ko-KR" sz="1600" dirty="0">
-                <a:latin typeface="Times New Roman" panose="02020603050405020304" pitchFamily="18" charset="0"/>
-                <a:cs typeface="Times New Roman" panose="02020603050405020304" pitchFamily="18" charset="0"/>
-              </a:rPr>
-              <a:t>Content</a:t>
-            </a:r>
-            <a:endParaRPr lang="ko-KR" altLang="en-US" sz="1600" dirty="0">
-              <a:latin typeface="Times New Roman" panose="02020603050405020304" pitchFamily="18" charset="0"/>
-              <a:cs typeface="Times New Roman" panose="02020603050405020304" pitchFamily="18" charset="0"/>
-            </a:endParaRPr>
-          </a:p>
-        </p:txBody>
-      </p:sp>
-      <p:cxnSp>
-        <p:nvCxnSpPr>
-          <p:cNvPr id="38" name="직선 화살표 연결선 37">
-            <a:extLst>
-              <a:ext uri="{FF2B5EF4-FFF2-40B4-BE49-F238E27FC236}">
-                <a16:creationId xmlns:a16="http://schemas.microsoft.com/office/drawing/2014/main" id="{E47529AA-CCA8-79F8-5ED4-DD237D6C9121}"/>
-              </a:ext>
-            </a:extLst>
-          </p:cNvPr>
-          <p:cNvCxnSpPr>
-            <a:cxnSpLocks/>
-            <a:stCxn id="34" idx="3"/>
-          </p:cNvCxnSpPr>
-          <p:nvPr/>
-        </p:nvCxnSpPr>
-        <p:spPr>
-          <a:xfrm>
-            <a:off x="1661161" y="2943434"/>
-            <a:ext cx="416325" cy="423938"/>
-          </a:xfrm>
-          <a:prstGeom prst="straightConnector1">
-            <a:avLst/>
-          </a:prstGeom>
-          <a:ln>
-            <a:tailEnd type="triangle"/>
-          </a:ln>
-        </p:spPr>
-        <p:style>
-          <a:lnRef idx="2">
-            <a:schemeClr val="accent1"/>
-          </a:lnRef>
-          <a:fillRef idx="0">
-            <a:schemeClr val="accent1"/>
-          </a:fillRef>
-          <a:effectRef idx="1">
-            <a:schemeClr val="accent1"/>
-          </a:effectRef>
-          <a:fontRef idx="minor">
-            <a:schemeClr val="tx1"/>
-          </a:fontRef>
-        </p:style>
-      </p:cxnSp>
-      <p:sp>
-        <p:nvSpPr>
-          <p:cNvPr id="39" name="TextBox 38">
-            <a:extLst>
-              <a:ext uri="{FF2B5EF4-FFF2-40B4-BE49-F238E27FC236}">
-                <a16:creationId xmlns:a16="http://schemas.microsoft.com/office/drawing/2014/main" id="{93FE994E-ABD8-80EB-FDA5-16C388E95DC1}"/>
-              </a:ext>
-            </a:extLst>
-          </p:cNvPr>
-          <p:cNvSpPr txBox="1"/>
-          <p:nvPr/>
-        </p:nvSpPr>
-        <p:spPr>
-          <a:xfrm>
-            <a:off x="3723808" y="2742248"/>
-            <a:ext cx="1026795" cy="338554"/>
-          </a:xfrm>
-          <a:prstGeom prst="rect">
-            <a:avLst/>
-          </a:prstGeom>
-          <a:noFill/>
-        </p:spPr>
-        <p:txBody>
-          <a:bodyPr wrap="square" rtlCol="0">
-            <a:spAutoFit/>
-          </a:bodyPr>
-          <a:lstStyle/>
-          <a:p>
-            <a:pPr algn="ctr"/>
-            <a:r>
-              <a:rPr lang="en-US" altLang="ko-KR" sz="1600" dirty="0">
-                <a:latin typeface="Times New Roman" panose="02020603050405020304" pitchFamily="18" charset="0"/>
-                <a:cs typeface="Times New Roman" panose="02020603050405020304" pitchFamily="18" charset="0"/>
-              </a:rPr>
-              <a:t>Decoder</a:t>
-            </a:r>
-            <a:endParaRPr lang="ko-KR" altLang="en-US" sz="1600" dirty="0">
-              <a:latin typeface="Times New Roman" panose="02020603050405020304" pitchFamily="18" charset="0"/>
-              <a:cs typeface="Times New Roman" panose="02020603050405020304" pitchFamily="18" charset="0"/>
-            </a:endParaRPr>
-          </a:p>
-        </p:txBody>
-      </p:sp>
-      <p:cxnSp>
-        <p:nvCxnSpPr>
-          <p:cNvPr id="40" name="직선 화살표 연결선 39">
-            <a:extLst>
-              <a:ext uri="{FF2B5EF4-FFF2-40B4-BE49-F238E27FC236}">
-                <a16:creationId xmlns:a16="http://schemas.microsoft.com/office/drawing/2014/main" id="{3C46ADA5-7DC6-EB42-2F9F-04777A755376}"/>
-              </a:ext>
-            </a:extLst>
-          </p:cNvPr>
-          <p:cNvCxnSpPr>
-            <a:cxnSpLocks/>
-            <a:endCxn id="39" idx="1"/>
-          </p:cNvCxnSpPr>
-          <p:nvPr/>
-        </p:nvCxnSpPr>
-        <p:spPr>
-          <a:xfrm flipV="1">
-            <a:off x="3305172" y="2911525"/>
-            <a:ext cx="418636" cy="470550"/>
+          <a:xfrm>
+            <a:off x="4066309" y="785691"/>
+            <a:ext cx="534668" cy="0"/>
           </a:xfrm>
           <a:prstGeom prst="straightConnector1">
             <a:avLst/>
@@ -4694,23 +5664,22 @@
       </p:cxnSp>
       <p:cxnSp>
         <p:nvCxnSpPr>
-          <p:cNvPr id="41" name="직선 화살표 연결선 40">
-            <a:extLst>
-              <a:ext uri="{FF2B5EF4-FFF2-40B4-BE49-F238E27FC236}">
-                <a16:creationId xmlns:a16="http://schemas.microsoft.com/office/drawing/2014/main" id="{BCA8E997-5CDB-4A7D-AF46-BD6349E9D7FC}"/>
+          <p:cNvPr id="118" name="직선 화살표 연결선 117">
+            <a:extLst>
+              <a:ext uri="{FF2B5EF4-FFF2-40B4-BE49-F238E27FC236}">
+                <a16:creationId xmlns:a16="http://schemas.microsoft.com/office/drawing/2014/main" id="{515543A9-14F8-3E10-FF73-F5AE8E27F89B}"/>
               </a:ext>
             </a:extLst>
           </p:cNvPr>
           <p:cNvCxnSpPr>
             <a:cxnSpLocks/>
-            <a:endCxn id="39" idx="1"/>
           </p:cNvCxnSpPr>
           <p:nvPr/>
         </p:nvCxnSpPr>
         <p:spPr>
           <a:xfrm>
-            <a:off x="3287080" y="2603748"/>
-            <a:ext cx="436728" cy="307777"/>
+            <a:off x="5627772" y="781673"/>
+            <a:ext cx="534668" cy="0"/>
           </a:xfrm>
           <a:prstGeom prst="straightConnector1">
             <a:avLst/>
@@ -4734,55 +5703,12 @@
           </a:fontRef>
         </p:style>
       </p:cxnSp>
-      <p:cxnSp>
-        <p:nvCxnSpPr>
-          <p:cNvPr id="42" name="직선 화살표 연결선 41">
-            <a:extLst>
-              <a:ext uri="{FF2B5EF4-FFF2-40B4-BE49-F238E27FC236}">
-                <a16:creationId xmlns:a16="http://schemas.microsoft.com/office/drawing/2014/main" id="{6EA76A74-0D2E-0E36-5AB7-01546A17903C}"/>
-              </a:ext>
-            </a:extLst>
-          </p:cNvPr>
-          <p:cNvCxnSpPr>
-            <a:cxnSpLocks/>
-            <a:stCxn id="39" idx="3"/>
-            <a:endCxn id="43" idx="1"/>
-          </p:cNvCxnSpPr>
-          <p:nvPr/>
-        </p:nvCxnSpPr>
-        <p:spPr>
-          <a:xfrm flipV="1">
-            <a:off x="4750603" y="2910343"/>
-            <a:ext cx="621032" cy="1182"/>
-          </a:xfrm>
-          <a:prstGeom prst="straightConnector1">
-            <a:avLst/>
-          </a:prstGeom>
-          <a:ln>
-            <a:tailEnd type="triangle"/>
-          </a:ln>
-        </p:spPr>
-        <p:style>
-          <a:lnRef idx="2">
-            <a:schemeClr val="accent1"/>
-          </a:lnRef>
-          <a:fillRef idx="0">
-            <a:schemeClr val="accent1"/>
-          </a:fillRef>
-          <a:effectRef idx="1">
-            <a:schemeClr val="accent1"/>
-          </a:effectRef>
-          <a:fontRef idx="minor">
-            <a:schemeClr val="tx1"/>
-          </a:fontRef>
-        </p:style>
-      </p:cxnSp>
-      <p:sp>
-        <p:nvSpPr>
-          <p:cNvPr id="43" name="TextBox 42">
-            <a:extLst>
-              <a:ext uri="{FF2B5EF4-FFF2-40B4-BE49-F238E27FC236}">
-                <a16:creationId xmlns:a16="http://schemas.microsoft.com/office/drawing/2014/main" id="{30400D80-177A-FDF9-A733-C71AB39136BE}"/>
+      <p:sp>
+        <p:nvSpPr>
+          <p:cNvPr id="119" name="TextBox 118">
+            <a:extLst>
+              <a:ext uri="{FF2B5EF4-FFF2-40B4-BE49-F238E27FC236}">
+                <a16:creationId xmlns:a16="http://schemas.microsoft.com/office/drawing/2014/main" id="{10351A5B-9F3D-FA99-8EDA-6B1488FF5D47}"/>
               </a:ext>
             </a:extLst>
           </p:cNvPr>
@@ -4791,8 +5717,8 @@
         </p:nvSpPr>
         <p:spPr>
           <a:xfrm>
-            <a:off x="5371635" y="2741066"/>
-            <a:ext cx="1026795" cy="338554"/>
+            <a:off x="6003375" y="489285"/>
+            <a:ext cx="1612267" cy="584775"/>
           </a:xfrm>
           <a:prstGeom prst="rect">
             <a:avLst/>
@@ -4811,7 +5737,17 @@
                 <a:latin typeface="Times New Roman" panose="02020603050405020304" pitchFamily="18" charset="0"/>
                 <a:cs typeface="Times New Roman" panose="02020603050405020304" pitchFamily="18" charset="0"/>
               </a:rPr>
-              <a:t>Real data</a:t>
+              <a:t>1 or 0</a:t>
+            </a:r>
+          </a:p>
+          <a:p>
+            <a:pPr algn="ctr"/>
+            <a:r>
+              <a:rPr lang="en-US" altLang="ko-KR" sz="1600" dirty="0">
+                <a:latin typeface="Times New Roman" panose="02020603050405020304" pitchFamily="18" charset="0"/>
+                <a:cs typeface="Times New Roman" panose="02020603050405020304" pitchFamily="18" charset="0"/>
+              </a:rPr>
+              <a:t>(up down)</a:t>
             </a:r>
             <a:endParaRPr lang="ko-KR" altLang="en-US" sz="1600" dirty="0">
               <a:latin typeface="Times New Roman" panose="02020603050405020304" pitchFamily="18" charset="0"/>
@@ -4820,96 +5756,12 @@
           </a:p>
         </p:txBody>
       </p:sp>
-      <p:pic>
-        <p:nvPicPr>
-          <p:cNvPr id="44" name="그림 43">
-            <a:extLst>
-              <a:ext uri="{FF2B5EF4-FFF2-40B4-BE49-F238E27FC236}">
-                <a16:creationId xmlns:a16="http://schemas.microsoft.com/office/drawing/2014/main" id="{4677C119-5649-2ECC-B202-A22169D3C92F}"/>
-              </a:ext>
-            </a:extLst>
-          </p:cNvPr>
-          <p:cNvPicPr>
-            <a:picLocks noChangeAspect="1"/>
-          </p:cNvPicPr>
-          <p:nvPr/>
-        </p:nvPicPr>
-        <p:blipFill>
-          <a:blip r:embed="rId3"/>
-          <a:stretch>
-            <a:fillRect/>
-          </a:stretch>
-        </p:blipFill>
-        <p:spPr>
-          <a:xfrm>
-            <a:off x="5574022" y="2631803"/>
-            <a:ext cx="622020" cy="200053"/>
-          </a:xfrm>
-          <a:prstGeom prst="rect">
-            <a:avLst/>
-          </a:prstGeom>
-        </p:spPr>
-      </p:pic>
-      <p:sp>
-        <p:nvSpPr>
-          <p:cNvPr id="48" name="타원 47">
-            <a:extLst>
-              <a:ext uri="{FF2B5EF4-FFF2-40B4-BE49-F238E27FC236}">
-                <a16:creationId xmlns:a16="http://schemas.microsoft.com/office/drawing/2014/main" id="{5A783236-DB0B-F0C4-A591-0221D12CC419}"/>
-              </a:ext>
-            </a:extLst>
-          </p:cNvPr>
-          <p:cNvSpPr/>
-          <p:nvPr/>
-        </p:nvSpPr>
-        <p:spPr>
-          <a:xfrm>
-            <a:off x="2079309" y="2399909"/>
-            <a:ext cx="1205427" cy="369332"/>
-          </a:xfrm>
-          <a:prstGeom prst="ellipse">
-            <a:avLst/>
-          </a:prstGeom>
-          <a:solidFill>
-            <a:srgbClr val="FF0000">
-              <a:alpha val="17000"/>
-            </a:srgbClr>
-          </a:solidFill>
-          <a:ln>
-            <a:prstDash val="sysDash"/>
-          </a:ln>
-        </p:spPr>
-        <p:style>
-          <a:lnRef idx="2">
-            <a:schemeClr val="accent1">
-              <a:shade val="15000"/>
-            </a:schemeClr>
-          </a:lnRef>
-          <a:fillRef idx="1">
-            <a:schemeClr val="accent1"/>
-          </a:fillRef>
-          <a:effectRef idx="0">
-            <a:schemeClr val="accent1"/>
-          </a:effectRef>
-          <a:fontRef idx="minor">
-            <a:schemeClr val="lt1"/>
-          </a:fontRef>
-        </p:style>
-        <p:txBody>
-          <a:bodyPr rtlCol="0" anchor="ctr"/>
-          <a:lstStyle/>
-          <a:p>
-            <a:pPr algn="ctr"/>
-            <a:endParaRPr lang="ko-KR" altLang="en-US"/>
-          </a:p>
-        </p:txBody>
-      </p:sp>
-      <p:sp>
-        <p:nvSpPr>
-          <p:cNvPr id="49" name="TextBox 48">
-            <a:extLst>
-              <a:ext uri="{FF2B5EF4-FFF2-40B4-BE49-F238E27FC236}">
-                <a16:creationId xmlns:a16="http://schemas.microsoft.com/office/drawing/2014/main" id="{18CC7829-40D9-F7AC-4F2C-5319A8F50D9E}"/>
+      <p:sp>
+        <p:nvSpPr>
+          <p:cNvPr id="120" name="TextBox 119">
+            <a:extLst>
+              <a:ext uri="{FF2B5EF4-FFF2-40B4-BE49-F238E27FC236}">
+                <a16:creationId xmlns:a16="http://schemas.microsoft.com/office/drawing/2014/main" id="{314894F4-E5BA-F22E-2C09-5DAC5724CEA6}"/>
               </a:ext>
             </a:extLst>
           </p:cNvPr>
@@ -4918,8 +5770,8 @@
         </p:nvSpPr>
         <p:spPr>
           <a:xfrm>
-            <a:off x="3054341" y="2248310"/>
-            <a:ext cx="1026795" cy="307777"/>
+            <a:off x="3239177" y="5594096"/>
+            <a:ext cx="1558260" cy="338554"/>
           </a:xfrm>
           <a:prstGeom prst="rect">
             <a:avLst/>
@@ -4934,1068 +5786,32 @@
           <a:p>
             <a:pPr algn="ctr"/>
             <a:r>
-              <a:rPr lang="en-US" altLang="ko-KR" sz="1400" b="1" dirty="0">
+              <a:rPr lang="en-US" altLang="ko-KR" sz="1600" b="1" dirty="0">
                 <a:solidFill>
                   <a:srgbClr val="FF0000"/>
                 </a:solidFill>
                 <a:latin typeface="Times New Roman" panose="02020603050405020304" pitchFamily="18" charset="0"/>
                 <a:cs typeface="Times New Roman" panose="02020603050405020304" pitchFamily="18" charset="0"/>
               </a:rPr>
-              <a:t>Freeze</a:t>
-            </a:r>
-            <a:endParaRPr lang="ko-KR" altLang="en-US" sz="1400" b="1" dirty="0">
+              <a:t>Sim style </a:t>
+            </a:r>
+            <a:r>
+              <a:rPr lang="el-GR" altLang="ko-KR" sz="1600" b="1" dirty="0">
+                <a:solidFill>
+                  <a:srgbClr val="FF0000"/>
+                </a:solidFill>
+                <a:latin typeface="Times New Roman" panose="02020603050405020304" pitchFamily="18" charset="0"/>
+                <a:cs typeface="Times New Roman" panose="02020603050405020304" pitchFamily="18" charset="0"/>
+              </a:rPr>
+              <a:t>μ</a:t>
+            </a:r>
+            <a:endParaRPr lang="ko-KR" altLang="en-US" sz="1600" b="1" dirty="0">
               <a:solidFill>
                 <a:srgbClr val="FF0000"/>
               </a:solidFill>
               <a:latin typeface="Times New Roman" panose="02020603050405020304" pitchFamily="18" charset="0"/>
               <a:cs typeface="Times New Roman" panose="02020603050405020304" pitchFamily="18" charset="0"/>
             </a:endParaRPr>
-          </a:p>
-        </p:txBody>
-      </p:sp>
-      <p:sp>
-        <p:nvSpPr>
-          <p:cNvPr id="50" name="타원 49">
-            <a:extLst>
-              <a:ext uri="{FF2B5EF4-FFF2-40B4-BE49-F238E27FC236}">
-                <a16:creationId xmlns:a16="http://schemas.microsoft.com/office/drawing/2014/main" id="{2552CFC8-F664-4EF7-BAA5-F27836CC0C3B}"/>
-              </a:ext>
-            </a:extLst>
-          </p:cNvPr>
-          <p:cNvSpPr/>
-          <p:nvPr/>
-        </p:nvSpPr>
-        <p:spPr>
-          <a:xfrm>
-            <a:off x="3838110" y="2740761"/>
-            <a:ext cx="765803" cy="369332"/>
-          </a:xfrm>
-          <a:prstGeom prst="ellipse">
-            <a:avLst/>
-          </a:prstGeom>
-          <a:solidFill>
-            <a:srgbClr val="FF0000">
-              <a:alpha val="17000"/>
-            </a:srgbClr>
-          </a:solidFill>
-          <a:ln>
-            <a:prstDash val="sysDash"/>
-          </a:ln>
-        </p:spPr>
-        <p:style>
-          <a:lnRef idx="2">
-            <a:schemeClr val="accent1">
-              <a:shade val="15000"/>
-            </a:schemeClr>
-          </a:lnRef>
-          <a:fillRef idx="1">
-            <a:schemeClr val="accent1"/>
-          </a:fillRef>
-          <a:effectRef idx="0">
-            <a:schemeClr val="accent1"/>
-          </a:effectRef>
-          <a:fontRef idx="minor">
-            <a:schemeClr val="lt1"/>
-          </a:fontRef>
-        </p:style>
-        <p:txBody>
-          <a:bodyPr rtlCol="0" anchor="ctr"/>
-          <a:lstStyle/>
-          <a:p>
-            <a:pPr algn="ctr"/>
-            <a:endParaRPr lang="ko-KR" altLang="en-US"/>
-          </a:p>
-        </p:txBody>
-      </p:sp>
-      <p:sp>
-        <p:nvSpPr>
-          <p:cNvPr id="51" name="TextBox 50">
-            <a:extLst>
-              <a:ext uri="{FF2B5EF4-FFF2-40B4-BE49-F238E27FC236}">
-                <a16:creationId xmlns:a16="http://schemas.microsoft.com/office/drawing/2014/main" id="{B615AB12-DE73-334B-D57A-AA908AD2A45A}"/>
-              </a:ext>
-            </a:extLst>
-          </p:cNvPr>
-          <p:cNvSpPr txBox="1"/>
-          <p:nvPr/>
-        </p:nvSpPr>
-        <p:spPr>
-          <a:xfrm>
-            <a:off x="4310551" y="2593330"/>
-            <a:ext cx="1026795" cy="307777"/>
-          </a:xfrm>
-          <a:prstGeom prst="rect">
-            <a:avLst/>
-          </a:prstGeom>
-          <a:noFill/>
-        </p:spPr>
-        <p:txBody>
-          <a:bodyPr wrap="square" rtlCol="0">
-            <a:spAutoFit/>
-          </a:bodyPr>
-          <a:lstStyle/>
-          <a:p>
-            <a:pPr algn="ctr"/>
-            <a:r>
-              <a:rPr lang="en-US" altLang="ko-KR" sz="1400" b="1" dirty="0">
-                <a:solidFill>
-                  <a:srgbClr val="FF0000"/>
-                </a:solidFill>
-                <a:latin typeface="Times New Roman" panose="02020603050405020304" pitchFamily="18" charset="0"/>
-                <a:cs typeface="Times New Roman" panose="02020603050405020304" pitchFamily="18" charset="0"/>
-              </a:rPr>
-              <a:t>Freeze</a:t>
-            </a:r>
-            <a:endParaRPr lang="ko-KR" altLang="en-US" sz="1400" b="1" dirty="0">
-              <a:solidFill>
-                <a:srgbClr val="FF0000"/>
-              </a:solidFill>
-              <a:latin typeface="Times New Roman" panose="02020603050405020304" pitchFamily="18" charset="0"/>
-              <a:cs typeface="Times New Roman" panose="02020603050405020304" pitchFamily="18" charset="0"/>
-            </a:endParaRPr>
-          </a:p>
-        </p:txBody>
-      </p:sp>
-      <p:sp>
-        <p:nvSpPr>
-          <p:cNvPr id="52" name="사각형: 둥근 모서리 51">
-            <a:extLst>
-              <a:ext uri="{FF2B5EF4-FFF2-40B4-BE49-F238E27FC236}">
-                <a16:creationId xmlns:a16="http://schemas.microsoft.com/office/drawing/2014/main" id="{F5481DDF-C60E-72CC-BDC7-BD53F15FB81A}"/>
-              </a:ext>
-            </a:extLst>
-          </p:cNvPr>
-          <p:cNvSpPr/>
-          <p:nvPr/>
-        </p:nvSpPr>
-        <p:spPr>
-          <a:xfrm>
-            <a:off x="2049779" y="4109247"/>
-            <a:ext cx="1221104" cy="1343976"/>
-          </a:xfrm>
-          <a:prstGeom prst="roundRect">
-            <a:avLst/>
-          </a:prstGeom>
-          <a:solidFill>
-            <a:schemeClr val="accent6">
-              <a:lumMod val="40000"/>
-              <a:lumOff val="60000"/>
-              <a:alpha val="29000"/>
-            </a:schemeClr>
-          </a:solidFill>
-          <a:ln>
-            <a:prstDash val="dash"/>
-          </a:ln>
-        </p:spPr>
-        <p:style>
-          <a:lnRef idx="2">
-            <a:schemeClr val="accent1">
-              <a:shade val="15000"/>
-            </a:schemeClr>
-          </a:lnRef>
-          <a:fillRef idx="1">
-            <a:schemeClr val="accent1"/>
-          </a:fillRef>
-          <a:effectRef idx="0">
-            <a:schemeClr val="accent1"/>
-          </a:effectRef>
-          <a:fontRef idx="minor">
-            <a:schemeClr val="lt1"/>
-          </a:fontRef>
-        </p:style>
-        <p:txBody>
-          <a:bodyPr rtlCol="0" anchor="ctr"/>
-          <a:lstStyle/>
-          <a:p>
-            <a:pPr algn="ctr"/>
-            <a:endParaRPr lang="ko-KR" altLang="en-US" sz="1600"/>
-          </a:p>
-        </p:txBody>
-      </p:sp>
-      <p:sp>
-        <p:nvSpPr>
-          <p:cNvPr id="53" name="TextBox 52">
-            <a:extLst>
-              <a:ext uri="{FF2B5EF4-FFF2-40B4-BE49-F238E27FC236}">
-                <a16:creationId xmlns:a16="http://schemas.microsoft.com/office/drawing/2014/main" id="{F91D7ACD-C1C6-EB71-7AD4-1ACA01353B06}"/>
-              </a:ext>
-            </a:extLst>
-          </p:cNvPr>
-          <p:cNvSpPr txBox="1"/>
-          <p:nvPr/>
-        </p:nvSpPr>
-        <p:spPr>
-          <a:xfrm>
-            <a:off x="502921" y="4595872"/>
-            <a:ext cx="1158240" cy="338554"/>
-          </a:xfrm>
-          <a:prstGeom prst="rect">
-            <a:avLst/>
-          </a:prstGeom>
-          <a:noFill/>
-        </p:spPr>
-        <p:txBody>
-          <a:bodyPr wrap="square" rtlCol="0">
-            <a:spAutoFit/>
-          </a:bodyPr>
-          <a:lstStyle/>
-          <a:p>
-            <a:pPr algn="ctr"/>
-            <a:r>
-              <a:rPr lang="en-US" altLang="ko-KR" sz="1600" dirty="0">
-                <a:latin typeface="Times New Roman" panose="02020603050405020304" pitchFamily="18" charset="0"/>
-                <a:cs typeface="Times New Roman" panose="02020603050405020304" pitchFamily="18" charset="0"/>
-              </a:rPr>
-              <a:t>Real data</a:t>
-            </a:r>
-            <a:endParaRPr lang="ko-KR" altLang="en-US" sz="1600" dirty="0">
-              <a:latin typeface="Times New Roman" panose="02020603050405020304" pitchFamily="18" charset="0"/>
-              <a:cs typeface="Times New Roman" panose="02020603050405020304" pitchFamily="18" charset="0"/>
-            </a:endParaRPr>
-          </a:p>
-        </p:txBody>
-      </p:sp>
-      <p:sp>
-        <p:nvSpPr>
-          <p:cNvPr id="55" name="TextBox 54">
-            <a:extLst>
-              <a:ext uri="{FF2B5EF4-FFF2-40B4-BE49-F238E27FC236}">
-                <a16:creationId xmlns:a16="http://schemas.microsoft.com/office/drawing/2014/main" id="{5215C7CA-45E4-8705-8309-03B53EE41C50}"/>
-              </a:ext>
-            </a:extLst>
-          </p:cNvPr>
-          <p:cNvSpPr txBox="1"/>
-          <p:nvPr/>
-        </p:nvSpPr>
-        <p:spPr>
-          <a:xfrm>
-            <a:off x="2134635" y="4992184"/>
-            <a:ext cx="1026795" cy="338554"/>
-          </a:xfrm>
-          <a:prstGeom prst="rect">
-            <a:avLst/>
-          </a:prstGeom>
-          <a:noFill/>
-        </p:spPr>
-        <p:txBody>
-          <a:bodyPr wrap="square" rtlCol="0">
-            <a:spAutoFit/>
-          </a:bodyPr>
-          <a:lstStyle/>
-          <a:p>
-            <a:pPr algn="ctr"/>
-            <a:r>
-              <a:rPr lang="en-US" altLang="ko-KR" sz="1600" dirty="0">
-                <a:latin typeface="Times New Roman" panose="02020603050405020304" pitchFamily="18" charset="0"/>
-                <a:cs typeface="Times New Roman" panose="02020603050405020304" pitchFamily="18" charset="0"/>
-              </a:rPr>
-              <a:t>Content</a:t>
-            </a:r>
-            <a:endParaRPr lang="ko-KR" altLang="en-US" sz="1600" dirty="0">
-              <a:latin typeface="Times New Roman" panose="02020603050405020304" pitchFamily="18" charset="0"/>
-              <a:cs typeface="Times New Roman" panose="02020603050405020304" pitchFamily="18" charset="0"/>
-            </a:endParaRPr>
-          </a:p>
-        </p:txBody>
-      </p:sp>
-      <p:cxnSp>
-        <p:nvCxnSpPr>
-          <p:cNvPr id="57" name="직선 화살표 연결선 56">
-            <a:extLst>
-              <a:ext uri="{FF2B5EF4-FFF2-40B4-BE49-F238E27FC236}">
-                <a16:creationId xmlns:a16="http://schemas.microsoft.com/office/drawing/2014/main" id="{E28B3AEA-215C-2459-4DF3-CF2081A2DBBE}"/>
-              </a:ext>
-            </a:extLst>
-          </p:cNvPr>
-          <p:cNvCxnSpPr>
-            <a:cxnSpLocks/>
-            <a:stCxn id="53" idx="3"/>
-          </p:cNvCxnSpPr>
-          <p:nvPr/>
-        </p:nvCxnSpPr>
-        <p:spPr>
-          <a:xfrm>
-            <a:off x="1661161" y="4765149"/>
-            <a:ext cx="387257" cy="414784"/>
-          </a:xfrm>
-          <a:prstGeom prst="straightConnector1">
-            <a:avLst/>
-          </a:prstGeom>
-          <a:ln>
-            <a:tailEnd type="triangle"/>
-          </a:ln>
-        </p:spPr>
-        <p:style>
-          <a:lnRef idx="2">
-            <a:schemeClr val="accent1"/>
-          </a:lnRef>
-          <a:fillRef idx="0">
-            <a:schemeClr val="accent1"/>
-          </a:fillRef>
-          <a:effectRef idx="1">
-            <a:schemeClr val="accent1"/>
-          </a:effectRef>
-          <a:fontRef idx="minor">
-            <a:schemeClr val="tx1"/>
-          </a:fontRef>
-        </p:style>
-      </p:cxnSp>
-      <p:sp>
-        <p:nvSpPr>
-          <p:cNvPr id="58" name="TextBox 57">
-            <a:extLst>
-              <a:ext uri="{FF2B5EF4-FFF2-40B4-BE49-F238E27FC236}">
-                <a16:creationId xmlns:a16="http://schemas.microsoft.com/office/drawing/2014/main" id="{D6AC95D0-81DD-DA9F-AD1E-93725F23CC84}"/>
-              </a:ext>
-            </a:extLst>
-          </p:cNvPr>
-          <p:cNvSpPr txBox="1"/>
-          <p:nvPr/>
-        </p:nvSpPr>
-        <p:spPr>
-          <a:xfrm>
-            <a:off x="3723808" y="4563963"/>
-            <a:ext cx="1026795" cy="338554"/>
-          </a:xfrm>
-          <a:prstGeom prst="rect">
-            <a:avLst/>
-          </a:prstGeom>
-          <a:noFill/>
-        </p:spPr>
-        <p:txBody>
-          <a:bodyPr wrap="square" rtlCol="0">
-            <a:spAutoFit/>
-          </a:bodyPr>
-          <a:lstStyle/>
-          <a:p>
-            <a:pPr algn="ctr"/>
-            <a:r>
-              <a:rPr lang="en-US" altLang="ko-KR" sz="1600" dirty="0">
-                <a:latin typeface="Times New Roman" panose="02020603050405020304" pitchFamily="18" charset="0"/>
-                <a:cs typeface="Times New Roman" panose="02020603050405020304" pitchFamily="18" charset="0"/>
-              </a:rPr>
-              <a:t>Decoder</a:t>
-            </a:r>
-            <a:endParaRPr lang="ko-KR" altLang="en-US" sz="1600" dirty="0">
-              <a:latin typeface="Times New Roman" panose="02020603050405020304" pitchFamily="18" charset="0"/>
-              <a:cs typeface="Times New Roman" panose="02020603050405020304" pitchFamily="18" charset="0"/>
-            </a:endParaRPr>
-          </a:p>
-        </p:txBody>
-      </p:sp>
-      <p:cxnSp>
-        <p:nvCxnSpPr>
-          <p:cNvPr id="59" name="직선 화살표 연결선 58">
-            <a:extLst>
-              <a:ext uri="{FF2B5EF4-FFF2-40B4-BE49-F238E27FC236}">
-                <a16:creationId xmlns:a16="http://schemas.microsoft.com/office/drawing/2014/main" id="{1DCAC305-CBC3-0E94-6F85-F7EE528867EF}"/>
-              </a:ext>
-            </a:extLst>
-          </p:cNvPr>
-          <p:cNvCxnSpPr>
-            <a:cxnSpLocks/>
-            <a:endCxn id="58" idx="1"/>
-          </p:cNvCxnSpPr>
-          <p:nvPr/>
-        </p:nvCxnSpPr>
-        <p:spPr>
-          <a:xfrm flipV="1">
-            <a:off x="3305172" y="4733240"/>
-            <a:ext cx="418636" cy="414725"/>
-          </a:xfrm>
-          <a:prstGeom prst="straightConnector1">
-            <a:avLst/>
-          </a:prstGeom>
-          <a:ln>
-            <a:tailEnd type="triangle"/>
-          </a:ln>
-        </p:spPr>
-        <p:style>
-          <a:lnRef idx="2">
-            <a:schemeClr val="accent1"/>
-          </a:lnRef>
-          <a:fillRef idx="0">
-            <a:schemeClr val="accent1"/>
-          </a:fillRef>
-          <a:effectRef idx="1">
-            <a:schemeClr val="accent1"/>
-          </a:effectRef>
-          <a:fontRef idx="minor">
-            <a:schemeClr val="tx1"/>
-          </a:fontRef>
-        </p:style>
-      </p:cxnSp>
-      <p:cxnSp>
-        <p:nvCxnSpPr>
-          <p:cNvPr id="60" name="직선 화살표 연결선 59">
-            <a:extLst>
-              <a:ext uri="{FF2B5EF4-FFF2-40B4-BE49-F238E27FC236}">
-                <a16:creationId xmlns:a16="http://schemas.microsoft.com/office/drawing/2014/main" id="{0472543C-70FC-F623-578A-98CFFA4B5F04}"/>
-              </a:ext>
-            </a:extLst>
-          </p:cNvPr>
-          <p:cNvCxnSpPr>
-            <a:cxnSpLocks/>
-            <a:endCxn id="58" idx="1"/>
-          </p:cNvCxnSpPr>
-          <p:nvPr/>
-        </p:nvCxnSpPr>
-        <p:spPr>
-          <a:xfrm>
-            <a:off x="3284736" y="4384848"/>
-            <a:ext cx="439072" cy="348392"/>
-          </a:xfrm>
-          <a:prstGeom prst="straightConnector1">
-            <a:avLst/>
-          </a:prstGeom>
-          <a:ln>
-            <a:tailEnd type="triangle"/>
-          </a:ln>
-        </p:spPr>
-        <p:style>
-          <a:lnRef idx="2">
-            <a:schemeClr val="accent1"/>
-          </a:lnRef>
-          <a:fillRef idx="0">
-            <a:schemeClr val="accent1"/>
-          </a:fillRef>
-          <a:effectRef idx="1">
-            <a:schemeClr val="accent1"/>
-          </a:effectRef>
-          <a:fontRef idx="minor">
-            <a:schemeClr val="tx1"/>
-          </a:fontRef>
-        </p:style>
-      </p:cxnSp>
-      <p:cxnSp>
-        <p:nvCxnSpPr>
-          <p:cNvPr id="61" name="직선 화살표 연결선 60">
-            <a:extLst>
-              <a:ext uri="{FF2B5EF4-FFF2-40B4-BE49-F238E27FC236}">
-                <a16:creationId xmlns:a16="http://schemas.microsoft.com/office/drawing/2014/main" id="{2B0FDF91-FF31-8BF6-1DB7-9C97D55E3C2C}"/>
-              </a:ext>
-            </a:extLst>
-          </p:cNvPr>
-          <p:cNvCxnSpPr>
-            <a:cxnSpLocks/>
-            <a:stCxn id="58" idx="3"/>
-            <a:endCxn id="62" idx="1"/>
-          </p:cNvCxnSpPr>
-          <p:nvPr/>
-        </p:nvCxnSpPr>
-        <p:spPr>
-          <a:xfrm flipV="1">
-            <a:off x="4750603" y="4732058"/>
-            <a:ext cx="621032" cy="1182"/>
-          </a:xfrm>
-          <a:prstGeom prst="straightConnector1">
-            <a:avLst/>
-          </a:prstGeom>
-          <a:ln>
-            <a:tailEnd type="triangle"/>
-          </a:ln>
-        </p:spPr>
-        <p:style>
-          <a:lnRef idx="2">
-            <a:schemeClr val="accent1"/>
-          </a:lnRef>
-          <a:fillRef idx="0">
-            <a:schemeClr val="accent1"/>
-          </a:fillRef>
-          <a:effectRef idx="1">
-            <a:schemeClr val="accent1"/>
-          </a:effectRef>
-          <a:fontRef idx="minor">
-            <a:schemeClr val="tx1"/>
-          </a:fontRef>
-        </p:style>
-      </p:cxnSp>
-      <p:sp>
-        <p:nvSpPr>
-          <p:cNvPr id="62" name="TextBox 61">
-            <a:extLst>
-              <a:ext uri="{FF2B5EF4-FFF2-40B4-BE49-F238E27FC236}">
-                <a16:creationId xmlns:a16="http://schemas.microsoft.com/office/drawing/2014/main" id="{F4C991BF-71C5-17E0-D460-2444D899DEAA}"/>
-              </a:ext>
-            </a:extLst>
-          </p:cNvPr>
-          <p:cNvSpPr txBox="1"/>
-          <p:nvPr/>
-        </p:nvSpPr>
-        <p:spPr>
-          <a:xfrm>
-            <a:off x="5371635" y="4562781"/>
-            <a:ext cx="1026795" cy="338554"/>
-          </a:xfrm>
-          <a:prstGeom prst="rect">
-            <a:avLst/>
-          </a:prstGeom>
-          <a:noFill/>
-        </p:spPr>
-        <p:txBody>
-          <a:bodyPr wrap="square" rtlCol="0">
-            <a:spAutoFit/>
-          </a:bodyPr>
-          <a:lstStyle/>
-          <a:p>
-            <a:pPr algn="ctr"/>
-            <a:r>
-              <a:rPr lang="en-US" altLang="ko-KR" sz="1600" dirty="0">
-                <a:latin typeface="Times New Roman" panose="02020603050405020304" pitchFamily="18" charset="0"/>
-                <a:cs typeface="Times New Roman" panose="02020603050405020304" pitchFamily="18" charset="0"/>
-              </a:rPr>
-              <a:t>Real2sim</a:t>
-            </a:r>
-            <a:endParaRPr lang="ko-KR" altLang="en-US" sz="1600" dirty="0">
-              <a:latin typeface="Times New Roman" panose="02020603050405020304" pitchFamily="18" charset="0"/>
-              <a:cs typeface="Times New Roman" panose="02020603050405020304" pitchFamily="18" charset="0"/>
-            </a:endParaRPr>
-          </a:p>
-        </p:txBody>
-      </p:sp>
-      <p:cxnSp>
-        <p:nvCxnSpPr>
-          <p:cNvPr id="68" name="직선 화살표 연결선 67">
-            <a:extLst>
-              <a:ext uri="{FF2B5EF4-FFF2-40B4-BE49-F238E27FC236}">
-                <a16:creationId xmlns:a16="http://schemas.microsoft.com/office/drawing/2014/main" id="{4C292DFC-D39A-ED89-AE4F-1D658ABA769E}"/>
-              </a:ext>
-            </a:extLst>
-          </p:cNvPr>
-          <p:cNvCxnSpPr>
-            <a:cxnSpLocks/>
-            <a:stCxn id="53" idx="3"/>
-          </p:cNvCxnSpPr>
-          <p:nvPr/>
-        </p:nvCxnSpPr>
-        <p:spPr>
-          <a:xfrm flipV="1">
-            <a:off x="1661161" y="4363908"/>
-            <a:ext cx="388619" cy="401241"/>
-          </a:xfrm>
-          <a:prstGeom prst="straightConnector1">
-            <a:avLst/>
-          </a:prstGeom>
-          <a:ln>
-            <a:tailEnd type="triangle"/>
-          </a:ln>
-        </p:spPr>
-        <p:style>
-          <a:lnRef idx="2">
-            <a:schemeClr val="accent1"/>
-          </a:lnRef>
-          <a:fillRef idx="0">
-            <a:schemeClr val="accent1"/>
-          </a:fillRef>
-          <a:effectRef idx="1">
-            <a:schemeClr val="accent1"/>
-          </a:effectRef>
-          <a:fontRef idx="minor">
-            <a:schemeClr val="tx1"/>
-          </a:fontRef>
-        </p:style>
-      </p:cxnSp>
-      <p:sp>
-        <p:nvSpPr>
-          <p:cNvPr id="71" name="곱하기 기호 70">
-            <a:extLst>
-              <a:ext uri="{FF2B5EF4-FFF2-40B4-BE49-F238E27FC236}">
-                <a16:creationId xmlns:a16="http://schemas.microsoft.com/office/drawing/2014/main" id="{4B353B0F-4D85-C066-0150-2A685844B445}"/>
-              </a:ext>
-            </a:extLst>
-          </p:cNvPr>
-          <p:cNvSpPr/>
-          <p:nvPr/>
-        </p:nvSpPr>
-        <p:spPr>
-          <a:xfrm>
-            <a:off x="1651866" y="4449913"/>
-            <a:ext cx="353871" cy="306528"/>
-          </a:xfrm>
-          <a:prstGeom prst="mathMultiply">
-            <a:avLst/>
-          </a:prstGeom>
-          <a:solidFill>
-            <a:srgbClr val="C00000"/>
-          </a:solidFill>
-        </p:spPr>
-        <p:style>
-          <a:lnRef idx="2">
-            <a:schemeClr val="accent1">
-              <a:shade val="15000"/>
-            </a:schemeClr>
-          </a:lnRef>
-          <a:fillRef idx="1">
-            <a:schemeClr val="accent1"/>
-          </a:fillRef>
-          <a:effectRef idx="0">
-            <a:schemeClr val="accent1"/>
-          </a:effectRef>
-          <a:fontRef idx="minor">
-            <a:schemeClr val="lt1"/>
-          </a:fontRef>
-        </p:style>
-        <p:txBody>
-          <a:bodyPr rtlCol="0" anchor="ctr"/>
-          <a:lstStyle/>
-          <a:p>
-            <a:pPr algn="ctr"/>
-            <a:endParaRPr lang="ko-KR" altLang="en-US"/>
-          </a:p>
-        </p:txBody>
-      </p:sp>
-      <p:sp>
-        <p:nvSpPr>
-          <p:cNvPr id="2" name="TextBox 1">
-            <a:extLst>
-              <a:ext uri="{FF2B5EF4-FFF2-40B4-BE49-F238E27FC236}">
-                <a16:creationId xmlns:a16="http://schemas.microsoft.com/office/drawing/2014/main" id="{59471B73-4489-3FEF-80E1-5BAC8AD2FA9A}"/>
-              </a:ext>
-            </a:extLst>
-          </p:cNvPr>
-          <p:cNvSpPr txBox="1"/>
-          <p:nvPr/>
-        </p:nvSpPr>
-        <p:spPr>
-          <a:xfrm>
-            <a:off x="1492339" y="1532694"/>
-            <a:ext cx="1026795" cy="338554"/>
-          </a:xfrm>
-          <a:prstGeom prst="rect">
-            <a:avLst/>
-          </a:prstGeom>
-          <a:noFill/>
-        </p:spPr>
-        <p:txBody>
-          <a:bodyPr wrap="square" rtlCol="0">
-            <a:spAutoFit/>
-          </a:bodyPr>
-          <a:lstStyle/>
-          <a:p>
-            <a:pPr algn="ctr"/>
-            <a:r>
-              <a:rPr lang="en-US" altLang="ko-KR" sz="1600" dirty="0">
-                <a:latin typeface="Times New Roman" panose="02020603050405020304" pitchFamily="18" charset="0"/>
-                <a:cs typeface="Times New Roman" panose="02020603050405020304" pitchFamily="18" charset="0"/>
-              </a:rPr>
-              <a:t>Encoder</a:t>
-            </a:r>
-            <a:endParaRPr lang="ko-KR" altLang="en-US" sz="1600" dirty="0">
-              <a:latin typeface="Times New Roman" panose="02020603050405020304" pitchFamily="18" charset="0"/>
-              <a:cs typeface="Times New Roman" panose="02020603050405020304" pitchFamily="18" charset="0"/>
-            </a:endParaRPr>
-          </a:p>
-        </p:txBody>
-      </p:sp>
-      <p:sp>
-        <p:nvSpPr>
-          <p:cNvPr id="3" name="TextBox 2">
-            <a:extLst>
-              <a:ext uri="{FF2B5EF4-FFF2-40B4-BE49-F238E27FC236}">
-                <a16:creationId xmlns:a16="http://schemas.microsoft.com/office/drawing/2014/main" id="{8788F38C-5D5C-479D-1AD2-D42B4B6A3500}"/>
-              </a:ext>
-            </a:extLst>
-          </p:cNvPr>
-          <p:cNvSpPr txBox="1"/>
-          <p:nvPr/>
-        </p:nvSpPr>
-        <p:spPr>
-          <a:xfrm>
-            <a:off x="1492339" y="3633296"/>
-            <a:ext cx="1026795" cy="338554"/>
-          </a:xfrm>
-          <a:prstGeom prst="rect">
-            <a:avLst/>
-          </a:prstGeom>
-          <a:noFill/>
-        </p:spPr>
-        <p:txBody>
-          <a:bodyPr wrap="square" rtlCol="0">
-            <a:spAutoFit/>
-          </a:bodyPr>
-          <a:lstStyle/>
-          <a:p>
-            <a:pPr algn="ctr"/>
-            <a:r>
-              <a:rPr lang="en-US" altLang="ko-KR" sz="1600" dirty="0">
-                <a:latin typeface="Times New Roman" panose="02020603050405020304" pitchFamily="18" charset="0"/>
-                <a:cs typeface="Times New Roman" panose="02020603050405020304" pitchFamily="18" charset="0"/>
-              </a:rPr>
-              <a:t>Encoder</a:t>
-            </a:r>
-            <a:endParaRPr lang="ko-KR" altLang="en-US" sz="1600" dirty="0">
-              <a:latin typeface="Times New Roman" panose="02020603050405020304" pitchFamily="18" charset="0"/>
-              <a:cs typeface="Times New Roman" panose="02020603050405020304" pitchFamily="18" charset="0"/>
-            </a:endParaRPr>
-          </a:p>
-        </p:txBody>
-      </p:sp>
-      <p:sp>
-        <p:nvSpPr>
-          <p:cNvPr id="5" name="TextBox 4">
-            <a:extLst>
-              <a:ext uri="{FF2B5EF4-FFF2-40B4-BE49-F238E27FC236}">
-                <a16:creationId xmlns:a16="http://schemas.microsoft.com/office/drawing/2014/main" id="{4490E95A-7F82-AE90-A0E4-5493EAD315AC}"/>
-              </a:ext>
-            </a:extLst>
-          </p:cNvPr>
-          <p:cNvSpPr txBox="1"/>
-          <p:nvPr/>
-        </p:nvSpPr>
-        <p:spPr>
-          <a:xfrm>
-            <a:off x="1492339" y="5472291"/>
-            <a:ext cx="1026795" cy="338554"/>
-          </a:xfrm>
-          <a:prstGeom prst="rect">
-            <a:avLst/>
-          </a:prstGeom>
-          <a:noFill/>
-        </p:spPr>
-        <p:txBody>
-          <a:bodyPr wrap="square" rtlCol="0">
-            <a:spAutoFit/>
-          </a:bodyPr>
-          <a:lstStyle/>
-          <a:p>
-            <a:pPr algn="ctr"/>
-            <a:r>
-              <a:rPr lang="en-US" altLang="ko-KR" sz="1600" dirty="0">
-                <a:latin typeface="Times New Roman" panose="02020603050405020304" pitchFamily="18" charset="0"/>
-                <a:cs typeface="Times New Roman" panose="02020603050405020304" pitchFamily="18" charset="0"/>
-              </a:rPr>
-              <a:t>Encoder</a:t>
-            </a:r>
-            <a:endParaRPr lang="ko-KR" altLang="en-US" sz="1600" dirty="0">
-              <a:latin typeface="Times New Roman" panose="02020603050405020304" pitchFamily="18" charset="0"/>
-              <a:cs typeface="Times New Roman" panose="02020603050405020304" pitchFamily="18" charset="0"/>
-            </a:endParaRPr>
-          </a:p>
-        </p:txBody>
-      </p:sp>
-      <p:sp>
-        <p:nvSpPr>
-          <p:cNvPr id="7" name="TextBox 6">
-            <a:extLst>
-              <a:ext uri="{FF2B5EF4-FFF2-40B4-BE49-F238E27FC236}">
-                <a16:creationId xmlns:a16="http://schemas.microsoft.com/office/drawing/2014/main" id="{8CDA5DBE-FF60-1801-BCCB-DDFEE931FAEF}"/>
-              </a:ext>
-            </a:extLst>
-          </p:cNvPr>
-          <p:cNvSpPr txBox="1"/>
-          <p:nvPr/>
-        </p:nvSpPr>
-        <p:spPr>
-          <a:xfrm>
-            <a:off x="2417443" y="250655"/>
-            <a:ext cx="1026795" cy="307777"/>
-          </a:xfrm>
-          <a:prstGeom prst="rect">
-            <a:avLst/>
-          </a:prstGeom>
-          <a:noFill/>
-        </p:spPr>
-        <p:txBody>
-          <a:bodyPr wrap="square" rtlCol="0">
-            <a:spAutoFit/>
-          </a:bodyPr>
-          <a:lstStyle/>
-          <a:p>
-            <a:pPr algn="ctr"/>
-            <a:r>
-              <a:rPr lang="en-US" altLang="ko-KR" sz="1400" dirty="0">
-                <a:latin typeface="Times New Roman" panose="02020603050405020304" pitchFamily="18" charset="0"/>
-                <a:cs typeface="Times New Roman" panose="02020603050405020304" pitchFamily="18" charset="0"/>
-              </a:rPr>
-              <a:t>Content</a:t>
-            </a:r>
-            <a:endParaRPr lang="ko-KR" altLang="en-US" sz="1400" dirty="0">
-              <a:latin typeface="Times New Roman" panose="02020603050405020304" pitchFamily="18" charset="0"/>
-              <a:cs typeface="Times New Roman" panose="02020603050405020304" pitchFamily="18" charset="0"/>
-            </a:endParaRPr>
-          </a:p>
-        </p:txBody>
-      </p:sp>
-      <p:sp>
-        <p:nvSpPr>
-          <p:cNvPr id="45" name="TextBox 44">
-            <a:extLst>
-              <a:ext uri="{FF2B5EF4-FFF2-40B4-BE49-F238E27FC236}">
-                <a16:creationId xmlns:a16="http://schemas.microsoft.com/office/drawing/2014/main" id="{379443EE-A9CD-B705-4A34-B0EC28B9337F}"/>
-              </a:ext>
-            </a:extLst>
-          </p:cNvPr>
-          <p:cNvSpPr txBox="1"/>
-          <p:nvPr/>
-        </p:nvSpPr>
-        <p:spPr>
-          <a:xfrm>
-            <a:off x="2736531" y="99201"/>
-            <a:ext cx="388618" cy="369332"/>
-          </a:xfrm>
-          <a:prstGeom prst="rect">
-            <a:avLst/>
-          </a:prstGeom>
-          <a:noFill/>
-        </p:spPr>
-        <p:txBody>
-          <a:bodyPr wrap="square" rtlCol="0">
-            <a:spAutoFit/>
-          </a:bodyPr>
-          <a:lstStyle/>
-          <a:p>
-            <a:pPr algn="ctr"/>
-            <a:r>
-              <a:rPr lang="en-US" altLang="ko-KR" dirty="0"/>
-              <a:t>~</a:t>
-            </a:r>
-            <a:endParaRPr lang="ko-KR" altLang="en-US" dirty="0"/>
-          </a:p>
-        </p:txBody>
-      </p:sp>
-      <p:sp>
-        <p:nvSpPr>
-          <p:cNvPr id="80" name="TextBox 79">
-            <a:extLst>
-              <a:ext uri="{FF2B5EF4-FFF2-40B4-BE49-F238E27FC236}">
-                <a16:creationId xmlns:a16="http://schemas.microsoft.com/office/drawing/2014/main" id="{59A6268D-ECAE-B3F0-7BA2-FB38127ECD46}"/>
-              </a:ext>
-            </a:extLst>
-          </p:cNvPr>
-          <p:cNvSpPr txBox="1"/>
-          <p:nvPr/>
-        </p:nvSpPr>
-        <p:spPr>
-          <a:xfrm>
-            <a:off x="2067324" y="2434874"/>
-            <a:ext cx="570547" cy="307777"/>
-          </a:xfrm>
-          <a:prstGeom prst="rect">
-            <a:avLst/>
-          </a:prstGeom>
-          <a:noFill/>
-        </p:spPr>
-        <p:txBody>
-          <a:bodyPr wrap="square" rtlCol="0">
-            <a:spAutoFit/>
-          </a:bodyPr>
-          <a:lstStyle/>
-          <a:p>
-            <a:pPr algn="ctr"/>
-            <a:r>
-              <a:rPr lang="en-US" altLang="ko-KR" sz="1400" dirty="0">
-                <a:latin typeface="Times New Roman" panose="02020603050405020304" pitchFamily="18" charset="0"/>
-                <a:cs typeface="Times New Roman" panose="02020603050405020304" pitchFamily="18" charset="0"/>
-              </a:rPr>
-              <a:t>Style</a:t>
-            </a:r>
-            <a:endParaRPr lang="ko-KR" altLang="en-US" sz="1400" dirty="0">
-              <a:latin typeface="Times New Roman" panose="02020603050405020304" pitchFamily="18" charset="0"/>
-              <a:cs typeface="Times New Roman" panose="02020603050405020304" pitchFamily="18" charset="0"/>
-            </a:endParaRPr>
-          </a:p>
-        </p:txBody>
-      </p:sp>
-      <p:sp>
-        <p:nvSpPr>
-          <p:cNvPr id="81" name="TextBox 80">
-            <a:extLst>
-              <a:ext uri="{FF2B5EF4-FFF2-40B4-BE49-F238E27FC236}">
-                <a16:creationId xmlns:a16="http://schemas.microsoft.com/office/drawing/2014/main" id="{DB29BC6F-68BB-82D1-D763-1CAE6463175D}"/>
-              </a:ext>
-            </a:extLst>
-          </p:cNvPr>
-          <p:cNvSpPr txBox="1"/>
-          <p:nvPr/>
-        </p:nvSpPr>
-        <p:spPr>
-          <a:xfrm>
-            <a:off x="2407281" y="2426139"/>
-            <a:ext cx="1026795" cy="307777"/>
-          </a:xfrm>
-          <a:prstGeom prst="rect">
-            <a:avLst/>
-          </a:prstGeom>
-          <a:noFill/>
-        </p:spPr>
-        <p:txBody>
-          <a:bodyPr wrap="square" rtlCol="0">
-            <a:spAutoFit/>
-          </a:bodyPr>
-          <a:lstStyle/>
-          <a:p>
-            <a:pPr algn="ctr"/>
-            <a:r>
-              <a:rPr lang="en-US" altLang="ko-KR" sz="1400" dirty="0">
-                <a:latin typeface="Times New Roman" panose="02020603050405020304" pitchFamily="18" charset="0"/>
-                <a:cs typeface="Times New Roman" panose="02020603050405020304" pitchFamily="18" charset="0"/>
-              </a:rPr>
-              <a:t>Content</a:t>
-            </a:r>
-            <a:endParaRPr lang="ko-KR" altLang="en-US" sz="1400" dirty="0">
-              <a:latin typeface="Times New Roman" panose="02020603050405020304" pitchFamily="18" charset="0"/>
-              <a:cs typeface="Times New Roman" panose="02020603050405020304" pitchFamily="18" charset="0"/>
-            </a:endParaRPr>
-          </a:p>
-        </p:txBody>
-      </p:sp>
-      <p:sp>
-        <p:nvSpPr>
-          <p:cNvPr id="82" name="TextBox 81">
-            <a:extLst>
-              <a:ext uri="{FF2B5EF4-FFF2-40B4-BE49-F238E27FC236}">
-                <a16:creationId xmlns:a16="http://schemas.microsoft.com/office/drawing/2014/main" id="{44F66200-7485-F3DF-B80F-7EF09795E046}"/>
-              </a:ext>
-            </a:extLst>
-          </p:cNvPr>
-          <p:cNvSpPr txBox="1"/>
-          <p:nvPr/>
-        </p:nvSpPr>
-        <p:spPr>
-          <a:xfrm>
-            <a:off x="2726369" y="2293157"/>
-            <a:ext cx="388618" cy="369332"/>
-          </a:xfrm>
-          <a:prstGeom prst="rect">
-            <a:avLst/>
-          </a:prstGeom>
-          <a:noFill/>
-        </p:spPr>
-        <p:txBody>
-          <a:bodyPr wrap="square" rtlCol="0">
-            <a:spAutoFit/>
-          </a:bodyPr>
-          <a:lstStyle/>
-          <a:p>
-            <a:pPr algn="ctr"/>
-            <a:r>
-              <a:rPr lang="en-US" altLang="ko-KR" dirty="0"/>
-              <a:t>~</a:t>
-            </a:r>
-            <a:endParaRPr lang="ko-KR" altLang="en-US" dirty="0"/>
-          </a:p>
-        </p:txBody>
-      </p:sp>
-      <p:sp>
-        <p:nvSpPr>
-          <p:cNvPr id="83" name="TextBox 82">
-            <a:extLst>
-              <a:ext uri="{FF2B5EF4-FFF2-40B4-BE49-F238E27FC236}">
-                <a16:creationId xmlns:a16="http://schemas.microsoft.com/office/drawing/2014/main" id="{74C9F1C4-BB1A-9E65-BFD0-E0F446AFB8AC}"/>
-              </a:ext>
-            </a:extLst>
-          </p:cNvPr>
-          <p:cNvSpPr txBox="1"/>
-          <p:nvPr/>
-        </p:nvSpPr>
-        <p:spPr>
-          <a:xfrm>
-            <a:off x="2048418" y="4226179"/>
-            <a:ext cx="570547" cy="307777"/>
-          </a:xfrm>
-          <a:prstGeom prst="rect">
-            <a:avLst/>
-          </a:prstGeom>
-          <a:noFill/>
-        </p:spPr>
-        <p:txBody>
-          <a:bodyPr wrap="square" rtlCol="0">
-            <a:spAutoFit/>
-          </a:bodyPr>
-          <a:lstStyle/>
-          <a:p>
-            <a:pPr algn="ctr"/>
-            <a:r>
-              <a:rPr lang="en-US" altLang="ko-KR" sz="1400" dirty="0">
-                <a:latin typeface="Times New Roman" panose="02020603050405020304" pitchFamily="18" charset="0"/>
-                <a:cs typeface="Times New Roman" panose="02020603050405020304" pitchFamily="18" charset="0"/>
-              </a:rPr>
-              <a:t>Style</a:t>
-            </a:r>
-            <a:endParaRPr lang="ko-KR" altLang="en-US" sz="1400" dirty="0">
-              <a:latin typeface="Times New Roman" panose="02020603050405020304" pitchFamily="18" charset="0"/>
-              <a:cs typeface="Times New Roman" panose="02020603050405020304" pitchFamily="18" charset="0"/>
-            </a:endParaRPr>
-          </a:p>
-        </p:txBody>
-      </p:sp>
-      <p:sp>
-        <p:nvSpPr>
-          <p:cNvPr id="84" name="TextBox 83">
-            <a:extLst>
-              <a:ext uri="{FF2B5EF4-FFF2-40B4-BE49-F238E27FC236}">
-                <a16:creationId xmlns:a16="http://schemas.microsoft.com/office/drawing/2014/main" id="{DEF93DEE-A810-60BA-691A-48CB9B7F24AA}"/>
-              </a:ext>
-            </a:extLst>
-          </p:cNvPr>
-          <p:cNvSpPr txBox="1"/>
-          <p:nvPr/>
-        </p:nvSpPr>
-        <p:spPr>
-          <a:xfrm>
-            <a:off x="2388375" y="4235916"/>
-            <a:ext cx="1026795" cy="307777"/>
-          </a:xfrm>
-          <a:prstGeom prst="rect">
-            <a:avLst/>
-          </a:prstGeom>
-          <a:noFill/>
-        </p:spPr>
-        <p:txBody>
-          <a:bodyPr wrap="square" rtlCol="0">
-            <a:spAutoFit/>
-          </a:bodyPr>
-          <a:lstStyle/>
-          <a:p>
-            <a:pPr algn="ctr"/>
-            <a:r>
-              <a:rPr lang="en-US" altLang="ko-KR" sz="1400" dirty="0">
-                <a:latin typeface="Times New Roman" panose="02020603050405020304" pitchFamily="18" charset="0"/>
-                <a:cs typeface="Times New Roman" panose="02020603050405020304" pitchFamily="18" charset="0"/>
-              </a:rPr>
-              <a:t>Content</a:t>
-            </a:r>
-            <a:endParaRPr lang="ko-KR" altLang="en-US" sz="1400" dirty="0">
-              <a:latin typeface="Times New Roman" panose="02020603050405020304" pitchFamily="18" charset="0"/>
-              <a:cs typeface="Times New Roman" panose="02020603050405020304" pitchFamily="18" charset="0"/>
-            </a:endParaRPr>
-          </a:p>
-        </p:txBody>
-      </p:sp>
-      <p:sp>
-        <p:nvSpPr>
-          <p:cNvPr id="85" name="TextBox 84">
-            <a:extLst>
-              <a:ext uri="{FF2B5EF4-FFF2-40B4-BE49-F238E27FC236}">
-                <a16:creationId xmlns:a16="http://schemas.microsoft.com/office/drawing/2014/main" id="{7A3AA810-3FFF-216D-6285-CF16FA59F626}"/>
-              </a:ext>
-            </a:extLst>
-          </p:cNvPr>
-          <p:cNvSpPr txBox="1"/>
-          <p:nvPr/>
-        </p:nvSpPr>
-        <p:spPr>
-          <a:xfrm>
-            <a:off x="2707463" y="4084462"/>
-            <a:ext cx="388618" cy="369332"/>
-          </a:xfrm>
-          <a:prstGeom prst="rect">
-            <a:avLst/>
-          </a:prstGeom>
-          <a:noFill/>
-        </p:spPr>
-        <p:txBody>
-          <a:bodyPr wrap="square" rtlCol="0">
-            <a:spAutoFit/>
-          </a:bodyPr>
-          <a:lstStyle/>
-          <a:p>
-            <a:pPr algn="ctr"/>
-            <a:r>
-              <a:rPr lang="en-US" altLang="ko-KR" dirty="0"/>
-              <a:t>~</a:t>
-            </a:r>
-            <a:endParaRPr lang="ko-KR" altLang="en-US" dirty="0"/>
           </a:p>
         </p:txBody>
       </p:sp>

</xml_diff>

<commit_message>
FEAT:Change the figure and result
</commit_message>
<xml_diff>
--- a/figure/real2sim_architecture.pptx
+++ b/figure/real2sim_architecture.pptx
@@ -197,7 +197,7 @@
           <a:p>
             <a:fld id="{87984234-178A-4616-AC06-773C26F0E1DF}" type="datetimeFigureOut">
               <a:rPr lang="ko-KR" altLang="en-US" smtClean="0"/>
-              <a:t>2025-04-21</a:t>
+              <a:t>2025-05-08</a:t>
             </a:fld>
             <a:endParaRPr lang="ko-KR" altLang="en-US"/>
           </a:p>
@@ -695,7 +695,7 @@
           <a:p>
             <a:fld id="{46BC883B-AFC6-4F1C-88E4-545B165E671D}" type="datetimeFigureOut">
               <a:rPr lang="ko-KR" altLang="en-US" smtClean="0"/>
-              <a:t>2025-04-21</a:t>
+              <a:t>2025-05-08</a:t>
             </a:fld>
             <a:endParaRPr lang="ko-KR" altLang="en-US"/>
           </a:p>
@@ -893,7 +893,7 @@
           <a:p>
             <a:fld id="{46BC883B-AFC6-4F1C-88E4-545B165E671D}" type="datetimeFigureOut">
               <a:rPr lang="ko-KR" altLang="en-US" smtClean="0"/>
-              <a:t>2025-04-21</a:t>
+              <a:t>2025-05-08</a:t>
             </a:fld>
             <a:endParaRPr lang="ko-KR" altLang="en-US"/>
           </a:p>
@@ -1101,7 +1101,7 @@
           <a:p>
             <a:fld id="{46BC883B-AFC6-4F1C-88E4-545B165E671D}" type="datetimeFigureOut">
               <a:rPr lang="ko-KR" altLang="en-US" smtClean="0"/>
-              <a:t>2025-04-21</a:t>
+              <a:t>2025-05-08</a:t>
             </a:fld>
             <a:endParaRPr lang="ko-KR" altLang="en-US"/>
           </a:p>
@@ -1299,7 +1299,7 @@
           <a:p>
             <a:fld id="{46BC883B-AFC6-4F1C-88E4-545B165E671D}" type="datetimeFigureOut">
               <a:rPr lang="ko-KR" altLang="en-US" smtClean="0"/>
-              <a:t>2025-04-21</a:t>
+              <a:t>2025-05-08</a:t>
             </a:fld>
             <a:endParaRPr lang="ko-KR" altLang="en-US"/>
           </a:p>
@@ -1574,7 +1574,7 @@
           <a:p>
             <a:fld id="{46BC883B-AFC6-4F1C-88E4-545B165E671D}" type="datetimeFigureOut">
               <a:rPr lang="ko-KR" altLang="en-US" smtClean="0"/>
-              <a:t>2025-04-21</a:t>
+              <a:t>2025-05-08</a:t>
             </a:fld>
             <a:endParaRPr lang="ko-KR" altLang="en-US"/>
           </a:p>
@@ -1839,7 +1839,7 @@
           <a:p>
             <a:fld id="{46BC883B-AFC6-4F1C-88E4-545B165E671D}" type="datetimeFigureOut">
               <a:rPr lang="ko-KR" altLang="en-US" smtClean="0"/>
-              <a:t>2025-04-21</a:t>
+              <a:t>2025-05-08</a:t>
             </a:fld>
             <a:endParaRPr lang="ko-KR" altLang="en-US"/>
           </a:p>
@@ -2251,7 +2251,7 @@
           <a:p>
             <a:fld id="{46BC883B-AFC6-4F1C-88E4-545B165E671D}" type="datetimeFigureOut">
               <a:rPr lang="ko-KR" altLang="en-US" smtClean="0"/>
-              <a:t>2025-04-21</a:t>
+              <a:t>2025-05-08</a:t>
             </a:fld>
             <a:endParaRPr lang="ko-KR" altLang="en-US"/>
           </a:p>
@@ -2392,7 +2392,7 @@
           <a:p>
             <a:fld id="{46BC883B-AFC6-4F1C-88E4-545B165E671D}" type="datetimeFigureOut">
               <a:rPr lang="ko-KR" altLang="en-US" smtClean="0"/>
-              <a:t>2025-04-21</a:t>
+              <a:t>2025-05-08</a:t>
             </a:fld>
             <a:endParaRPr lang="ko-KR" altLang="en-US"/>
           </a:p>
@@ -2505,7 +2505,7 @@
           <a:p>
             <a:fld id="{46BC883B-AFC6-4F1C-88E4-545B165E671D}" type="datetimeFigureOut">
               <a:rPr lang="ko-KR" altLang="en-US" smtClean="0"/>
-              <a:t>2025-04-21</a:t>
+              <a:t>2025-05-08</a:t>
             </a:fld>
             <a:endParaRPr lang="ko-KR" altLang="en-US"/>
           </a:p>
@@ -2816,7 +2816,7 @@
           <a:p>
             <a:fld id="{46BC883B-AFC6-4F1C-88E4-545B165E671D}" type="datetimeFigureOut">
               <a:rPr lang="ko-KR" altLang="en-US" smtClean="0"/>
-              <a:t>2025-04-21</a:t>
+              <a:t>2025-05-08</a:t>
             </a:fld>
             <a:endParaRPr lang="ko-KR" altLang="en-US"/>
           </a:p>
@@ -3104,7 +3104,7 @@
           <a:p>
             <a:fld id="{46BC883B-AFC6-4F1C-88E4-545B165E671D}" type="datetimeFigureOut">
               <a:rPr lang="ko-KR" altLang="en-US" smtClean="0"/>
-              <a:t>2025-04-21</a:t>
+              <a:t>2025-05-08</a:t>
             </a:fld>
             <a:endParaRPr lang="ko-KR" altLang="en-US"/>
           </a:p>
@@ -3345,7 +3345,7 @@
           <a:p>
             <a:fld id="{46BC883B-AFC6-4F1C-88E4-545B165E671D}" type="datetimeFigureOut">
               <a:rPr lang="ko-KR" altLang="en-US" smtClean="0"/>
-              <a:t>2025-04-21</a:t>
+              <a:t>2025-05-08</a:t>
             </a:fld>
             <a:endParaRPr lang="ko-KR" altLang="en-US"/>
           </a:p>
@@ -3776,7 +3776,7 @@
         </p:nvSpPr>
         <p:spPr>
           <a:xfrm>
-            <a:off x="643602" y="1892701"/>
+            <a:off x="643602" y="2047449"/>
             <a:ext cx="1026795" cy="338554"/>
           </a:xfrm>
           <a:prstGeom prst="rect">
@@ -3823,8 +3823,8 @@
         </p:nvCxnSpPr>
         <p:spPr>
           <a:xfrm flipV="1">
-            <a:off x="1670397" y="2057524"/>
-            <a:ext cx="534668" cy="4454"/>
+            <a:off x="1670397" y="2212270"/>
+            <a:ext cx="450260" cy="4456"/>
           </a:xfrm>
           <a:prstGeom prst="straightConnector1">
             <a:avLst/>
@@ -3862,7 +3862,7 @@
         </p:nvSpPr>
         <p:spPr>
           <a:xfrm>
-            <a:off x="4531704" y="1765136"/>
+            <a:off x="4348820" y="1919882"/>
             <a:ext cx="1026795" cy="584775"/>
           </a:xfrm>
           <a:prstGeom prst="rect">
@@ -3910,7 +3910,7 @@
         </p:nvSpPr>
         <p:spPr>
           <a:xfrm>
-            <a:off x="8088404" y="3213768"/>
+            <a:off x="7792980" y="3213768"/>
             <a:ext cx="1026795" cy="338554"/>
           </a:xfrm>
           <a:prstGeom prst="rect">
@@ -3961,7 +3961,7 @@
         </p:blipFill>
         <p:spPr>
           <a:xfrm>
-            <a:off x="8290791" y="3104505"/>
+            <a:off x="7995367" y="3104505"/>
             <a:ext cx="622020" cy="200053"/>
           </a:xfrm>
           <a:prstGeom prst="rect">
@@ -3983,7 +3983,7 @@
         </p:nvSpPr>
         <p:spPr>
           <a:xfrm>
-            <a:off x="2205065" y="1841576"/>
+            <a:off x="2120657" y="1996322"/>
             <a:ext cx="1791971" cy="431896"/>
           </a:xfrm>
           <a:prstGeom prst="roundRect">
@@ -3997,7 +3997,7 @@
             </a:schemeClr>
           </a:solidFill>
           <a:ln>
-            <a:prstDash val="dash"/>
+            <a:prstDash val="solid"/>
           </a:ln>
         </p:spPr>
         <p:style>
@@ -4039,7 +4039,7 @@
         </p:nvSpPr>
         <p:spPr>
           <a:xfrm>
-            <a:off x="2302220" y="1890977"/>
+            <a:off x="2217812" y="2045723"/>
             <a:ext cx="1612267" cy="338554"/>
           </a:xfrm>
           <a:prstGeom prst="rect">
@@ -4085,7 +4085,7 @@
         </p:nvCxnSpPr>
         <p:spPr>
           <a:xfrm>
-            <a:off x="3997036" y="2057524"/>
+            <a:off x="3912628" y="2212270"/>
             <a:ext cx="534668" cy="0"/>
           </a:xfrm>
           <a:prstGeom prst="straightConnector1">
@@ -4172,7 +4172,7 @@
         <p:spPr>
           <a:xfrm flipV="1">
             <a:off x="1670397" y="3350713"/>
-            <a:ext cx="534668" cy="4454"/>
+            <a:ext cx="450260" cy="4454"/>
           </a:xfrm>
           <a:prstGeom prst="straightConnector1">
             <a:avLst/>
@@ -4210,7 +4210,7 @@
         </p:nvSpPr>
         <p:spPr>
           <a:xfrm>
-            <a:off x="4531704" y="3058325"/>
+            <a:off x="4348820" y="3058325"/>
             <a:ext cx="1026795" cy="584775"/>
           </a:xfrm>
           <a:prstGeom prst="rect">
@@ -4256,13 +4256,14 @@
           <p:cNvCxnSpPr>
             <a:cxnSpLocks/>
             <a:stCxn id="69" idx="3"/>
+            <a:endCxn id="76" idx="1"/>
           </p:cNvCxnSpPr>
           <p:nvPr/>
         </p:nvCxnSpPr>
         <p:spPr>
           <a:xfrm flipV="1">
-            <a:off x="5558499" y="3349328"/>
-            <a:ext cx="495940" cy="1385"/>
+            <a:off x="5375615" y="3346598"/>
+            <a:ext cx="387844" cy="4115"/>
           </a:xfrm>
           <a:prstGeom prst="straightConnector1">
             <a:avLst/>
@@ -4300,7 +4301,7 @@
         </p:nvSpPr>
         <p:spPr>
           <a:xfrm>
-            <a:off x="2205065" y="3134765"/>
+            <a:off x="2120657" y="3134765"/>
             <a:ext cx="1791971" cy="431896"/>
           </a:xfrm>
           <a:prstGeom prst="roundRect">
@@ -4314,7 +4315,7 @@
             </a:schemeClr>
           </a:solidFill>
           <a:ln>
-            <a:prstDash val="dash"/>
+            <a:prstDash val="solid"/>
           </a:ln>
         </p:spPr>
         <p:style>
@@ -4356,7 +4357,7 @@
         </p:nvSpPr>
         <p:spPr>
           <a:xfrm>
-            <a:off x="2302220" y="3184166"/>
+            <a:off x="2217812" y="3184166"/>
             <a:ext cx="1612267" cy="338554"/>
           </a:xfrm>
           <a:prstGeom prst="rect">
@@ -4402,7 +4403,7 @@
         </p:nvCxnSpPr>
         <p:spPr>
           <a:xfrm>
-            <a:off x="3997036" y="3350713"/>
+            <a:off x="3912628" y="3350713"/>
             <a:ext cx="534668" cy="0"/>
           </a:xfrm>
           <a:prstGeom prst="straightConnector1">
@@ -4441,7 +4442,7 @@
         </p:nvSpPr>
         <p:spPr>
           <a:xfrm>
-            <a:off x="6058883" y="3130650"/>
+            <a:off x="5763459" y="3130650"/>
             <a:ext cx="1505700" cy="431896"/>
           </a:xfrm>
           <a:prstGeom prst="roundRect">
@@ -4453,7 +4454,7 @@
             </a:srgbClr>
           </a:solidFill>
           <a:ln>
-            <a:prstDash val="dash"/>
+            <a:prstDash val="solid"/>
           </a:ln>
         </p:spPr>
         <p:style>
@@ -4495,7 +4496,7 @@
         </p:nvSpPr>
         <p:spPr>
           <a:xfrm>
-            <a:off x="6156037" y="3180051"/>
+            <a:off x="5860613" y="3180051"/>
             <a:ext cx="1306945" cy="338554"/>
           </a:xfrm>
           <a:prstGeom prst="rect">
@@ -4542,8 +4543,8 @@
         </p:nvCxnSpPr>
         <p:spPr>
           <a:xfrm>
-            <a:off x="5558499" y="2057524"/>
-            <a:ext cx="1251011" cy="1122527"/>
+            <a:off x="5375615" y="2212270"/>
+            <a:ext cx="1138471" cy="967781"/>
           </a:xfrm>
           <a:prstGeom prst="bentConnector2">
             <a:avLst/>
@@ -4583,7 +4584,7 @@
         </p:nvCxnSpPr>
         <p:spPr>
           <a:xfrm flipV="1">
-            <a:off x="7569027" y="3345213"/>
+            <a:off x="7273603" y="3345213"/>
             <a:ext cx="495940" cy="1385"/>
           </a:xfrm>
           <a:prstGeom prst="straightConnector1">
@@ -4622,7 +4623,7 @@
         </p:nvSpPr>
         <p:spPr>
           <a:xfrm>
-            <a:off x="643602" y="4720858"/>
+            <a:off x="784282" y="4931873"/>
             <a:ext cx="1026795" cy="338554"/>
           </a:xfrm>
           <a:prstGeom prst="rect">
@@ -4662,15 +4663,14 @@
           </p:cNvPr>
           <p:cNvCxnSpPr>
             <a:cxnSpLocks/>
-            <a:stCxn id="90" idx="3"/>
             <a:endCxn id="95" idx="1"/>
           </p:cNvCxnSpPr>
           <p:nvPr/>
         </p:nvCxnSpPr>
         <p:spPr>
-          <a:xfrm flipV="1">
-            <a:off x="1670397" y="4885681"/>
-            <a:ext cx="534668" cy="4454"/>
+          <a:xfrm>
+            <a:off x="1863226" y="5251443"/>
+            <a:ext cx="341839" cy="1"/>
           </a:xfrm>
           <a:prstGeom prst="straightConnector1">
             <a:avLst/>
@@ -4708,7 +4708,7 @@
         </p:nvSpPr>
         <p:spPr>
           <a:xfrm>
-            <a:off x="4531704" y="4593293"/>
+            <a:off x="4348821" y="4959056"/>
             <a:ext cx="1026795" cy="584775"/>
           </a:xfrm>
           <a:prstGeom prst="rect">
@@ -4733,7 +4733,7 @@
                 <a:latin typeface="Times New Roman" panose="02020603050405020304" pitchFamily="18" charset="0"/>
                 <a:cs typeface="Times New Roman" panose="02020603050405020304" pitchFamily="18" charset="0"/>
               </a:rPr>
-              <a:t>Latent vector</a:t>
+              <a:t>Content vector</a:t>
             </a:r>
             <a:endParaRPr lang="ko-KR" altLang="en-US" sz="1600" dirty="0">
               <a:latin typeface="Times New Roman" panose="02020603050405020304" pitchFamily="18" charset="0"/>
@@ -4756,7 +4756,7 @@
         </p:nvSpPr>
         <p:spPr>
           <a:xfrm>
-            <a:off x="8088404" y="5993797"/>
+            <a:off x="7740686" y="6007865"/>
             <a:ext cx="1026795" cy="338554"/>
           </a:xfrm>
           <a:prstGeom prst="rect">
@@ -4799,7 +4799,7 @@
         </p:nvSpPr>
         <p:spPr>
           <a:xfrm>
-            <a:off x="2205065" y="4669733"/>
+            <a:off x="2205065" y="5035496"/>
             <a:ext cx="1791971" cy="431896"/>
           </a:xfrm>
           <a:prstGeom prst="roundRect">
@@ -4813,7 +4813,7 @@
             </a:schemeClr>
           </a:solidFill>
           <a:ln>
-            <a:prstDash val="dash"/>
+            <a:prstDash val="solid"/>
           </a:ln>
         </p:spPr>
         <p:style>
@@ -4855,7 +4855,7 @@
         </p:nvSpPr>
         <p:spPr>
           <a:xfrm>
-            <a:off x="2302220" y="4719134"/>
+            <a:off x="2302220" y="5084897"/>
             <a:ext cx="1612267" cy="338554"/>
           </a:xfrm>
           <a:prstGeom prst="rect">
@@ -4896,13 +4896,14 @@
           <p:cNvCxnSpPr>
             <a:cxnSpLocks/>
             <a:stCxn id="95" idx="3"/>
+            <a:endCxn id="92" idx="1"/>
           </p:cNvCxnSpPr>
           <p:nvPr/>
         </p:nvCxnSpPr>
         <p:spPr>
           <a:xfrm>
-            <a:off x="3997036" y="4885681"/>
-            <a:ext cx="534668" cy="0"/>
+            <a:off x="3997036" y="5251444"/>
+            <a:ext cx="351785" cy="0"/>
           </a:xfrm>
           <a:prstGeom prst="straightConnector1">
             <a:avLst/>
@@ -4940,7 +4941,7 @@
         </p:nvSpPr>
         <p:spPr>
           <a:xfrm>
-            <a:off x="4531704" y="5886482"/>
+            <a:off x="4348821" y="5886482"/>
             <a:ext cx="1026795" cy="584775"/>
           </a:xfrm>
           <a:prstGeom prst="rect">
@@ -4965,7 +4966,7 @@
                 <a:latin typeface="Times New Roman" panose="02020603050405020304" pitchFamily="18" charset="0"/>
                 <a:cs typeface="Times New Roman" panose="02020603050405020304" pitchFamily="18" charset="0"/>
               </a:rPr>
-              <a:t>Latent vector</a:t>
+              <a:t>Sim style vector</a:t>
             </a:r>
             <a:endParaRPr lang="ko-KR" altLang="en-US" sz="1600" dirty="0">
               <a:latin typeface="Times New Roman" panose="02020603050405020304" pitchFamily="18" charset="0"/>
@@ -4985,14 +4986,14 @@
           </p:cNvPr>
           <p:cNvCxnSpPr>
             <a:cxnSpLocks/>
-            <a:stCxn id="100" idx="3"/>
+            <a:endCxn id="105" idx="1"/>
           </p:cNvCxnSpPr>
           <p:nvPr/>
         </p:nvCxnSpPr>
         <p:spPr>
           <a:xfrm flipV="1">
-            <a:off x="5558499" y="6177485"/>
-            <a:ext cx="495940" cy="1385"/>
+            <a:off x="5727401" y="6174755"/>
+            <a:ext cx="273500" cy="4114"/>
           </a:xfrm>
           <a:prstGeom prst="straightConnector1">
             <a:avLst/>
@@ -5044,7 +5045,7 @@
             </a:schemeClr>
           </a:solidFill>
           <a:ln>
-            <a:prstDash val="dash"/>
+            <a:prstDash val="solid"/>
           </a:ln>
         </p:spPr>
         <p:style>
@@ -5127,13 +5128,14 @@
           <p:cNvCxnSpPr>
             <a:cxnSpLocks/>
             <a:stCxn id="102" idx="3"/>
+            <a:endCxn id="100" idx="1"/>
           </p:cNvCxnSpPr>
           <p:nvPr/>
         </p:nvCxnSpPr>
         <p:spPr>
           <a:xfrm>
             <a:off x="3997036" y="6178870"/>
-            <a:ext cx="534668" cy="0"/>
+            <a:ext cx="351785" cy="0"/>
           </a:xfrm>
           <a:prstGeom prst="straightConnector1">
             <a:avLst/>
@@ -5171,7 +5173,7 @@
         </p:nvSpPr>
         <p:spPr>
           <a:xfrm>
-            <a:off x="6058883" y="5958807"/>
+            <a:off x="6000901" y="5958807"/>
             <a:ext cx="1505700" cy="431896"/>
           </a:xfrm>
           <a:prstGeom prst="roundRect">
@@ -5183,7 +5185,7 @@
             </a:srgbClr>
           </a:solidFill>
           <a:ln>
-            <a:prstDash val="dash"/>
+            <a:prstDash val="solid"/>
           </a:ln>
         </p:spPr>
         <p:style>
@@ -5225,7 +5227,7 @@
         </p:nvSpPr>
         <p:spPr>
           <a:xfrm>
-            <a:off x="6156037" y="6008208"/>
+            <a:off x="6098055" y="6008208"/>
             <a:ext cx="1306945" cy="338554"/>
           </a:xfrm>
           <a:prstGeom prst="rect">
@@ -5256,26 +5258,26 @@
       </p:sp>
       <p:cxnSp>
         <p:nvCxnSpPr>
-          <p:cNvPr id="107" name="연결선: 꺾임 106">
-            <a:extLst>
-              <a:ext uri="{FF2B5EF4-FFF2-40B4-BE49-F238E27FC236}">
-                <a16:creationId xmlns:a16="http://schemas.microsoft.com/office/drawing/2014/main" id="{A1D5D1DE-C77E-6C9A-69D4-906A88A544DE}"/>
+          <p:cNvPr id="108" name="직선 화살표 연결선 107">
+            <a:extLst>
+              <a:ext uri="{FF2B5EF4-FFF2-40B4-BE49-F238E27FC236}">
+                <a16:creationId xmlns:a16="http://schemas.microsoft.com/office/drawing/2014/main" id="{E6C832E9-E9F7-95C8-4A55-F555C0400177}"/>
               </a:ext>
             </a:extLst>
           </p:cNvPr>
           <p:cNvCxnSpPr>
             <a:cxnSpLocks/>
-            <a:stCxn id="92" idx="3"/>
-            <a:endCxn id="106" idx="0"/>
+            <a:stCxn id="105" idx="3"/>
+            <a:endCxn id="93" idx="1"/>
           </p:cNvCxnSpPr>
           <p:nvPr/>
         </p:nvCxnSpPr>
         <p:spPr>
           <a:xfrm>
-            <a:off x="5558499" y="4885681"/>
-            <a:ext cx="1251011" cy="1122527"/>
-          </a:xfrm>
-          <a:prstGeom prst="bentConnector2">
+            <a:off x="7506601" y="6174755"/>
+            <a:ext cx="234085" cy="2387"/>
+          </a:xfrm>
+          <a:prstGeom prst="straightConnector1">
             <a:avLst/>
           </a:prstGeom>
           <a:ln>
@@ -5297,24 +5299,117 @@
           </a:fontRef>
         </p:style>
       </p:cxnSp>
+      <p:sp>
+        <p:nvSpPr>
+          <p:cNvPr id="110" name="TextBox 109">
+            <a:extLst>
+              <a:ext uri="{FF2B5EF4-FFF2-40B4-BE49-F238E27FC236}">
+                <a16:creationId xmlns:a16="http://schemas.microsoft.com/office/drawing/2014/main" id="{73357863-6815-BA8B-9D4A-1794B9EBA740}"/>
+              </a:ext>
+            </a:extLst>
+          </p:cNvPr>
+          <p:cNvSpPr txBox="1"/>
+          <p:nvPr/>
+        </p:nvSpPr>
+        <p:spPr>
+          <a:xfrm>
+            <a:off x="3281723" y="1679739"/>
+            <a:ext cx="898239" cy="338554"/>
+          </a:xfrm>
+          <a:prstGeom prst="rect">
+            <a:avLst/>
+          </a:prstGeom>
+          <a:noFill/>
+        </p:spPr>
+        <p:txBody>
+          <a:bodyPr wrap="square" rtlCol="0">
+            <a:spAutoFit/>
+          </a:bodyPr>
+          <a:lstStyle/>
+          <a:p>
+            <a:pPr algn="ctr"/>
+            <a:r>
+              <a:rPr lang="en-US" altLang="ko-KR" sz="1600" b="1" dirty="0">
+                <a:solidFill>
+                  <a:srgbClr val="FF0000"/>
+                </a:solidFill>
+                <a:latin typeface="Times New Roman" panose="02020603050405020304" pitchFamily="18" charset="0"/>
+                <a:cs typeface="Times New Roman" panose="02020603050405020304" pitchFamily="18" charset="0"/>
+              </a:rPr>
+              <a:t>Freeze</a:t>
+            </a:r>
+            <a:endParaRPr lang="ko-KR" altLang="en-US" sz="1600" b="1" dirty="0">
+              <a:solidFill>
+                <a:srgbClr val="FF0000"/>
+              </a:solidFill>
+              <a:latin typeface="Times New Roman" panose="02020603050405020304" pitchFamily="18" charset="0"/>
+              <a:cs typeface="Times New Roman" panose="02020603050405020304" pitchFamily="18" charset="0"/>
+            </a:endParaRPr>
+          </a:p>
+        </p:txBody>
+      </p:sp>
+      <p:sp>
+        <p:nvSpPr>
+          <p:cNvPr id="111" name="TextBox 110">
+            <a:extLst>
+              <a:ext uri="{FF2B5EF4-FFF2-40B4-BE49-F238E27FC236}">
+                <a16:creationId xmlns:a16="http://schemas.microsoft.com/office/drawing/2014/main" id="{5A309A45-56A3-0767-A084-4D1D64A40C43}"/>
+              </a:ext>
+            </a:extLst>
+          </p:cNvPr>
+          <p:cNvSpPr txBox="1"/>
+          <p:nvPr/>
+        </p:nvSpPr>
+        <p:spPr>
+          <a:xfrm>
+            <a:off x="641238" y="244528"/>
+            <a:ext cx="1026795" cy="338554"/>
+          </a:xfrm>
+          <a:prstGeom prst="rect">
+            <a:avLst/>
+          </a:prstGeom>
+          <a:noFill/>
+        </p:spPr>
+        <p:txBody>
+          <a:bodyPr wrap="square" rtlCol="0">
+            <a:spAutoFit/>
+          </a:bodyPr>
+          <a:lstStyle/>
+          <a:p>
+            <a:pPr algn="ctr"/>
+            <a:r>
+              <a:rPr lang="en-US" altLang="ko-KR" sz="1600" dirty="0">
+                <a:latin typeface="Times New Roman" panose="02020603050405020304" pitchFamily="18" charset="0"/>
+                <a:cs typeface="Times New Roman" panose="02020603050405020304" pitchFamily="18" charset="0"/>
+              </a:rPr>
+              <a:t>Sim data</a:t>
+            </a:r>
+            <a:endParaRPr lang="ko-KR" altLang="en-US" sz="1600" dirty="0">
+              <a:latin typeface="Times New Roman" panose="02020603050405020304" pitchFamily="18" charset="0"/>
+              <a:cs typeface="Times New Roman" panose="02020603050405020304" pitchFamily="18" charset="0"/>
+            </a:endParaRPr>
+          </a:p>
+        </p:txBody>
+      </p:sp>
       <p:cxnSp>
         <p:nvCxnSpPr>
-          <p:cNvPr id="108" name="직선 화살표 연결선 107">
-            <a:extLst>
-              <a:ext uri="{FF2B5EF4-FFF2-40B4-BE49-F238E27FC236}">
-                <a16:creationId xmlns:a16="http://schemas.microsoft.com/office/drawing/2014/main" id="{E6C832E9-E9F7-95C8-4A55-F555C0400177}"/>
+          <p:cNvPr id="112" name="직선 화살표 연결선 111">
+            <a:extLst>
+              <a:ext uri="{FF2B5EF4-FFF2-40B4-BE49-F238E27FC236}">
+                <a16:creationId xmlns:a16="http://schemas.microsoft.com/office/drawing/2014/main" id="{75F911B7-5B0F-348B-75DF-9C41A828446F}"/>
               </a:ext>
             </a:extLst>
           </p:cNvPr>
           <p:cNvCxnSpPr>
             <a:cxnSpLocks/>
+            <a:endCxn id="114" idx="1"/>
           </p:cNvCxnSpPr>
           <p:nvPr/>
         </p:nvCxnSpPr>
         <p:spPr>
           <a:xfrm flipV="1">
-            <a:off x="7569027" y="6173370"/>
-            <a:ext cx="495940" cy="1385"/>
+            <a:off x="1794912" y="785691"/>
+            <a:ext cx="479426" cy="2730"/>
           </a:xfrm>
           <a:prstGeom prst="straightConnector1">
             <a:avLst/>
@@ -5340,141 +5435,6 @@
       </p:cxnSp>
       <p:sp>
         <p:nvSpPr>
-          <p:cNvPr id="110" name="TextBox 109">
-            <a:extLst>
-              <a:ext uri="{FF2B5EF4-FFF2-40B4-BE49-F238E27FC236}">
-                <a16:creationId xmlns:a16="http://schemas.microsoft.com/office/drawing/2014/main" id="{73357863-6815-BA8B-9D4A-1794B9EBA740}"/>
-              </a:ext>
-            </a:extLst>
-          </p:cNvPr>
-          <p:cNvSpPr txBox="1"/>
-          <p:nvPr/>
-        </p:nvSpPr>
-        <p:spPr>
-          <a:xfrm>
-            <a:off x="3366131" y="1524993"/>
-            <a:ext cx="898239" cy="338554"/>
-          </a:xfrm>
-          <a:prstGeom prst="rect">
-            <a:avLst/>
-          </a:prstGeom>
-          <a:noFill/>
-        </p:spPr>
-        <p:txBody>
-          <a:bodyPr wrap="square" rtlCol="0">
-            <a:spAutoFit/>
-          </a:bodyPr>
-          <a:lstStyle/>
-          <a:p>
-            <a:pPr algn="ctr"/>
-            <a:r>
-              <a:rPr lang="en-US" altLang="ko-KR" sz="1600" b="1" dirty="0">
-                <a:solidFill>
-                  <a:srgbClr val="FF0000"/>
-                </a:solidFill>
-                <a:latin typeface="Times New Roman" panose="02020603050405020304" pitchFamily="18" charset="0"/>
-                <a:cs typeface="Times New Roman" panose="02020603050405020304" pitchFamily="18" charset="0"/>
-              </a:rPr>
-              <a:t>Freeze</a:t>
-            </a:r>
-            <a:endParaRPr lang="ko-KR" altLang="en-US" sz="1600" b="1" dirty="0">
-              <a:solidFill>
-                <a:srgbClr val="FF0000"/>
-              </a:solidFill>
-              <a:latin typeface="Times New Roman" panose="02020603050405020304" pitchFamily="18" charset="0"/>
-              <a:cs typeface="Times New Roman" panose="02020603050405020304" pitchFamily="18" charset="0"/>
-            </a:endParaRPr>
-          </a:p>
-        </p:txBody>
-      </p:sp>
-      <p:sp>
-        <p:nvSpPr>
-          <p:cNvPr id="111" name="TextBox 110">
-            <a:extLst>
-              <a:ext uri="{FF2B5EF4-FFF2-40B4-BE49-F238E27FC236}">
-                <a16:creationId xmlns:a16="http://schemas.microsoft.com/office/drawing/2014/main" id="{5A309A45-56A3-0767-A084-4D1D64A40C43}"/>
-              </a:ext>
-            </a:extLst>
-          </p:cNvPr>
-          <p:cNvSpPr txBox="1"/>
-          <p:nvPr/>
-        </p:nvSpPr>
-        <p:spPr>
-          <a:xfrm>
-            <a:off x="712875" y="620868"/>
-            <a:ext cx="1026795" cy="338554"/>
-          </a:xfrm>
-          <a:prstGeom prst="rect">
-            <a:avLst/>
-          </a:prstGeom>
-          <a:noFill/>
-        </p:spPr>
-        <p:txBody>
-          <a:bodyPr wrap="square" rtlCol="0">
-            <a:spAutoFit/>
-          </a:bodyPr>
-          <a:lstStyle/>
-          <a:p>
-            <a:pPr algn="ctr"/>
-            <a:r>
-              <a:rPr lang="en-US" altLang="ko-KR" sz="1600" dirty="0">
-                <a:latin typeface="Times New Roman" panose="02020603050405020304" pitchFamily="18" charset="0"/>
-                <a:cs typeface="Times New Roman" panose="02020603050405020304" pitchFamily="18" charset="0"/>
-              </a:rPr>
-              <a:t>Real data</a:t>
-            </a:r>
-            <a:endParaRPr lang="ko-KR" altLang="en-US" sz="1600" dirty="0">
-              <a:latin typeface="Times New Roman" panose="02020603050405020304" pitchFamily="18" charset="0"/>
-              <a:cs typeface="Times New Roman" panose="02020603050405020304" pitchFamily="18" charset="0"/>
-            </a:endParaRPr>
-          </a:p>
-        </p:txBody>
-      </p:sp>
-      <p:cxnSp>
-        <p:nvCxnSpPr>
-          <p:cNvPr id="112" name="직선 화살표 연결선 111">
-            <a:extLst>
-              <a:ext uri="{FF2B5EF4-FFF2-40B4-BE49-F238E27FC236}">
-                <a16:creationId xmlns:a16="http://schemas.microsoft.com/office/drawing/2014/main" id="{75F911B7-5B0F-348B-75DF-9C41A828446F}"/>
-              </a:ext>
-            </a:extLst>
-          </p:cNvPr>
-          <p:cNvCxnSpPr>
-            <a:cxnSpLocks/>
-            <a:stCxn id="111" idx="3"/>
-            <a:endCxn id="114" idx="1"/>
-          </p:cNvCxnSpPr>
-          <p:nvPr/>
-        </p:nvCxnSpPr>
-        <p:spPr>
-          <a:xfrm flipV="1">
-            <a:off x="1739670" y="785691"/>
-            <a:ext cx="534668" cy="4454"/>
-          </a:xfrm>
-          <a:prstGeom prst="straightConnector1">
-            <a:avLst/>
-          </a:prstGeom>
-          <a:ln>
-            <a:tailEnd type="triangle"/>
-          </a:ln>
-        </p:spPr>
-        <p:style>
-          <a:lnRef idx="2">
-            <a:schemeClr val="accent1"/>
-          </a:lnRef>
-          <a:fillRef idx="0">
-            <a:schemeClr val="accent1"/>
-          </a:fillRef>
-          <a:effectRef idx="1">
-            <a:schemeClr val="accent1"/>
-          </a:effectRef>
-          <a:fontRef idx="minor">
-            <a:schemeClr val="tx1"/>
-          </a:fontRef>
-        </p:style>
-      </p:cxnSp>
-      <p:sp>
-        <p:nvSpPr>
           <p:cNvPr id="113" name="TextBox 112">
             <a:extLst>
               <a:ext uri="{FF2B5EF4-FFF2-40B4-BE49-F238E27FC236}">
@@ -5549,7 +5509,7 @@
             </a:schemeClr>
           </a:solidFill>
           <a:ln>
-            <a:prstDash val="dash"/>
+            <a:prstDash val="solid"/>
           </a:ln>
         </p:spPr>
         <p:style>
@@ -5718,7 +5678,7 @@
         <p:spPr>
           <a:xfrm>
             <a:off x="6003375" y="489285"/>
-            <a:ext cx="1612267" cy="584775"/>
+            <a:ext cx="1403165" cy="584775"/>
           </a:xfrm>
           <a:prstGeom prst="rect">
             <a:avLst/>
@@ -5770,7 +5730,7 @@
         </p:nvSpPr>
         <p:spPr>
           <a:xfrm>
-            <a:off x="3239177" y="5594096"/>
+            <a:off x="2929685" y="5650368"/>
             <a:ext cx="1558260" cy="338554"/>
           </a:xfrm>
           <a:prstGeom prst="rect">
@@ -5793,22 +5753,575 @@
                 <a:latin typeface="Times New Roman" panose="02020603050405020304" pitchFamily="18" charset="0"/>
                 <a:cs typeface="Times New Roman" panose="02020603050405020304" pitchFamily="18" charset="0"/>
               </a:rPr>
-              <a:t>Sim style </a:t>
-            </a:r>
-            <a:r>
-              <a:rPr lang="el-GR" altLang="ko-KR" sz="1600" b="1" dirty="0">
-                <a:solidFill>
-                  <a:srgbClr val="FF0000"/>
-                </a:solidFill>
-                <a:latin typeface="Times New Roman" panose="02020603050405020304" pitchFamily="18" charset="0"/>
-                <a:cs typeface="Times New Roman" panose="02020603050405020304" pitchFamily="18" charset="0"/>
-              </a:rPr>
-              <a:t>μ</a:t>
+              <a:t>Fixed vector</a:t>
             </a:r>
             <a:endParaRPr lang="ko-KR" altLang="en-US" sz="1600" b="1" dirty="0">
               <a:solidFill>
                 <a:srgbClr val="FF0000"/>
               </a:solidFill>
+              <a:latin typeface="Times New Roman" panose="02020603050405020304" pitchFamily="18" charset="0"/>
+              <a:cs typeface="Times New Roman" panose="02020603050405020304" pitchFamily="18" charset="0"/>
+            </a:endParaRPr>
+          </a:p>
+        </p:txBody>
+      </p:sp>
+      <p:pic>
+        <p:nvPicPr>
+          <p:cNvPr id="7" name="그림 6">
+            <a:extLst>
+              <a:ext uri="{FF2B5EF4-FFF2-40B4-BE49-F238E27FC236}">
+                <a16:creationId xmlns:a16="http://schemas.microsoft.com/office/drawing/2014/main" id="{A18FA954-5EED-3AA4-DDEE-B0A0737096FF}"/>
+              </a:ext>
+            </a:extLst>
+          </p:cNvPr>
+          <p:cNvPicPr>
+            <a:picLocks noChangeAspect="1"/>
+          </p:cNvPicPr>
+          <p:nvPr/>
+        </p:nvPicPr>
+        <p:blipFill>
+          <a:blip r:embed="rId4"/>
+          <a:stretch>
+            <a:fillRect/>
+          </a:stretch>
+        </p:blipFill>
+        <p:spPr>
+          <a:xfrm>
+            <a:off x="1066080" y="676871"/>
+            <a:ext cx="641073" cy="523798"/>
+          </a:xfrm>
+          <a:prstGeom prst="rect">
+            <a:avLst/>
+          </a:prstGeom>
+          <a:ln>
+            <a:solidFill>
+              <a:schemeClr val="tx1"/>
+            </a:solidFill>
+          </a:ln>
+        </p:spPr>
+      </p:pic>
+      <p:pic>
+        <p:nvPicPr>
+          <p:cNvPr id="8" name="그림 7">
+            <a:extLst>
+              <a:ext uri="{FF2B5EF4-FFF2-40B4-BE49-F238E27FC236}">
+                <a16:creationId xmlns:a16="http://schemas.microsoft.com/office/drawing/2014/main" id="{72334B33-48BC-31ED-7C29-1682DE23B9C8}"/>
+              </a:ext>
+            </a:extLst>
+          </p:cNvPr>
+          <p:cNvPicPr>
+            <a:picLocks noChangeAspect="1"/>
+          </p:cNvPicPr>
+          <p:nvPr/>
+        </p:nvPicPr>
+        <p:blipFill>
+          <a:blip r:embed="rId4"/>
+          <a:stretch>
+            <a:fillRect/>
+          </a:stretch>
+        </p:blipFill>
+        <p:spPr>
+          <a:xfrm>
+            <a:off x="961481" y="759821"/>
+            <a:ext cx="641073" cy="523798"/>
+          </a:xfrm>
+          <a:prstGeom prst="rect">
+            <a:avLst/>
+          </a:prstGeom>
+          <a:ln>
+            <a:solidFill>
+              <a:schemeClr val="tx1"/>
+            </a:solidFill>
+          </a:ln>
+        </p:spPr>
+      </p:pic>
+      <p:pic>
+        <p:nvPicPr>
+          <p:cNvPr id="11" name="그림 10">
+            <a:extLst>
+              <a:ext uri="{FF2B5EF4-FFF2-40B4-BE49-F238E27FC236}">
+                <a16:creationId xmlns:a16="http://schemas.microsoft.com/office/drawing/2014/main" id="{6195C788-9C42-B4F9-B7F3-0F09C1EB86F2}"/>
+              </a:ext>
+            </a:extLst>
+          </p:cNvPr>
+          <p:cNvPicPr>
+            <a:picLocks noChangeAspect="1"/>
+          </p:cNvPicPr>
+          <p:nvPr/>
+        </p:nvPicPr>
+        <p:blipFill>
+          <a:blip r:embed="rId4"/>
+          <a:stretch>
+            <a:fillRect/>
+          </a:stretch>
+        </p:blipFill>
+        <p:spPr>
+          <a:xfrm>
+            <a:off x="861806" y="857841"/>
+            <a:ext cx="641073" cy="523798"/>
+          </a:xfrm>
+          <a:prstGeom prst="rect">
+            <a:avLst/>
+          </a:prstGeom>
+          <a:ln>
+            <a:solidFill>
+              <a:schemeClr val="tx1"/>
+            </a:solidFill>
+          </a:ln>
+        </p:spPr>
+      </p:pic>
+      <p:pic>
+        <p:nvPicPr>
+          <p:cNvPr id="13" name="그림 12">
+            <a:extLst>
+              <a:ext uri="{FF2B5EF4-FFF2-40B4-BE49-F238E27FC236}">
+                <a16:creationId xmlns:a16="http://schemas.microsoft.com/office/drawing/2014/main" id="{E11D51AD-F12C-79AA-EC97-5A4A4413A2B9}"/>
+              </a:ext>
+            </a:extLst>
+          </p:cNvPr>
+          <p:cNvPicPr>
+            <a:picLocks noChangeAspect="1"/>
+          </p:cNvPicPr>
+          <p:nvPr/>
+        </p:nvPicPr>
+        <p:blipFill>
+          <a:blip r:embed="rId4"/>
+          <a:stretch>
+            <a:fillRect/>
+          </a:stretch>
+        </p:blipFill>
+        <p:spPr>
+          <a:xfrm>
+            <a:off x="1026960" y="2460807"/>
+            <a:ext cx="641073" cy="523798"/>
+          </a:xfrm>
+          <a:prstGeom prst="rect">
+            <a:avLst/>
+          </a:prstGeom>
+          <a:ln>
+            <a:solidFill>
+              <a:schemeClr val="tx1"/>
+            </a:solidFill>
+          </a:ln>
+        </p:spPr>
+      </p:pic>
+      <p:pic>
+        <p:nvPicPr>
+          <p:cNvPr id="15" name="그림 14">
+            <a:extLst>
+              <a:ext uri="{FF2B5EF4-FFF2-40B4-BE49-F238E27FC236}">
+                <a16:creationId xmlns:a16="http://schemas.microsoft.com/office/drawing/2014/main" id="{79C1C546-8E36-C43D-C1D0-7270E15043CB}"/>
+              </a:ext>
+            </a:extLst>
+          </p:cNvPr>
+          <p:cNvPicPr>
+            <a:picLocks noChangeAspect="1"/>
+          </p:cNvPicPr>
+          <p:nvPr/>
+        </p:nvPicPr>
+        <p:blipFill>
+          <a:blip r:embed="rId4"/>
+          <a:stretch>
+            <a:fillRect/>
+          </a:stretch>
+        </p:blipFill>
+        <p:spPr>
+          <a:xfrm>
+            <a:off x="922361" y="2543757"/>
+            <a:ext cx="641073" cy="523798"/>
+          </a:xfrm>
+          <a:prstGeom prst="rect">
+            <a:avLst/>
+          </a:prstGeom>
+          <a:ln>
+            <a:solidFill>
+              <a:schemeClr val="tx1"/>
+            </a:solidFill>
+          </a:ln>
+        </p:spPr>
+      </p:pic>
+      <p:pic>
+        <p:nvPicPr>
+          <p:cNvPr id="16" name="그림 15">
+            <a:extLst>
+              <a:ext uri="{FF2B5EF4-FFF2-40B4-BE49-F238E27FC236}">
+                <a16:creationId xmlns:a16="http://schemas.microsoft.com/office/drawing/2014/main" id="{AA2F78F2-A5CA-D3AA-40E4-04985C869A63}"/>
+              </a:ext>
+            </a:extLst>
+          </p:cNvPr>
+          <p:cNvPicPr>
+            <a:picLocks noChangeAspect="1"/>
+          </p:cNvPicPr>
+          <p:nvPr/>
+        </p:nvPicPr>
+        <p:blipFill>
+          <a:blip r:embed="rId4"/>
+          <a:stretch>
+            <a:fillRect/>
+          </a:stretch>
+        </p:blipFill>
+        <p:spPr>
+          <a:xfrm>
+            <a:off x="822686" y="2641777"/>
+            <a:ext cx="641073" cy="523798"/>
+          </a:xfrm>
+          <a:prstGeom prst="rect">
+            <a:avLst/>
+          </a:prstGeom>
+          <a:ln>
+            <a:solidFill>
+              <a:schemeClr val="tx1"/>
+            </a:solidFill>
+          </a:ln>
+        </p:spPr>
+      </p:pic>
+      <p:pic>
+        <p:nvPicPr>
+          <p:cNvPr id="30" name="그림 29">
+            <a:extLst>
+              <a:ext uri="{FF2B5EF4-FFF2-40B4-BE49-F238E27FC236}">
+                <a16:creationId xmlns:a16="http://schemas.microsoft.com/office/drawing/2014/main" id="{8E058889-5232-5C39-463F-5947D2E2861D}"/>
+              </a:ext>
+            </a:extLst>
+          </p:cNvPr>
+          <p:cNvPicPr>
+            <a:picLocks noChangeAspect="1"/>
+          </p:cNvPicPr>
+          <p:nvPr/>
+        </p:nvPicPr>
+        <p:blipFill>
+          <a:blip r:embed="rId4"/>
+          <a:stretch>
+            <a:fillRect/>
+          </a:stretch>
+        </p:blipFill>
+        <p:spPr>
+          <a:xfrm>
+            <a:off x="1097241" y="5313854"/>
+            <a:ext cx="641073" cy="523798"/>
+          </a:xfrm>
+          <a:prstGeom prst="rect">
+            <a:avLst/>
+          </a:prstGeom>
+          <a:ln>
+            <a:solidFill>
+              <a:schemeClr val="tx1"/>
+            </a:solidFill>
+          </a:ln>
+        </p:spPr>
+      </p:pic>
+      <p:pic>
+        <p:nvPicPr>
+          <p:cNvPr id="31" name="그림 30">
+            <a:extLst>
+              <a:ext uri="{FF2B5EF4-FFF2-40B4-BE49-F238E27FC236}">
+                <a16:creationId xmlns:a16="http://schemas.microsoft.com/office/drawing/2014/main" id="{7F074739-5D3B-B870-99EA-ECE5299C794A}"/>
+              </a:ext>
+            </a:extLst>
+          </p:cNvPr>
+          <p:cNvPicPr>
+            <a:picLocks noChangeAspect="1"/>
+          </p:cNvPicPr>
+          <p:nvPr/>
+        </p:nvPicPr>
+        <p:blipFill>
+          <a:blip r:embed="rId4"/>
+          <a:stretch>
+            <a:fillRect/>
+          </a:stretch>
+        </p:blipFill>
+        <p:spPr>
+          <a:xfrm>
+            <a:off x="992642" y="5396804"/>
+            <a:ext cx="641073" cy="523798"/>
+          </a:xfrm>
+          <a:prstGeom prst="rect">
+            <a:avLst/>
+          </a:prstGeom>
+          <a:ln>
+            <a:solidFill>
+              <a:schemeClr val="tx1"/>
+            </a:solidFill>
+          </a:ln>
+        </p:spPr>
+      </p:pic>
+      <p:pic>
+        <p:nvPicPr>
+          <p:cNvPr id="32" name="그림 31">
+            <a:extLst>
+              <a:ext uri="{FF2B5EF4-FFF2-40B4-BE49-F238E27FC236}">
+                <a16:creationId xmlns:a16="http://schemas.microsoft.com/office/drawing/2014/main" id="{23046104-B58F-47A9-EB85-52DD474C7BE7}"/>
+              </a:ext>
+            </a:extLst>
+          </p:cNvPr>
+          <p:cNvPicPr>
+            <a:picLocks noChangeAspect="1"/>
+          </p:cNvPicPr>
+          <p:nvPr/>
+        </p:nvPicPr>
+        <p:blipFill>
+          <a:blip r:embed="rId4"/>
+          <a:stretch>
+            <a:fillRect/>
+          </a:stretch>
+        </p:blipFill>
+        <p:spPr>
+          <a:xfrm>
+            <a:off x="892967" y="5494824"/>
+            <a:ext cx="641073" cy="523798"/>
+          </a:xfrm>
+          <a:prstGeom prst="rect">
+            <a:avLst/>
+          </a:prstGeom>
+          <a:ln>
+            <a:solidFill>
+              <a:schemeClr val="tx1"/>
+            </a:solidFill>
+          </a:ln>
+        </p:spPr>
+      </p:pic>
+      <p:cxnSp>
+        <p:nvCxnSpPr>
+          <p:cNvPr id="27" name="연결선: 꺾임 26">
+            <a:extLst>
+              <a:ext uri="{FF2B5EF4-FFF2-40B4-BE49-F238E27FC236}">
+                <a16:creationId xmlns:a16="http://schemas.microsoft.com/office/drawing/2014/main" id="{C35376A4-973E-F6E0-51A3-562BECC6DE6E}"/>
+              </a:ext>
+            </a:extLst>
+          </p:cNvPr>
+          <p:cNvCxnSpPr>
+            <a:cxnSpLocks/>
+            <a:stCxn id="92" idx="3"/>
+            <a:endCxn id="18" idx="0"/>
+          </p:cNvCxnSpPr>
+          <p:nvPr/>
+        </p:nvCxnSpPr>
+        <p:spPr>
+          <a:xfrm>
+            <a:off x="5375616" y="5251444"/>
+            <a:ext cx="318062" cy="746445"/>
+          </a:xfrm>
+          <a:prstGeom prst="bentConnector2">
+            <a:avLst/>
+          </a:prstGeom>
+        </p:spPr>
+        <p:style>
+          <a:lnRef idx="2">
+            <a:schemeClr val="accent1"/>
+          </a:lnRef>
+          <a:fillRef idx="0">
+            <a:schemeClr val="accent1"/>
+          </a:fillRef>
+          <a:effectRef idx="1">
+            <a:schemeClr val="accent1"/>
+          </a:effectRef>
+          <a:fontRef idx="minor">
+            <a:schemeClr val="tx1"/>
+          </a:fontRef>
+        </p:style>
+      </p:cxnSp>
+      <p:cxnSp>
+        <p:nvCxnSpPr>
+          <p:cNvPr id="40" name="직선 연결선 39">
+            <a:extLst>
+              <a:ext uri="{FF2B5EF4-FFF2-40B4-BE49-F238E27FC236}">
+                <a16:creationId xmlns:a16="http://schemas.microsoft.com/office/drawing/2014/main" id="{686FECC5-C48A-96A7-8988-9C4BE4D03495}"/>
+              </a:ext>
+            </a:extLst>
+          </p:cNvPr>
+          <p:cNvCxnSpPr>
+            <a:cxnSpLocks/>
+            <a:stCxn id="100" idx="3"/>
+          </p:cNvCxnSpPr>
+          <p:nvPr/>
+        </p:nvCxnSpPr>
+        <p:spPr>
+          <a:xfrm>
+            <a:off x="5375616" y="6178870"/>
+            <a:ext cx="250184" cy="0"/>
+          </a:xfrm>
+          <a:prstGeom prst="line">
+            <a:avLst/>
+          </a:prstGeom>
+        </p:spPr>
+        <p:style>
+          <a:lnRef idx="2">
+            <a:schemeClr val="accent1"/>
+          </a:lnRef>
+          <a:fillRef idx="0">
+            <a:schemeClr val="accent1"/>
+          </a:fillRef>
+          <a:effectRef idx="1">
+            <a:schemeClr val="accent1"/>
+          </a:effectRef>
+          <a:fontRef idx="minor">
+            <a:schemeClr val="tx1"/>
+          </a:fontRef>
+        </p:style>
+      </p:cxnSp>
+      <p:pic>
+        <p:nvPicPr>
+          <p:cNvPr id="18" name="그림 17" descr="블랙, 어둠, 스크린샷이(가) 표시된 사진&#10;&#10;AI가 생성한 콘텐츠는 부정확할 수 있습니다.">
+            <a:extLst>
+              <a:ext uri="{FF2B5EF4-FFF2-40B4-BE49-F238E27FC236}">
+                <a16:creationId xmlns:a16="http://schemas.microsoft.com/office/drawing/2014/main" id="{9222F626-13BC-6662-E643-3C8CA166CFC0}"/>
+              </a:ext>
+            </a:extLst>
+          </p:cNvPr>
+          <p:cNvPicPr>
+            <a:picLocks noChangeAspect="1"/>
+          </p:cNvPicPr>
+          <p:nvPr/>
+        </p:nvPicPr>
+        <p:blipFill>
+          <a:blip r:embed="rId5">
+            <a:extLst>
+              <a:ext uri="{28A0092B-C50C-407E-A947-70E740481C1C}">
+                <a14:useLocalDpi xmlns:a14="http://schemas.microsoft.com/office/drawing/2010/main" val="0"/>
+              </a:ext>
+            </a:extLst>
+          </a:blip>
+          <a:stretch>
+            <a:fillRect/>
+          </a:stretch>
+        </p:blipFill>
+        <p:spPr>
+          <a:xfrm>
+            <a:off x="5519413" y="5997889"/>
+            <a:ext cx="348530" cy="348530"/>
+          </a:xfrm>
+          <a:prstGeom prst="rect">
+            <a:avLst/>
+          </a:prstGeom>
+        </p:spPr>
+      </p:pic>
+      <p:pic>
+        <p:nvPicPr>
+          <p:cNvPr id="43" name="그림 42" descr="블랙, 어둠, 스크린샷이(가) 표시된 사진&#10;&#10;AI가 생성한 콘텐츠는 부정확할 수 있습니다.">
+            <a:extLst>
+              <a:ext uri="{FF2B5EF4-FFF2-40B4-BE49-F238E27FC236}">
+                <a16:creationId xmlns:a16="http://schemas.microsoft.com/office/drawing/2014/main" id="{276E0705-FB74-485A-1D46-082A80EA1682}"/>
+              </a:ext>
+            </a:extLst>
+          </p:cNvPr>
+          <p:cNvPicPr>
+            <a:picLocks noChangeAspect="1"/>
+          </p:cNvPicPr>
+          <p:nvPr/>
+        </p:nvPicPr>
+        <p:blipFill>
+          <a:blip r:embed="rId5">
+            <a:extLst>
+              <a:ext uri="{28A0092B-C50C-407E-A947-70E740481C1C}">
+                <a14:useLocalDpi xmlns:a14="http://schemas.microsoft.com/office/drawing/2010/main" val="0"/>
+              </a:ext>
+            </a:extLst>
+          </a:blip>
+          <a:stretch>
+            <a:fillRect/>
+          </a:stretch>
+        </p:blipFill>
+        <p:spPr>
+          <a:xfrm>
+            <a:off x="7441948" y="5023197"/>
+            <a:ext cx="309577" cy="309577"/>
+          </a:xfrm>
+          <a:prstGeom prst="rect">
+            <a:avLst/>
+          </a:prstGeom>
+        </p:spPr>
+      </p:pic>
+      <p:sp>
+        <p:nvSpPr>
+          <p:cNvPr id="44" name="직사각형 43">
+            <a:extLst>
+              <a:ext uri="{FF2B5EF4-FFF2-40B4-BE49-F238E27FC236}">
+                <a16:creationId xmlns:a16="http://schemas.microsoft.com/office/drawing/2014/main" id="{C2949703-603B-1461-95DE-6E7185A98851}"/>
+              </a:ext>
+            </a:extLst>
+          </p:cNvPr>
+          <p:cNvSpPr/>
+          <p:nvPr/>
+        </p:nvSpPr>
+        <p:spPr>
+          <a:xfrm>
+            <a:off x="7405000" y="4999986"/>
+            <a:ext cx="1161790" cy="338554"/>
+          </a:xfrm>
+          <a:prstGeom prst="rect">
+            <a:avLst/>
+          </a:prstGeom>
+          <a:noFill/>
+        </p:spPr>
+        <p:style>
+          <a:lnRef idx="2">
+            <a:schemeClr val="accent1">
+              <a:shade val="15000"/>
+            </a:schemeClr>
+          </a:lnRef>
+          <a:fillRef idx="1">
+            <a:schemeClr val="accent1"/>
+          </a:fillRef>
+          <a:effectRef idx="0">
+            <a:schemeClr val="accent1"/>
+          </a:effectRef>
+          <a:fontRef idx="minor">
+            <a:schemeClr val="lt1"/>
+          </a:fontRef>
+        </p:style>
+        <p:txBody>
+          <a:bodyPr rtlCol="0" anchor="ctr"/>
+          <a:lstStyle/>
+          <a:p>
+            <a:pPr algn="ctr"/>
+            <a:endParaRPr lang="ko-KR" altLang="en-US"/>
+          </a:p>
+        </p:txBody>
+      </p:sp>
+      <p:sp>
+        <p:nvSpPr>
+          <p:cNvPr id="46" name="TextBox 45">
+            <a:extLst>
+              <a:ext uri="{FF2B5EF4-FFF2-40B4-BE49-F238E27FC236}">
+                <a16:creationId xmlns:a16="http://schemas.microsoft.com/office/drawing/2014/main" id="{7E433B2E-5C80-93D1-7D5C-992AE51B67FA}"/>
+              </a:ext>
+            </a:extLst>
+          </p:cNvPr>
+          <p:cNvSpPr txBox="1"/>
+          <p:nvPr/>
+        </p:nvSpPr>
+        <p:spPr>
+          <a:xfrm>
+            <a:off x="7674467" y="5005658"/>
+            <a:ext cx="929267" cy="307777"/>
+          </a:xfrm>
+          <a:prstGeom prst="rect">
+            <a:avLst/>
+          </a:prstGeom>
+          <a:noFill/>
+        </p:spPr>
+        <p:txBody>
+          <a:bodyPr wrap="square" rtlCol="0">
+            <a:spAutoFit/>
+          </a:bodyPr>
+          <a:lstStyle/>
+          <a:p>
+            <a:pPr algn="ctr"/>
+            <a:r>
+              <a:rPr lang="en-US" altLang="ko-KR" sz="1400" dirty="0">
+                <a:latin typeface="Times New Roman" panose="02020603050405020304" pitchFamily="18" charset="0"/>
+                <a:cs typeface="Times New Roman" panose="02020603050405020304" pitchFamily="18" charset="0"/>
+              </a:rPr>
+              <a:t>:  </a:t>
+            </a:r>
+            <a:r>
+              <a:rPr lang="en-US" altLang="ko-KR" sz="1400" dirty="0" err="1">
+                <a:latin typeface="Times New Roman" panose="02020603050405020304" pitchFamily="18" charset="0"/>
+                <a:cs typeface="Times New Roman" panose="02020603050405020304" pitchFamily="18" charset="0"/>
+              </a:rPr>
+              <a:t>Concat</a:t>
+            </a:r>
+            <a:endParaRPr lang="ko-KR" altLang="en-US" sz="1400" dirty="0">
               <a:latin typeface="Times New Roman" panose="02020603050405020304" pitchFamily="18" charset="0"/>
               <a:cs typeface="Times New Roman" panose="02020603050405020304" pitchFamily="18" charset="0"/>
             </a:endParaRPr>

</xml_diff>